<commit_message>
Updated graphic on last slide
</commit_message>
<xml_diff>
--- a/python_data_analysis.pptx
+++ b/python_data_analysis.pptx
@@ -5,7 +5,7 @@
     <p:sldMasterId id="2147483660" r:id="rId1"/>
   </p:sldMasterIdLst>
   <p:notesMasterIdLst>
-    <p:notesMasterId r:id="rId21"/>
+    <p:notesMasterId r:id="rId18"/>
   </p:notesMasterIdLst>
   <p:sldIdLst>
     <p:sldId id="257" r:id="rId2"/>
@@ -22,11 +22,8 @@
     <p:sldId id="413" r:id="rId13"/>
     <p:sldId id="414" r:id="rId14"/>
     <p:sldId id="415" r:id="rId15"/>
-    <p:sldId id="402" r:id="rId16"/>
+    <p:sldId id="424" r:id="rId16"/>
     <p:sldId id="386" r:id="rId17"/>
-    <p:sldId id="387" r:id="rId18"/>
-    <p:sldId id="360" r:id="rId19"/>
-    <p:sldId id="384" r:id="rId20"/>
   </p:sldIdLst>
   <p:sldSz cx="9144000" cy="6858000" type="screen4x3"/>
   <p:notesSz cx="6858000" cy="9144000"/>
@@ -210,7 +207,7 @@
           <a:p>
             <a:fld id="{CE8756B7-FE9A-44EA-B6E4-A03085980E01}" type="datetimeFigureOut">
               <a:rPr lang="en-US" smtClean="0"/>
-              <a:t>2/10/2015</a:t>
+              <a:t>2/11/2015</a:t>
             </a:fld>
             <a:endParaRPr lang="en-US"/>
           </a:p>
@@ -1066,258 +1063,6 @@
 </p:notes>
 </file>
 
-<file path=ppt/notesSlides/notesSlide16.xml><?xml version="1.0" encoding="utf-8"?>
-<p:notes xmlns:a="http://schemas.openxmlformats.org/drawingml/2006/main" xmlns:r="http://schemas.openxmlformats.org/officeDocument/2006/relationships" xmlns:p="http://schemas.openxmlformats.org/presentationml/2006/main">
-  <p:cSld>
-    <p:spTree>
-      <p:nvGrpSpPr>
-        <p:cNvPr id="1" name=""/>
-        <p:cNvGrpSpPr/>
-        <p:nvPr/>
-      </p:nvGrpSpPr>
-      <p:grpSpPr>
-        <a:xfrm>
-          <a:off x="0" y="0"/>
-          <a:ext cx="0" cy="0"/>
-          <a:chOff x="0" y="0"/>
-          <a:chExt cx="0" cy="0"/>
-        </a:xfrm>
-      </p:grpSpPr>
-      <p:sp>
-        <p:nvSpPr>
-          <p:cNvPr id="2" name="Slide Image Placeholder 1"/>
-          <p:cNvSpPr>
-            <a:spLocks noGrp="1" noRot="1" noChangeAspect="1"/>
-          </p:cNvSpPr>
-          <p:nvPr>
-            <p:ph type="sldImg"/>
-          </p:nvPr>
-        </p:nvSpPr>
-        <p:spPr/>
-      </p:sp>
-      <p:sp>
-        <p:nvSpPr>
-          <p:cNvPr id="3" name="Notes Placeholder 2"/>
-          <p:cNvSpPr>
-            <a:spLocks noGrp="1"/>
-          </p:cNvSpPr>
-          <p:nvPr>
-            <p:ph type="body" idx="1"/>
-          </p:nvPr>
-        </p:nvSpPr>
-        <p:spPr/>
-        <p:txBody>
-          <a:bodyPr/>
-          <a:lstStyle/>
-          <a:p>
-            <a:endParaRPr lang="en-US" baseline="0" dirty="0" smtClean="0"/>
-          </a:p>
-        </p:txBody>
-      </p:sp>
-      <p:sp>
-        <p:nvSpPr>
-          <p:cNvPr id="4" name="Slide Number Placeholder 3"/>
-          <p:cNvSpPr>
-            <a:spLocks noGrp="1"/>
-          </p:cNvSpPr>
-          <p:nvPr>
-            <p:ph type="sldNum" sz="quarter" idx="10"/>
-          </p:nvPr>
-        </p:nvSpPr>
-        <p:spPr/>
-        <p:txBody>
-          <a:bodyPr/>
-          <a:lstStyle/>
-          <a:p>
-            <a:fld id="{279FA0F1-D8D2-4E3C-BDF2-9C18F52EC6B9}" type="slidenum">
-              <a:rPr lang="en-US" smtClean="0"/>
-              <a:t>17</a:t>
-            </a:fld>
-            <a:endParaRPr lang="en-US"/>
-          </a:p>
-        </p:txBody>
-      </p:sp>
-    </p:spTree>
-    <p:extLst>
-      <p:ext uri="{BB962C8B-B14F-4D97-AF65-F5344CB8AC3E}">
-        <p14:creationId xmlns:p14="http://schemas.microsoft.com/office/powerpoint/2010/main" val="2851216896"/>
-      </p:ext>
-    </p:extLst>
-  </p:cSld>
-  <p:clrMapOvr>
-    <a:masterClrMapping/>
-  </p:clrMapOvr>
-</p:notes>
-</file>
-
-<file path=ppt/notesSlides/notesSlide17.xml><?xml version="1.0" encoding="utf-8"?>
-<p:notes xmlns:a="http://schemas.openxmlformats.org/drawingml/2006/main" xmlns:r="http://schemas.openxmlformats.org/officeDocument/2006/relationships" xmlns:p="http://schemas.openxmlformats.org/presentationml/2006/main">
-  <p:cSld>
-    <p:spTree>
-      <p:nvGrpSpPr>
-        <p:cNvPr id="1" name=""/>
-        <p:cNvGrpSpPr/>
-        <p:nvPr/>
-      </p:nvGrpSpPr>
-      <p:grpSpPr>
-        <a:xfrm>
-          <a:off x="0" y="0"/>
-          <a:ext cx="0" cy="0"/>
-          <a:chOff x="0" y="0"/>
-          <a:chExt cx="0" cy="0"/>
-        </a:xfrm>
-      </p:grpSpPr>
-      <p:sp>
-        <p:nvSpPr>
-          <p:cNvPr id="2" name="Slide Image Placeholder 1"/>
-          <p:cNvSpPr>
-            <a:spLocks noGrp="1" noRot="1" noChangeAspect="1"/>
-          </p:cNvSpPr>
-          <p:nvPr>
-            <p:ph type="sldImg"/>
-          </p:nvPr>
-        </p:nvSpPr>
-        <p:spPr/>
-      </p:sp>
-      <p:sp>
-        <p:nvSpPr>
-          <p:cNvPr id="3" name="Notes Placeholder 2"/>
-          <p:cNvSpPr>
-            <a:spLocks noGrp="1"/>
-          </p:cNvSpPr>
-          <p:nvPr>
-            <p:ph type="body" idx="1"/>
-          </p:nvPr>
-        </p:nvSpPr>
-        <p:spPr/>
-        <p:txBody>
-          <a:bodyPr/>
-          <a:lstStyle/>
-          <a:p>
-            <a:endParaRPr lang="en-US" dirty="0"/>
-          </a:p>
-        </p:txBody>
-      </p:sp>
-      <p:sp>
-        <p:nvSpPr>
-          <p:cNvPr id="4" name="Slide Number Placeholder 3"/>
-          <p:cNvSpPr>
-            <a:spLocks noGrp="1"/>
-          </p:cNvSpPr>
-          <p:nvPr>
-            <p:ph type="sldNum" sz="quarter" idx="10"/>
-          </p:nvPr>
-        </p:nvSpPr>
-        <p:spPr/>
-        <p:txBody>
-          <a:bodyPr/>
-          <a:lstStyle/>
-          <a:p>
-            <a:fld id="{279FA0F1-D8D2-4E3C-BDF2-9C18F52EC6B9}" type="slidenum">
-              <a:rPr lang="en-US" smtClean="0"/>
-              <a:t>18</a:t>
-            </a:fld>
-            <a:endParaRPr lang="en-US"/>
-          </a:p>
-        </p:txBody>
-      </p:sp>
-    </p:spTree>
-    <p:extLst>
-      <p:ext uri="{BB962C8B-B14F-4D97-AF65-F5344CB8AC3E}">
-        <p14:creationId xmlns:p14="http://schemas.microsoft.com/office/powerpoint/2010/main" val="1660392212"/>
-      </p:ext>
-    </p:extLst>
-  </p:cSld>
-  <p:clrMapOvr>
-    <a:masterClrMapping/>
-  </p:clrMapOvr>
-</p:notes>
-</file>
-
-<file path=ppt/notesSlides/notesSlide18.xml><?xml version="1.0" encoding="utf-8"?>
-<p:notes xmlns:a="http://schemas.openxmlformats.org/drawingml/2006/main" xmlns:r="http://schemas.openxmlformats.org/officeDocument/2006/relationships" xmlns:p="http://schemas.openxmlformats.org/presentationml/2006/main">
-  <p:cSld>
-    <p:spTree>
-      <p:nvGrpSpPr>
-        <p:cNvPr id="1" name=""/>
-        <p:cNvGrpSpPr/>
-        <p:nvPr/>
-      </p:nvGrpSpPr>
-      <p:grpSpPr>
-        <a:xfrm>
-          <a:off x="0" y="0"/>
-          <a:ext cx="0" cy="0"/>
-          <a:chOff x="0" y="0"/>
-          <a:chExt cx="0" cy="0"/>
-        </a:xfrm>
-      </p:grpSpPr>
-      <p:sp>
-        <p:nvSpPr>
-          <p:cNvPr id="2" name="Slide Image Placeholder 1"/>
-          <p:cNvSpPr>
-            <a:spLocks noGrp="1" noRot="1" noChangeAspect="1"/>
-          </p:cNvSpPr>
-          <p:nvPr>
-            <p:ph type="sldImg"/>
-          </p:nvPr>
-        </p:nvSpPr>
-        <p:spPr/>
-      </p:sp>
-      <p:sp>
-        <p:nvSpPr>
-          <p:cNvPr id="3" name="Notes Placeholder 2"/>
-          <p:cNvSpPr>
-            <a:spLocks noGrp="1"/>
-          </p:cNvSpPr>
-          <p:nvPr>
-            <p:ph type="body" idx="1"/>
-          </p:nvPr>
-        </p:nvSpPr>
-        <p:spPr/>
-        <p:txBody>
-          <a:bodyPr/>
-          <a:lstStyle/>
-          <a:p>
-            <a:endParaRPr lang="en-US" dirty="0"/>
-          </a:p>
-        </p:txBody>
-      </p:sp>
-      <p:sp>
-        <p:nvSpPr>
-          <p:cNvPr id="4" name="Slide Number Placeholder 3"/>
-          <p:cNvSpPr>
-            <a:spLocks noGrp="1"/>
-          </p:cNvSpPr>
-          <p:nvPr>
-            <p:ph type="sldNum" sz="quarter" idx="10"/>
-          </p:nvPr>
-        </p:nvSpPr>
-        <p:spPr/>
-        <p:txBody>
-          <a:bodyPr/>
-          <a:lstStyle/>
-          <a:p>
-            <a:fld id="{279FA0F1-D8D2-4E3C-BDF2-9C18F52EC6B9}" type="slidenum">
-              <a:rPr lang="en-US" smtClean="0"/>
-              <a:t>19</a:t>
-            </a:fld>
-            <a:endParaRPr lang="en-US"/>
-          </a:p>
-        </p:txBody>
-      </p:sp>
-    </p:spTree>
-    <p:extLst>
-      <p:ext uri="{BB962C8B-B14F-4D97-AF65-F5344CB8AC3E}">
-        <p14:creationId xmlns:p14="http://schemas.microsoft.com/office/powerpoint/2010/main" val="1660392212"/>
-      </p:ext>
-    </p:extLst>
-  </p:cSld>
-  <p:clrMapOvr>
-    <a:masterClrMapping/>
-  </p:clrMapOvr>
-</p:notes>
-</file>
-
 <file path=ppt/notesSlides/notesSlide2.xml><?xml version="1.0" encoding="utf-8"?>
 <p:notes xmlns:a="http://schemas.openxmlformats.org/drawingml/2006/main" xmlns:r="http://schemas.openxmlformats.org/officeDocument/2006/relationships" xmlns:p="http://schemas.openxmlformats.org/presentationml/2006/main">
   <p:cSld>
@@ -3526,7 +3271,7 @@
                 </a:solidFill>
               </a:rPr>
               <a:pPr/>
-              <a:t>2/10/2015</a:t>
+              <a:t>2/11/2015</a:t>
             </a:fld>
             <a:endParaRPr lang="en-US">
               <a:solidFill>
@@ -6491,7 +6236,7 @@
                 <a:latin typeface="Arial" panose="020B0604020202020204" pitchFamily="34" charset="0"/>
                 <a:cs typeface="Arial" panose="020B0604020202020204" pitchFamily="34" charset="0"/>
               </a:rPr>
-              <a:t>In contrast to R, which has 5000+ </a:t>
+              <a:t>In contrast to R, which has 5000+ packages, Python has a smaller and richer </a:t>
             </a:r>
             <a:r>
               <a:rPr lang="en-US" sz="2400" b="1" dirty="0" smtClean="0">
@@ -6501,15 +6246,18 @@
                 <a:latin typeface="Arial" panose="020B0604020202020204" pitchFamily="34" charset="0"/>
                 <a:cs typeface="Arial" panose="020B0604020202020204" pitchFamily="34" charset="0"/>
               </a:rPr>
-              <a:t>packages, Python has a smaller and richer of package ecosystem</a:t>
+              <a:t>package </a:t>
             </a:r>
-            <a:endParaRPr lang="en-US" sz="2400" b="1" dirty="0" smtClean="0">
-              <a:solidFill>
-                <a:schemeClr val="bg1"/>
-              </a:solidFill>
-              <a:latin typeface="Arial" panose="020B0604020202020204" pitchFamily="34" charset="0"/>
-              <a:cs typeface="Arial" panose="020B0604020202020204" pitchFamily="34" charset="0"/>
-            </a:endParaRPr>
+            <a:r>
+              <a:rPr lang="en-US" sz="2400" b="1" dirty="0" smtClean="0">
+                <a:solidFill>
+                  <a:schemeClr val="bg1"/>
+                </a:solidFill>
+                <a:latin typeface="Arial" panose="020B0604020202020204" pitchFamily="34" charset="0"/>
+                <a:cs typeface="Arial" panose="020B0604020202020204" pitchFamily="34" charset="0"/>
+              </a:rPr>
+              <a:t>ecosystem</a:t>
+            </a:r>
           </a:p>
         </p:txBody>
       </p:sp>
@@ -7087,17 +6835,7 @@
                 <a:latin typeface="Arial" panose="020B0604020202020204" pitchFamily="34" charset="0"/>
                 <a:cs typeface="Arial" panose="020B0604020202020204" pitchFamily="34" charset="0"/>
               </a:rPr>
-              <a:t>Sci</a:t>
-            </a:r>
-            <a:r>
-              <a:rPr lang="en-US" sz="2400" b="1" dirty="0" err="1" smtClean="0">
-                <a:solidFill>
-                  <a:schemeClr val="bg1"/>
-                </a:solidFill>
-                <a:latin typeface="Arial" panose="020B0604020202020204" pitchFamily="34" charset="0"/>
-                <a:cs typeface="Arial" panose="020B0604020202020204" pitchFamily="34" charset="0"/>
-              </a:rPr>
-              <a:t>kit</a:t>
+              <a:t>Scikit</a:t>
             </a:r>
             <a:r>
               <a:rPr lang="en-US" sz="2400" b="1" dirty="0" smtClean="0">
@@ -7227,7 +6965,7 @@
         </p:nvSpPr>
         <p:spPr bwMode="auto">
           <a:xfrm>
-            <a:off x="1424938" y="3426728"/>
+            <a:off x="1424938" y="2971800"/>
             <a:ext cx="679306" cy="646833"/>
           </a:xfrm>
           <a:custGeom>
@@ -7848,7 +7586,7 @@
         </p:nvSpPr>
         <p:spPr>
           <a:xfrm>
-            <a:off x="842036" y="2855880"/>
+            <a:off x="842036" y="3694079"/>
             <a:ext cx="1899704" cy="461665"/>
           </a:xfrm>
           <a:prstGeom prst="rect">
@@ -7893,7 +7631,7 @@
         </p:nvSpPr>
         <p:spPr bwMode="auto">
           <a:xfrm rot="16200000">
-            <a:off x="4288061" y="3426729"/>
+            <a:off x="4288061" y="2971801"/>
             <a:ext cx="646833" cy="646833"/>
           </a:xfrm>
           <a:custGeom>
@@ -8180,7 +7918,7 @@
         </p:nvSpPr>
         <p:spPr>
           <a:xfrm>
-            <a:off x="3678685" y="2855880"/>
+            <a:off x="3678685" y="3694079"/>
             <a:ext cx="1899704" cy="461665"/>
           </a:xfrm>
           <a:prstGeom prst="rect">
@@ -8225,7 +7963,7 @@
         </p:nvSpPr>
         <p:spPr bwMode="auto">
           <a:xfrm>
-            <a:off x="6936910" y="3426728"/>
+            <a:off x="6936910" y="2971800"/>
             <a:ext cx="759290" cy="640080"/>
           </a:xfrm>
           <a:custGeom>
@@ -8984,7 +8722,7 @@
         </p:nvSpPr>
         <p:spPr>
           <a:xfrm>
-            <a:off x="6394589" y="2855880"/>
+            <a:off x="6394589" y="3694079"/>
             <a:ext cx="1899704" cy="461665"/>
           </a:xfrm>
           <a:prstGeom prst="rect">
@@ -9022,7 +8760,7 @@
     </p:spTree>
     <p:extLst>
       <p:ext uri="{BB962C8B-B14F-4D97-AF65-F5344CB8AC3E}">
-        <p14:creationId xmlns:p14="http://schemas.microsoft.com/office/powerpoint/2010/main" val="1225443648"/>
+        <p14:creationId xmlns:p14="http://schemas.microsoft.com/office/powerpoint/2010/main" val="1741418935"/>
       </p:ext>
     </p:extLst>
   </p:cSld>
@@ -9215,8 +8953,20 @@
             <a:pPr algn="ctr"/>
             <a:r>
               <a:rPr lang="en-US" sz="5400" dirty="0"/>
-              <a:t>Code Walkthrough</a:t>
+              <a:t>Code </a:t>
             </a:r>
+            <a:r>
+              <a:rPr lang="en-US" sz="5400" dirty="0" smtClean="0"/>
+              <a:t>Walkthrough</a:t>
+            </a:r>
+          </a:p>
+          <a:p>
+            <a:pPr algn="ctr"/>
+            <a:r>
+              <a:rPr lang="en-US" sz="5400" dirty="0" smtClean="0"/>
+              <a:t>&amp; Exercise</a:t>
+            </a:r>
+            <a:endParaRPr lang="en-US" sz="5400" dirty="0"/>
           </a:p>
         </p:txBody>
       </p:sp>
@@ -9230,718 +8980,6 @@
   <p:clrMapOvr>
     <a:masterClrMapping/>
   </p:clrMapOvr>
-  <p:timing>
-    <p:tnLst>
-      <p:par>
-        <p:cTn id="1" dur="indefinite" restart="never" nodeType="tmRoot"/>
-      </p:par>
-    </p:tnLst>
-  </p:timing>
-</p:sld>
-</file>
-
-<file path=ppt/slides/slide17.xml><?xml version="1.0" encoding="utf-8"?>
-<p:sld xmlns:a="http://schemas.openxmlformats.org/drawingml/2006/main" xmlns:r="http://schemas.openxmlformats.org/officeDocument/2006/relationships" xmlns:p="http://schemas.openxmlformats.org/presentationml/2006/main">
-  <p:cSld>
-    <p:spTree>
-      <p:nvGrpSpPr>
-        <p:cNvPr id="1" name=""/>
-        <p:cNvGrpSpPr/>
-        <p:nvPr/>
-      </p:nvGrpSpPr>
-      <p:grpSpPr>
-        <a:xfrm>
-          <a:off x="0" y="0"/>
-          <a:ext cx="0" cy="0"/>
-          <a:chOff x="0" y="0"/>
-          <a:chExt cx="0" cy="0"/>
-        </a:xfrm>
-      </p:grpSpPr>
-      <p:sp>
-        <p:nvSpPr>
-          <p:cNvPr id="2" name="Title 1"/>
-          <p:cNvSpPr txBox="1">
-            <a:spLocks/>
-          </p:cNvSpPr>
-          <p:nvPr/>
-        </p:nvSpPr>
-        <p:spPr>
-          <a:xfrm>
-            <a:off x="1166529" y="2645647"/>
-            <a:ext cx="6810943" cy="1248614"/>
-          </a:xfrm>
-          <a:prstGeom prst="rect">
-            <a:avLst/>
-          </a:prstGeom>
-          <a:noFill/>
-          <a:ln>
-            <a:noFill/>
-          </a:ln>
-          <a:extLst>
-            <a:ext uri="{909E8E84-426E-40DD-AFC4-6F175D3DCCD1}">
-              <a14:hiddenFill xmlns:a14="http://schemas.microsoft.com/office/drawing/2010/main">
-                <a:solidFill>
-                  <a:srgbClr val="FFFFFF"/>
-                </a:solidFill>
-              </a14:hiddenFill>
-            </a:ext>
-            <a:ext uri="{91240B29-F687-4F45-9708-019B960494DF}">
-              <a14:hiddenLine xmlns:a14="http://schemas.microsoft.com/office/drawing/2010/main" w="9525">
-                <a:solidFill>
-                  <a:srgbClr val="000000"/>
-                </a:solidFill>
-                <a:miter lim="800000"/>
-                <a:headEnd/>
-                <a:tailEnd/>
-              </a14:hiddenLine>
-            </a:ext>
-          </a:extLst>
-        </p:spPr>
-        <p:txBody>
-          <a:bodyPr vert="horz" wrap="square" lIns="0" tIns="0" rIns="0" bIns="0" numCol="1" anchor="ctr" anchorCtr="0" compatLnSpc="1">
-            <a:prstTxWarp prst="textNoShape">
-              <a:avLst/>
-            </a:prstTxWarp>
-          </a:bodyPr>
-          <a:lstStyle>
-            <a:lvl1pPr eaLnBrk="0" fontAlgn="base" hangingPunct="0">
-              <a:spcBef>
-                <a:spcPct val="0"/>
-              </a:spcBef>
-              <a:spcAft>
-                <a:spcPct val="0"/>
-              </a:spcAft>
-              <a:defRPr sz="4000" b="1">
-                <a:solidFill>
-                  <a:schemeClr val="tx1">
-                    <a:lumMod val="85000"/>
-                    <a:lumOff val="15000"/>
-                  </a:schemeClr>
-                </a:solidFill>
-                <a:latin typeface="+mj-lt"/>
-                <a:ea typeface="+mj-ea"/>
-                <a:cs typeface="+mj-cs"/>
-              </a:defRPr>
-            </a:lvl1pPr>
-            <a:lvl2pPr eaLnBrk="0" fontAlgn="base" hangingPunct="0">
-              <a:spcBef>
-                <a:spcPct val="0"/>
-              </a:spcBef>
-              <a:spcAft>
-                <a:spcPct val="0"/>
-              </a:spcAft>
-              <a:defRPr sz="2000" b="1">
-                <a:latin typeface="Arial" charset="0"/>
-              </a:defRPr>
-            </a:lvl2pPr>
-            <a:lvl3pPr eaLnBrk="0" fontAlgn="base" hangingPunct="0">
-              <a:spcBef>
-                <a:spcPct val="0"/>
-              </a:spcBef>
-              <a:spcAft>
-                <a:spcPct val="0"/>
-              </a:spcAft>
-              <a:defRPr sz="2000" b="1">
-                <a:latin typeface="Arial" charset="0"/>
-              </a:defRPr>
-            </a:lvl3pPr>
-            <a:lvl4pPr eaLnBrk="0" fontAlgn="base" hangingPunct="0">
-              <a:spcBef>
-                <a:spcPct val="0"/>
-              </a:spcBef>
-              <a:spcAft>
-                <a:spcPct val="0"/>
-              </a:spcAft>
-              <a:defRPr sz="2000" b="1">
-                <a:latin typeface="Arial" charset="0"/>
-              </a:defRPr>
-            </a:lvl4pPr>
-            <a:lvl5pPr eaLnBrk="0" fontAlgn="base" hangingPunct="0">
-              <a:spcBef>
-                <a:spcPct val="0"/>
-              </a:spcBef>
-              <a:spcAft>
-                <a:spcPct val="0"/>
-              </a:spcAft>
-              <a:defRPr sz="2000" b="1">
-                <a:latin typeface="Arial" charset="0"/>
-              </a:defRPr>
-            </a:lvl5pPr>
-            <a:lvl6pPr marL="457200" fontAlgn="base">
-              <a:spcBef>
-                <a:spcPct val="0"/>
-              </a:spcBef>
-              <a:spcAft>
-                <a:spcPct val="0"/>
-              </a:spcAft>
-              <a:defRPr sz="2000" b="1">
-                <a:latin typeface="Arial" charset="0"/>
-              </a:defRPr>
-            </a:lvl6pPr>
-            <a:lvl7pPr marL="914400" fontAlgn="base">
-              <a:spcBef>
-                <a:spcPct val="0"/>
-              </a:spcBef>
-              <a:spcAft>
-                <a:spcPct val="0"/>
-              </a:spcAft>
-              <a:defRPr sz="2000" b="1">
-                <a:latin typeface="Arial" charset="0"/>
-              </a:defRPr>
-            </a:lvl7pPr>
-            <a:lvl8pPr marL="1371600" fontAlgn="base">
-              <a:spcBef>
-                <a:spcPct val="0"/>
-              </a:spcBef>
-              <a:spcAft>
-                <a:spcPct val="0"/>
-              </a:spcAft>
-              <a:defRPr sz="2000" b="1">
-                <a:latin typeface="Arial" charset="0"/>
-              </a:defRPr>
-            </a:lvl8pPr>
-            <a:lvl9pPr marL="1828800" fontAlgn="base">
-              <a:spcBef>
-                <a:spcPct val="0"/>
-              </a:spcBef>
-              <a:spcAft>
-                <a:spcPct val="0"/>
-              </a:spcAft>
-              <a:defRPr sz="2000" b="1">
-                <a:latin typeface="Arial" charset="0"/>
-              </a:defRPr>
-            </a:lvl9pPr>
-          </a:lstStyle>
-          <a:p>
-            <a:pPr algn="ctr"/>
-            <a:r>
-              <a:rPr lang="en-US" sz="5400" dirty="0" smtClean="0"/>
-              <a:t>Resources</a:t>
-            </a:r>
-            <a:endParaRPr lang="en-US" sz="5400" dirty="0"/>
-          </a:p>
-        </p:txBody>
-      </p:sp>
-    </p:spTree>
-    <p:extLst>
-      <p:ext uri="{BB962C8B-B14F-4D97-AF65-F5344CB8AC3E}">
-        <p14:creationId xmlns:p14="http://schemas.microsoft.com/office/powerpoint/2010/main" val="2233197186"/>
-      </p:ext>
-    </p:extLst>
-  </p:cSld>
-  <p:clrMapOvr>
-    <a:masterClrMapping/>
-  </p:clrMapOvr>
-  <p:timing>
-    <p:tnLst>
-      <p:par>
-        <p:cTn id="1" dur="indefinite" restart="never" nodeType="tmRoot"/>
-      </p:par>
-    </p:tnLst>
-  </p:timing>
-</p:sld>
-</file>
-
-<file path=ppt/slides/slide18.xml><?xml version="1.0" encoding="utf-8"?>
-<p:sld xmlns:a="http://schemas.openxmlformats.org/drawingml/2006/main" xmlns:r="http://schemas.openxmlformats.org/officeDocument/2006/relationships" xmlns:p="http://schemas.openxmlformats.org/presentationml/2006/main">
-  <p:cSld>
-    <p:spTree>
-      <p:nvGrpSpPr>
-        <p:cNvPr id="1" name=""/>
-        <p:cNvGrpSpPr/>
-        <p:nvPr/>
-      </p:nvGrpSpPr>
-      <p:grpSpPr>
-        <a:xfrm>
-          <a:off x="0" y="0"/>
-          <a:ext cx="0" cy="0"/>
-          <a:chOff x="0" y="0"/>
-          <a:chExt cx="0" cy="0"/>
-        </a:xfrm>
-      </p:grpSpPr>
-      <p:sp>
-        <p:nvSpPr>
-          <p:cNvPr id="20" name="TextBox 19"/>
-          <p:cNvSpPr txBox="1"/>
-          <p:nvPr/>
-        </p:nvSpPr>
-        <p:spPr>
-          <a:xfrm>
-            <a:off x="685800" y="1235075"/>
-            <a:ext cx="7863840" cy="830997"/>
-          </a:xfrm>
-          <a:prstGeom prst="rect">
-            <a:avLst/>
-          </a:prstGeom>
-          <a:noFill/>
-        </p:spPr>
-        <p:txBody>
-          <a:bodyPr wrap="square" rtlCol="0">
-            <a:spAutoFit/>
-          </a:bodyPr>
-          <a:lstStyle/>
-          <a:p>
-            <a:r>
-              <a:rPr lang="en-US" sz="2400" dirty="0" smtClean="0">
-                <a:solidFill>
-                  <a:prstClr val="black"/>
-                </a:solidFill>
-                <a:latin typeface="Arial" panose="020B0604020202020204" pitchFamily="34" charset="0"/>
-                <a:cs typeface="Arial" panose="020B0604020202020204" pitchFamily="34" charset="0"/>
-              </a:rPr>
-              <a:t>Wes Anderson, the creator of the Pandas library, has written a book that is a good reference guide.</a:t>
-            </a:r>
-            <a:endParaRPr lang="en-US" sz="2400" dirty="0" smtClean="0">
-              <a:solidFill>
-                <a:srgbClr val="FF7F0E"/>
-              </a:solidFill>
-              <a:latin typeface="Arial" panose="020B0604020202020204" pitchFamily="34" charset="0"/>
-              <a:cs typeface="Arial" panose="020B0604020202020204" pitchFamily="34" charset="0"/>
-            </a:endParaRPr>
-          </a:p>
-        </p:txBody>
-      </p:sp>
-      <p:pic>
-        <p:nvPicPr>
-          <p:cNvPr id="43012" name="Picture 4" descr="http://pandas.pydata.org/_static/pydata_cover.jpg">
-            <a:hlinkClick r:id="rId3"/>
-          </p:cNvPr>
-          <p:cNvPicPr>
-            <a:picLocks noChangeAspect="1" noChangeArrowheads="1"/>
-          </p:cNvPicPr>
-          <p:nvPr/>
-        </p:nvPicPr>
-        <p:blipFill>
-          <a:blip r:embed="rId4">
-            <a:extLst>
-              <a:ext uri="{28A0092B-C50C-407E-A947-70E740481C1C}">
-                <a14:useLocalDpi xmlns:a14="http://schemas.microsoft.com/office/drawing/2010/main" val="0"/>
-              </a:ext>
-            </a:extLst>
-          </a:blip>
-          <a:srcRect/>
-          <a:stretch>
-            <a:fillRect/>
-          </a:stretch>
-        </p:blipFill>
-        <p:spPr bwMode="auto">
-          <a:xfrm>
-            <a:off x="2819400" y="2403247"/>
-            <a:ext cx="2957137" cy="3879765"/>
-          </a:xfrm>
-          <a:prstGeom prst="rect">
-            <a:avLst/>
-          </a:prstGeom>
-          <a:noFill/>
-          <a:ln>
-            <a:solidFill>
-              <a:schemeClr val="bg1">
-                <a:lumMod val="65000"/>
-              </a:schemeClr>
-            </a:solidFill>
-          </a:ln>
-          <a:extLst>
-            <a:ext uri="{909E8E84-426E-40DD-AFC4-6F175D3DCCD1}">
-              <a14:hiddenFill xmlns:a14="http://schemas.microsoft.com/office/drawing/2010/main">
-                <a:solidFill>
-                  <a:srgbClr val="FFFFFF"/>
-                </a:solidFill>
-              </a14:hiddenFill>
-            </a:ext>
-          </a:extLst>
-        </p:spPr>
-      </p:pic>
-      <p:sp>
-        <p:nvSpPr>
-          <p:cNvPr id="9" name="Title 1"/>
-          <p:cNvSpPr>
-            <a:spLocks noGrp="1"/>
-          </p:cNvSpPr>
-          <p:nvPr>
-            <p:ph type="title"/>
-          </p:nvPr>
-        </p:nvSpPr>
-        <p:spPr>
-          <a:xfrm>
-            <a:off x="685800" y="457200"/>
-            <a:ext cx="7863840" cy="365125"/>
-          </a:xfrm>
-        </p:spPr>
-        <p:txBody>
-          <a:bodyPr anchor="t"/>
-          <a:lstStyle/>
-          <a:p>
-            <a:r>
-              <a:rPr lang="en-US" sz="4000" dirty="0" smtClean="0">
-                <a:solidFill>
-                  <a:schemeClr val="tx1">
-                    <a:lumMod val="85000"/>
-                    <a:lumOff val="15000"/>
-                  </a:schemeClr>
-                </a:solidFill>
-                <a:latin typeface="+mj-lt"/>
-              </a:rPr>
-              <a:t>Resources</a:t>
-            </a:r>
-            <a:endParaRPr lang="en-US" sz="4000" dirty="0">
-              <a:solidFill>
-                <a:schemeClr val="tx1">
-                  <a:lumMod val="85000"/>
-                  <a:lumOff val="15000"/>
-                </a:schemeClr>
-              </a:solidFill>
-              <a:latin typeface="+mj-lt"/>
-            </a:endParaRPr>
-          </a:p>
-        </p:txBody>
-      </p:sp>
-    </p:spTree>
-    <p:extLst>
-      <p:ext uri="{BB962C8B-B14F-4D97-AF65-F5344CB8AC3E}">
-        <p14:creationId xmlns:p14="http://schemas.microsoft.com/office/powerpoint/2010/main" val="1068088090"/>
-      </p:ext>
-    </p:extLst>
-  </p:cSld>
-  <p:clrMapOvr>
-    <a:masterClrMapping/>
-  </p:clrMapOvr>
-  <p:timing>
-    <p:tnLst>
-      <p:par>
-        <p:cTn id="1" dur="indefinite" restart="never" nodeType="tmRoot"/>
-      </p:par>
-    </p:tnLst>
-  </p:timing>
-</p:sld>
-</file>
-
-<file path=ppt/slides/slide19.xml><?xml version="1.0" encoding="utf-8"?>
-<p:sld xmlns:a="http://schemas.openxmlformats.org/drawingml/2006/main" xmlns:r="http://schemas.openxmlformats.org/officeDocument/2006/relationships" xmlns:p="http://schemas.openxmlformats.org/presentationml/2006/main">
-  <p:cSld>
-    <p:spTree>
-      <p:nvGrpSpPr>
-        <p:cNvPr id="1" name=""/>
-        <p:cNvGrpSpPr/>
-        <p:nvPr/>
-      </p:nvGrpSpPr>
-      <p:grpSpPr>
-        <a:xfrm>
-          <a:off x="0" y="0"/>
-          <a:ext cx="0" cy="0"/>
-          <a:chOff x="0" y="0"/>
-          <a:chExt cx="0" cy="0"/>
-        </a:xfrm>
-      </p:grpSpPr>
-      <p:sp>
-        <p:nvSpPr>
-          <p:cNvPr id="20" name="TextBox 19"/>
-          <p:cNvSpPr txBox="1"/>
-          <p:nvPr/>
-        </p:nvSpPr>
-        <p:spPr>
-          <a:xfrm>
-            <a:off x="685800" y="1235075"/>
-            <a:ext cx="7863840" cy="830997"/>
-          </a:xfrm>
-          <a:prstGeom prst="rect">
-            <a:avLst/>
-          </a:prstGeom>
-          <a:noFill/>
-        </p:spPr>
-        <p:txBody>
-          <a:bodyPr wrap="square" rtlCol="0">
-            <a:spAutoFit/>
-          </a:bodyPr>
-          <a:lstStyle/>
-          <a:p>
-            <a:r>
-              <a:rPr lang="en-US" sz="2400" dirty="0" smtClean="0">
-                <a:solidFill>
-                  <a:prstClr val="black"/>
-                </a:solidFill>
-                <a:latin typeface="Arial" panose="020B0604020202020204" pitchFamily="34" charset="0"/>
-                <a:cs typeface="Arial" panose="020B0604020202020204" pitchFamily="34" charset="0"/>
-              </a:rPr>
-              <a:t>General Assembly offers a class on Data Science that covers the following topics:</a:t>
-            </a:r>
-            <a:endParaRPr lang="en-US" sz="2400" dirty="0" smtClean="0">
-              <a:solidFill>
-                <a:srgbClr val="FF7F0E"/>
-              </a:solidFill>
-              <a:latin typeface="Arial" panose="020B0604020202020204" pitchFamily="34" charset="0"/>
-              <a:cs typeface="Arial" panose="020B0604020202020204" pitchFamily="34" charset="0"/>
-            </a:endParaRPr>
-          </a:p>
-        </p:txBody>
-      </p:sp>
-      <p:sp>
-        <p:nvSpPr>
-          <p:cNvPr id="5" name="Rectangle 4"/>
-          <p:cNvSpPr/>
-          <p:nvPr/>
-        </p:nvSpPr>
-        <p:spPr>
-          <a:xfrm>
-            <a:off x="685800" y="2386548"/>
-            <a:ext cx="4724400" cy="3785652"/>
-          </a:xfrm>
-          <a:prstGeom prst="rect">
-            <a:avLst/>
-          </a:prstGeom>
-          <a:noFill/>
-        </p:spPr>
-        <p:txBody>
-          <a:bodyPr wrap="square" rtlCol="0">
-            <a:spAutoFit/>
-          </a:bodyPr>
-          <a:lstStyle/>
-          <a:p>
-            <a:pPr marL="342900" indent="-342900">
-              <a:buFont typeface="Wingdings" panose="05000000000000000000" pitchFamily="2" charset="2"/>
-              <a:buChar char="§"/>
-            </a:pPr>
-            <a:r>
-              <a:rPr lang="en-US" sz="2400" dirty="0" smtClean="0">
-                <a:solidFill>
-                  <a:prstClr val="black"/>
-                </a:solidFill>
-                <a:latin typeface="Arial" panose="020B0604020202020204" pitchFamily="34" charset="0"/>
-                <a:cs typeface="Arial" panose="020B0604020202020204" pitchFamily="34" charset="0"/>
-              </a:rPr>
-              <a:t>Predictive Modeling</a:t>
-            </a:r>
-          </a:p>
-          <a:p>
-            <a:endParaRPr lang="en-US" sz="2400" dirty="0">
-              <a:solidFill>
-                <a:prstClr val="black"/>
-              </a:solidFill>
-              <a:latin typeface="Arial" panose="020B0604020202020204" pitchFamily="34" charset="0"/>
-              <a:cs typeface="Arial" panose="020B0604020202020204" pitchFamily="34" charset="0"/>
-            </a:endParaRPr>
-          </a:p>
-          <a:p>
-            <a:pPr marL="342900" indent="-342900">
-              <a:buFont typeface="Wingdings" panose="05000000000000000000" pitchFamily="2" charset="2"/>
-              <a:buChar char="§"/>
-            </a:pPr>
-            <a:r>
-              <a:rPr lang="en-US" sz="2400" dirty="0" smtClean="0">
-                <a:solidFill>
-                  <a:prstClr val="black"/>
-                </a:solidFill>
-                <a:latin typeface="Arial" panose="020B0604020202020204" pitchFamily="34" charset="0"/>
-                <a:cs typeface="Arial" panose="020B0604020202020204" pitchFamily="34" charset="0"/>
-              </a:rPr>
-              <a:t>Clustering and Dimension Reduction</a:t>
-            </a:r>
-          </a:p>
-          <a:p>
-            <a:pPr marL="342900" indent="-342900">
-              <a:buFont typeface="Wingdings" panose="05000000000000000000" pitchFamily="2" charset="2"/>
-              <a:buChar char="§"/>
-            </a:pPr>
-            <a:endParaRPr lang="en-US" sz="2400" dirty="0" smtClean="0">
-              <a:solidFill>
-                <a:prstClr val="black"/>
-              </a:solidFill>
-              <a:latin typeface="Arial" panose="020B0604020202020204" pitchFamily="34" charset="0"/>
-              <a:cs typeface="Arial" panose="020B0604020202020204" pitchFamily="34" charset="0"/>
-            </a:endParaRPr>
-          </a:p>
-          <a:p>
-            <a:pPr marL="342900" indent="-342900">
-              <a:buFont typeface="Wingdings" panose="05000000000000000000" pitchFamily="2" charset="2"/>
-              <a:buChar char="§"/>
-            </a:pPr>
-            <a:r>
-              <a:rPr lang="en-US" sz="2400" dirty="0" smtClean="0">
-                <a:solidFill>
-                  <a:prstClr val="black"/>
-                </a:solidFill>
-                <a:latin typeface="Arial" panose="020B0604020202020204" pitchFamily="34" charset="0"/>
-                <a:cs typeface="Arial" panose="020B0604020202020204" pitchFamily="34" charset="0"/>
-              </a:rPr>
-              <a:t>Natural Language Processing</a:t>
-            </a:r>
-            <a:endParaRPr lang="en-US" sz="2400" dirty="0">
-              <a:solidFill>
-                <a:prstClr val="black"/>
-              </a:solidFill>
-              <a:latin typeface="Arial" panose="020B0604020202020204" pitchFamily="34" charset="0"/>
-              <a:cs typeface="Arial" panose="020B0604020202020204" pitchFamily="34" charset="0"/>
-            </a:endParaRPr>
-          </a:p>
-          <a:p>
-            <a:pPr marL="342900" indent="-342900">
-              <a:buFont typeface="Wingdings" panose="05000000000000000000" pitchFamily="2" charset="2"/>
-              <a:buChar char="§"/>
-            </a:pPr>
-            <a:endParaRPr lang="en-US" sz="2400" dirty="0">
-              <a:solidFill>
-                <a:prstClr val="black"/>
-              </a:solidFill>
-              <a:latin typeface="Arial" panose="020B0604020202020204" pitchFamily="34" charset="0"/>
-              <a:cs typeface="Arial" panose="020B0604020202020204" pitchFamily="34" charset="0"/>
-            </a:endParaRPr>
-          </a:p>
-          <a:p>
-            <a:pPr marL="342900" indent="-342900">
-              <a:buFont typeface="Wingdings" panose="05000000000000000000" pitchFamily="2" charset="2"/>
-              <a:buChar char="§"/>
-            </a:pPr>
-            <a:r>
-              <a:rPr lang="en-US" sz="2400" dirty="0" smtClean="0">
-                <a:solidFill>
-                  <a:prstClr val="black"/>
-                </a:solidFill>
-                <a:latin typeface="Arial" panose="020B0604020202020204" pitchFamily="34" charset="0"/>
-                <a:cs typeface="Arial" panose="020B0604020202020204" pitchFamily="34" charset="0"/>
-              </a:rPr>
-              <a:t>Databases</a:t>
-            </a:r>
-          </a:p>
-          <a:p>
-            <a:pPr marL="342900" indent="-342900">
-              <a:buFont typeface="Wingdings" panose="05000000000000000000" pitchFamily="2" charset="2"/>
-              <a:buChar char="§"/>
-            </a:pPr>
-            <a:endParaRPr lang="en-US" sz="2400" dirty="0" smtClean="0">
-              <a:solidFill>
-                <a:prstClr val="black"/>
-              </a:solidFill>
-              <a:latin typeface="Arial" panose="020B0604020202020204" pitchFamily="34" charset="0"/>
-              <a:cs typeface="Arial" panose="020B0604020202020204" pitchFamily="34" charset="0"/>
-            </a:endParaRPr>
-          </a:p>
-          <a:p>
-            <a:pPr marL="342900" indent="-342900">
-              <a:buFont typeface="Wingdings" panose="05000000000000000000" pitchFamily="2" charset="2"/>
-              <a:buChar char="§"/>
-            </a:pPr>
-            <a:r>
-              <a:rPr lang="en-US" sz="2400" dirty="0" smtClean="0">
-                <a:solidFill>
-                  <a:prstClr val="black"/>
-                </a:solidFill>
-                <a:latin typeface="Arial" panose="020B0604020202020204" pitchFamily="34" charset="0"/>
-                <a:cs typeface="Arial" panose="020B0604020202020204" pitchFamily="34" charset="0"/>
-              </a:rPr>
-              <a:t>Web Scraping &amp; APIs</a:t>
-            </a:r>
-          </a:p>
-        </p:txBody>
-      </p:sp>
-      <p:pic>
-        <p:nvPicPr>
-          <p:cNvPr id="2050" name="Picture 2" descr="https://generalassemb.ly/online/assets/ga-lockup-logo-9d95d5d0a1c966540edaedcb440b1963.png"/>
-          <p:cNvPicPr>
-            <a:picLocks noChangeAspect="1" noChangeArrowheads="1"/>
-          </p:cNvPicPr>
-          <p:nvPr/>
-        </p:nvPicPr>
-        <p:blipFill>
-          <a:blip r:embed="rId3" cstate="print">
-            <a:extLst>
-              <a:ext uri="{28A0092B-C50C-407E-A947-70E740481C1C}">
-                <a14:useLocalDpi xmlns:a14="http://schemas.microsoft.com/office/drawing/2010/main" val="0"/>
-              </a:ext>
-            </a:extLst>
-          </a:blip>
-          <a:srcRect/>
-          <a:stretch>
-            <a:fillRect/>
-          </a:stretch>
-        </p:blipFill>
-        <p:spPr bwMode="auto">
-          <a:xfrm>
-            <a:off x="5427704" y="2608034"/>
-            <a:ext cx="3254996" cy="3254996"/>
-          </a:xfrm>
-          <a:prstGeom prst="rect">
-            <a:avLst/>
-          </a:prstGeom>
-          <a:noFill/>
-          <a:ln>
-            <a:solidFill>
-              <a:schemeClr val="bg1">
-                <a:lumMod val="65000"/>
-              </a:schemeClr>
-            </a:solidFill>
-          </a:ln>
-          <a:extLst>
-            <a:ext uri="{909E8E84-426E-40DD-AFC4-6F175D3DCCD1}">
-              <a14:hiddenFill xmlns:a14="http://schemas.microsoft.com/office/drawing/2010/main">
-                <a:solidFill>
-                  <a:srgbClr val="FFFFFF"/>
-                </a:solidFill>
-              </a14:hiddenFill>
-            </a:ext>
-          </a:extLst>
-        </p:spPr>
-      </p:pic>
-      <p:sp>
-        <p:nvSpPr>
-          <p:cNvPr id="8" name="Title 1"/>
-          <p:cNvSpPr>
-            <a:spLocks noGrp="1"/>
-          </p:cNvSpPr>
-          <p:nvPr>
-            <p:ph type="title"/>
-          </p:nvPr>
-        </p:nvSpPr>
-        <p:spPr>
-          <a:xfrm>
-            <a:off x="685800" y="457200"/>
-            <a:ext cx="7863840" cy="365125"/>
-          </a:xfrm>
-        </p:spPr>
-        <p:txBody>
-          <a:bodyPr anchor="t"/>
-          <a:lstStyle/>
-          <a:p>
-            <a:r>
-              <a:rPr lang="en-US" sz="4000" dirty="0" smtClean="0">
-                <a:solidFill>
-                  <a:schemeClr val="tx1">
-                    <a:lumMod val="85000"/>
-                    <a:lumOff val="15000"/>
-                  </a:schemeClr>
-                </a:solidFill>
-                <a:latin typeface="+mj-lt"/>
-              </a:rPr>
-              <a:t>Resources</a:t>
-            </a:r>
-            <a:endParaRPr lang="en-US" sz="4000" dirty="0">
-              <a:solidFill>
-                <a:schemeClr val="tx1">
-                  <a:lumMod val="85000"/>
-                  <a:lumOff val="15000"/>
-                </a:schemeClr>
-              </a:solidFill>
-              <a:latin typeface="+mj-lt"/>
-            </a:endParaRPr>
-          </a:p>
-        </p:txBody>
-      </p:sp>
-    </p:spTree>
-    <p:extLst>
-      <p:ext uri="{BB962C8B-B14F-4D97-AF65-F5344CB8AC3E}">
-        <p14:creationId xmlns:p14="http://schemas.microsoft.com/office/powerpoint/2010/main" val="1280863612"/>
-      </p:ext>
-    </p:extLst>
-  </p:cSld>
-  <p:clrMapOvr>
-    <a:masterClrMapping/>
-  </p:clrMapOvr>
-  <mc:AlternateContent xmlns:mc="http://schemas.openxmlformats.org/markup-compatibility/2006">
-    <mc:Choice xmlns:p14="http://schemas.microsoft.com/office/powerpoint/2010/main" Requires="p14">
-      <p:transition spd="slow" p14:dur="2000"/>
-    </mc:Choice>
-    <mc:Fallback>
-      <p:transition spd="slow"/>
-    </mc:Fallback>
-  </mc:AlternateContent>
   <p:timing>
     <p:tnLst>
       <p:par>
@@ -10076,7 +9114,47 @@
                 </a:solidFill>
                 <a:latin typeface="+mj-lt"/>
               </a:rPr>
-              <a:t>Introduction</a:t>
+              <a:t>What is data analysis?</a:t>
+            </a:r>
+          </a:p>
+          <a:p>
+            <a:pPr>
+              <a:spcBef>
+                <a:spcPts val="1800"/>
+              </a:spcBef>
+              <a:buChar char="§"/>
+            </a:pPr>
+            <a:r>
+              <a:rPr lang="en-US" sz="3200" dirty="0" smtClean="0">
+                <a:solidFill>
+                  <a:schemeClr val="tx1">
+                    <a:lumMod val="85000"/>
+                    <a:lumOff val="15000"/>
+                  </a:schemeClr>
+                </a:solidFill>
+                <a:latin typeface="+mj-lt"/>
+              </a:rPr>
+              <a:t>Why learn to program?</a:t>
+            </a:r>
+          </a:p>
+          <a:p>
+            <a:pPr>
+              <a:spcBef>
+                <a:spcPts val="1800"/>
+              </a:spcBef>
+              <a:buChar char="§"/>
+            </a:pPr>
+            <a:r>
+              <a:rPr lang="en-US" sz="3200" dirty="0" smtClean="0">
+                <a:solidFill>
+                  <a:schemeClr val="tx1">
+                    <a:lumMod val="85000"/>
+                    <a:lumOff val="15000"/>
+                  </a:schemeClr>
+                </a:solidFill>
+                <a:latin typeface="+mj-lt"/>
+              </a:rPr>
+              <a:t>Why learn python?</a:t>
             </a:r>
             <a:endParaRPr lang="en-US" sz="3200" dirty="0" smtClean="0">
               <a:solidFill>
@@ -10105,16 +9183,8 @@
                 </a:solidFill>
                 <a:latin typeface="+mj-lt"/>
               </a:rPr>
-              <a:t>Code Walkthrough</a:t>
+              <a:t>Code </a:t>
             </a:r>
-          </a:p>
-          <a:p>
-            <a:pPr>
-              <a:spcBef>
-                <a:spcPts val="1800"/>
-              </a:spcBef>
-              <a:buChar char="§"/>
-            </a:pPr>
             <a:r>
               <a:rPr lang="en-US" sz="3200" dirty="0" smtClean="0">
                 <a:solidFill>
@@ -10125,27 +9195,7 @@
                 </a:solidFill>
                 <a:latin typeface="+mj-lt"/>
               </a:rPr>
-              <a:t>Code Exercise</a:t>
-            </a:r>
-          </a:p>
-          <a:p>
-            <a:pPr>
-              <a:spcBef>
-                <a:spcPts val="1800"/>
-              </a:spcBef>
-              <a:buChar char="§"/>
-            </a:pPr>
-            <a:r>
-              <a:rPr lang="en-US" sz="3200" dirty="0" smtClean="0">
-                <a:solidFill>
-                  <a:schemeClr val="tx1">
-                    <a:lumMod val="85000"/>
-                    <a:lumOff val="15000"/>
-                  </a:schemeClr>
-                </a:solidFill>
-                <a:latin typeface="+mj-lt"/>
-              </a:rPr>
-              <a:t>Resources</a:t>
+              <a:t>Walkthrough &amp; Exercise</a:t>
             </a:r>
             <a:endParaRPr lang="en-US" sz="3200" dirty="0" smtClean="0">
               <a:solidFill>

</xml_diff>

<commit_message>
What is data analysis? Updated
</commit_message>
<xml_diff>
--- a/python_data_analysis.pptx
+++ b/python_data_analysis.pptx
@@ -5,25 +5,24 @@
     <p:sldMasterId id="2147483660" r:id="rId1"/>
   </p:sldMasterIdLst>
   <p:notesMasterIdLst>
-    <p:notesMasterId r:id="rId18"/>
+    <p:notesMasterId r:id="rId17"/>
   </p:notesMasterIdLst>
   <p:sldIdLst>
     <p:sldId id="257" r:id="rId2"/>
     <p:sldId id="357" r:id="rId3"/>
     <p:sldId id="416" r:id="rId4"/>
-    <p:sldId id="419" r:id="rId5"/>
-    <p:sldId id="420" r:id="rId6"/>
-    <p:sldId id="411" r:id="rId7"/>
-    <p:sldId id="405" r:id="rId8"/>
-    <p:sldId id="408" r:id="rId9"/>
-    <p:sldId id="409" r:id="rId10"/>
-    <p:sldId id="401" r:id="rId11"/>
-    <p:sldId id="410" r:id="rId12"/>
-    <p:sldId id="413" r:id="rId13"/>
-    <p:sldId id="414" r:id="rId14"/>
-    <p:sldId id="415" r:id="rId15"/>
-    <p:sldId id="424" r:id="rId16"/>
-    <p:sldId id="386" r:id="rId17"/>
+    <p:sldId id="432" r:id="rId5"/>
+    <p:sldId id="411" r:id="rId6"/>
+    <p:sldId id="405" r:id="rId7"/>
+    <p:sldId id="408" r:id="rId8"/>
+    <p:sldId id="409" r:id="rId9"/>
+    <p:sldId id="401" r:id="rId10"/>
+    <p:sldId id="410" r:id="rId11"/>
+    <p:sldId id="413" r:id="rId12"/>
+    <p:sldId id="414" r:id="rId13"/>
+    <p:sldId id="415" r:id="rId14"/>
+    <p:sldId id="424" r:id="rId15"/>
+    <p:sldId id="386" r:id="rId16"/>
   </p:sldIdLst>
   <p:sldSz cx="9144000" cy="6858000" type="screen4x3"/>
   <p:notesSz cx="6858000" cy="9144000"/>
@@ -207,7 +206,7 @@
           <a:p>
             <a:fld id="{CE8756B7-FE9A-44EA-B6E4-A03085980E01}" type="datetimeFigureOut">
               <a:rPr lang="en-US" smtClean="0"/>
-              <a:t>2/11/2015</a:t>
+              <a:t>2/12/2015</a:t>
             </a:fld>
             <a:endParaRPr lang="en-US"/>
           </a:p>
@@ -885,7 +884,7 @@
     </p:spTree>
     <p:extLst>
       <p:ext uri="{BB962C8B-B14F-4D97-AF65-F5344CB8AC3E}">
-        <p14:creationId xmlns:p14="http://schemas.microsoft.com/office/powerpoint/2010/main" val="2851216896"/>
+        <p14:creationId xmlns:p14="http://schemas.microsoft.com/office/powerpoint/2010/main" val="4210772847"/>
       </p:ext>
     </p:extLst>
   </p:cSld>
@@ -961,90 +960,6 @@
             <a:fld id="{279FA0F1-D8D2-4E3C-BDF2-9C18F52EC6B9}" type="slidenum">
               <a:rPr lang="en-US" smtClean="0"/>
               <a:t>15</a:t>
-            </a:fld>
-            <a:endParaRPr lang="en-US"/>
-          </a:p>
-        </p:txBody>
-      </p:sp>
-    </p:spTree>
-    <p:extLst>
-      <p:ext uri="{BB962C8B-B14F-4D97-AF65-F5344CB8AC3E}">
-        <p14:creationId xmlns:p14="http://schemas.microsoft.com/office/powerpoint/2010/main" val="4210772847"/>
-      </p:ext>
-    </p:extLst>
-  </p:cSld>
-  <p:clrMapOvr>
-    <a:masterClrMapping/>
-  </p:clrMapOvr>
-</p:notes>
-</file>
-
-<file path=ppt/notesSlides/notesSlide15.xml><?xml version="1.0" encoding="utf-8"?>
-<p:notes xmlns:a="http://schemas.openxmlformats.org/drawingml/2006/main" xmlns:r="http://schemas.openxmlformats.org/officeDocument/2006/relationships" xmlns:p="http://schemas.openxmlformats.org/presentationml/2006/main">
-  <p:cSld>
-    <p:spTree>
-      <p:nvGrpSpPr>
-        <p:cNvPr id="1" name=""/>
-        <p:cNvGrpSpPr/>
-        <p:nvPr/>
-      </p:nvGrpSpPr>
-      <p:grpSpPr>
-        <a:xfrm>
-          <a:off x="0" y="0"/>
-          <a:ext cx="0" cy="0"/>
-          <a:chOff x="0" y="0"/>
-          <a:chExt cx="0" cy="0"/>
-        </a:xfrm>
-      </p:grpSpPr>
-      <p:sp>
-        <p:nvSpPr>
-          <p:cNvPr id="2" name="Slide Image Placeholder 1"/>
-          <p:cNvSpPr>
-            <a:spLocks noGrp="1" noRot="1" noChangeAspect="1"/>
-          </p:cNvSpPr>
-          <p:nvPr>
-            <p:ph type="sldImg"/>
-          </p:nvPr>
-        </p:nvSpPr>
-        <p:spPr/>
-      </p:sp>
-      <p:sp>
-        <p:nvSpPr>
-          <p:cNvPr id="3" name="Notes Placeholder 2"/>
-          <p:cNvSpPr>
-            <a:spLocks noGrp="1"/>
-          </p:cNvSpPr>
-          <p:nvPr>
-            <p:ph type="body" idx="1"/>
-          </p:nvPr>
-        </p:nvSpPr>
-        <p:spPr/>
-        <p:txBody>
-          <a:bodyPr/>
-          <a:lstStyle/>
-          <a:p>
-            <a:endParaRPr lang="en-US" baseline="0" dirty="0" smtClean="0"/>
-          </a:p>
-        </p:txBody>
-      </p:sp>
-      <p:sp>
-        <p:nvSpPr>
-          <p:cNvPr id="4" name="Slide Number Placeholder 3"/>
-          <p:cNvSpPr>
-            <a:spLocks noGrp="1"/>
-          </p:cNvSpPr>
-          <p:nvPr>
-            <p:ph type="sldNum" sz="quarter" idx="10"/>
-          </p:nvPr>
-        </p:nvSpPr>
-        <p:spPr/>
-        <p:txBody>
-          <a:bodyPr/>
-          <a:lstStyle/>
-          <a:p>
-            <a:fld id="{279FA0F1-D8D2-4E3C-BDF2-9C18F52EC6B9}" type="slidenum">
-              <a:rPr lang="en-US" smtClean="0"/>
-              <a:t>16</a:t>
             </a:fld>
             <a:endParaRPr lang="en-US"/>
           </a:p>
@@ -1275,21 +1190,7 @@
           <a:bodyPr/>
           <a:lstStyle/>
           <a:p>
-            <a:r>
-              <a:rPr lang="en-US" dirty="0" smtClean="0"/>
-              <a:t>Strengths</a:t>
-            </a:r>
-            <a:r>
-              <a:rPr lang="en-US" baseline="0" dirty="0" smtClean="0"/>
-              <a:t> of visualization is to reveal the unexpected, problem is that they don’t scale very well.</a:t>
-            </a:r>
-          </a:p>
-          <a:p>
-            <a:r>
-              <a:rPr lang="en-US" baseline="0" dirty="0" smtClean="0"/>
-              <a:t>Models scale, but they are typically specific, and as such don’t reveal the unexpected. Definition is important part of the task.</a:t>
-            </a:r>
-            <a:endParaRPr lang="en-US" dirty="0"/>
+            <a:endParaRPr lang="en-US" baseline="0" dirty="0" smtClean="0"/>
           </a:p>
         </p:txBody>
       </p:sp>
@@ -1319,7 +1220,7 @@
     </p:spTree>
     <p:extLst>
       <p:ext uri="{BB962C8B-B14F-4D97-AF65-F5344CB8AC3E}">
-        <p14:creationId xmlns:p14="http://schemas.microsoft.com/office/powerpoint/2010/main" val="4210772847"/>
+        <p14:creationId xmlns:p14="http://schemas.microsoft.com/office/powerpoint/2010/main" val="2851216896"/>
       </p:ext>
     </p:extLst>
   </p:cSld>
@@ -3271,7 +3172,7 @@
                 </a:solidFill>
               </a:rPr>
               <a:pPr/>
-              <a:t>2/11/2015</a:t>
+              <a:t>2/12/2015</a:t>
             </a:fld>
             <a:endParaRPr lang="en-US">
               <a:solidFill>
@@ -4465,7 +4366,7 @@
       </p:grpSpPr>
       <p:sp>
         <p:nvSpPr>
-          <p:cNvPr id="2" name="Title 1"/>
+          <p:cNvPr id="10" name="Title 1"/>
           <p:cNvSpPr txBox="1">
             <a:spLocks/>
           </p:cNvSpPr>
@@ -4473,8 +4374,8 @@
         </p:nvSpPr>
         <p:spPr>
           <a:xfrm>
-            <a:off x="825982" y="2645647"/>
-            <a:ext cx="7492037" cy="1248614"/>
+            <a:off x="762000" y="1676400"/>
+            <a:ext cx="3581400" cy="1248614"/>
           </a:xfrm>
           <a:prstGeom prst="rect">
             <a:avLst/>
@@ -4620,29 +4521,189 @@
           </a:lstStyle>
           <a:p>
             <a:r>
-              <a:rPr lang="en-US" sz="5400" dirty="0" smtClean="0"/>
-              <a:t>Why program in </a:t>
+              <a:rPr lang="en-US" sz="8000" dirty="0" smtClean="0">
+                <a:solidFill>
+                  <a:srgbClr val="3366FF"/>
+                </a:solidFill>
+              </a:rPr>
+              <a:t>#1</a:t>
             </a:r>
-            <a:r>
-              <a:rPr lang="en-US" sz="5400" dirty="0" smtClean="0">
-                <a:solidFill>
-                  <a:srgbClr val="3366FF"/>
-                </a:solidFill>
-              </a:rPr>
-              <a:t>Python?</a:t>
-            </a:r>
-            <a:endParaRPr lang="en-US" sz="5400" dirty="0">
+            <a:endParaRPr lang="en-US" sz="8000" dirty="0">
               <a:solidFill>
                 <a:srgbClr val="3366FF"/>
               </a:solidFill>
             </a:endParaRPr>
+          </a:p>
+        </p:txBody>
+      </p:sp>
+      <p:sp>
+        <p:nvSpPr>
+          <p:cNvPr id="11" name="Title 1"/>
+          <p:cNvSpPr txBox="1">
+            <a:spLocks/>
+          </p:cNvSpPr>
+          <p:nvPr/>
+        </p:nvSpPr>
+        <p:spPr>
+          <a:xfrm>
+            <a:off x="685800" y="2960033"/>
+            <a:ext cx="8001000" cy="2069167"/>
+          </a:xfrm>
+          <a:prstGeom prst="rect">
+            <a:avLst/>
+          </a:prstGeom>
+          <a:noFill/>
+          <a:ln>
+            <a:noFill/>
+          </a:ln>
+          <a:extLst>
+            <a:ext uri="{909E8E84-426E-40DD-AFC4-6F175D3DCCD1}">
+              <a14:hiddenFill xmlns:a14="http://schemas.microsoft.com/office/drawing/2010/main">
+                <a:solidFill>
+                  <a:srgbClr val="FFFFFF"/>
+                </a:solidFill>
+              </a14:hiddenFill>
+            </a:ext>
+            <a:ext uri="{91240B29-F687-4F45-9708-019B960494DF}">
+              <a14:hiddenLine xmlns:a14="http://schemas.microsoft.com/office/drawing/2010/main" w="9525">
+                <a:solidFill>
+                  <a:srgbClr val="000000"/>
+                </a:solidFill>
+                <a:miter lim="800000"/>
+                <a:headEnd/>
+                <a:tailEnd/>
+              </a14:hiddenLine>
+            </a:ext>
+          </a:extLst>
+        </p:spPr>
+        <p:txBody>
+          <a:bodyPr vert="horz" wrap="square" lIns="0" tIns="0" rIns="0" bIns="0" numCol="1" anchor="t" anchorCtr="0" compatLnSpc="1">
+            <a:prstTxWarp prst="textNoShape">
+              <a:avLst/>
+            </a:prstTxWarp>
+          </a:bodyPr>
+          <a:lstStyle>
+            <a:lvl1pPr eaLnBrk="0" fontAlgn="base" hangingPunct="0">
+              <a:spcBef>
+                <a:spcPct val="0"/>
+              </a:spcBef>
+              <a:spcAft>
+                <a:spcPct val="0"/>
+              </a:spcAft>
+              <a:defRPr sz="4000" b="1">
+                <a:solidFill>
+                  <a:schemeClr val="tx1">
+                    <a:lumMod val="85000"/>
+                    <a:lumOff val="15000"/>
+                  </a:schemeClr>
+                </a:solidFill>
+                <a:latin typeface="+mj-lt"/>
+                <a:ea typeface="+mj-ea"/>
+                <a:cs typeface="+mj-cs"/>
+              </a:defRPr>
+            </a:lvl1pPr>
+            <a:lvl2pPr eaLnBrk="0" fontAlgn="base" hangingPunct="0">
+              <a:spcBef>
+                <a:spcPct val="0"/>
+              </a:spcBef>
+              <a:spcAft>
+                <a:spcPct val="0"/>
+              </a:spcAft>
+              <a:defRPr sz="2000" b="1">
+                <a:latin typeface="Arial" charset="0"/>
+              </a:defRPr>
+            </a:lvl2pPr>
+            <a:lvl3pPr eaLnBrk="0" fontAlgn="base" hangingPunct="0">
+              <a:spcBef>
+                <a:spcPct val="0"/>
+              </a:spcBef>
+              <a:spcAft>
+                <a:spcPct val="0"/>
+              </a:spcAft>
+              <a:defRPr sz="2000" b="1">
+                <a:latin typeface="Arial" charset="0"/>
+              </a:defRPr>
+            </a:lvl3pPr>
+            <a:lvl4pPr eaLnBrk="0" fontAlgn="base" hangingPunct="0">
+              <a:spcBef>
+                <a:spcPct val="0"/>
+              </a:spcBef>
+              <a:spcAft>
+                <a:spcPct val="0"/>
+              </a:spcAft>
+              <a:defRPr sz="2000" b="1">
+                <a:latin typeface="Arial" charset="0"/>
+              </a:defRPr>
+            </a:lvl4pPr>
+            <a:lvl5pPr eaLnBrk="0" fontAlgn="base" hangingPunct="0">
+              <a:spcBef>
+                <a:spcPct val="0"/>
+              </a:spcBef>
+              <a:spcAft>
+                <a:spcPct val="0"/>
+              </a:spcAft>
+              <a:defRPr sz="2000" b="1">
+                <a:latin typeface="Arial" charset="0"/>
+              </a:defRPr>
+            </a:lvl5pPr>
+            <a:lvl6pPr marL="457200" fontAlgn="base">
+              <a:spcBef>
+                <a:spcPct val="0"/>
+              </a:spcBef>
+              <a:spcAft>
+                <a:spcPct val="0"/>
+              </a:spcAft>
+              <a:defRPr sz="2000" b="1">
+                <a:latin typeface="Arial" charset="0"/>
+              </a:defRPr>
+            </a:lvl6pPr>
+            <a:lvl7pPr marL="914400" fontAlgn="base">
+              <a:spcBef>
+                <a:spcPct val="0"/>
+              </a:spcBef>
+              <a:spcAft>
+                <a:spcPct val="0"/>
+              </a:spcAft>
+              <a:defRPr sz="2000" b="1">
+                <a:latin typeface="Arial" charset="0"/>
+              </a:defRPr>
+            </a:lvl7pPr>
+            <a:lvl8pPr marL="1371600" fontAlgn="base">
+              <a:spcBef>
+                <a:spcPct val="0"/>
+              </a:spcBef>
+              <a:spcAft>
+                <a:spcPct val="0"/>
+              </a:spcAft>
+              <a:defRPr sz="2000" b="1">
+                <a:latin typeface="Arial" charset="0"/>
+              </a:defRPr>
+            </a:lvl8pPr>
+            <a:lvl9pPr marL="1828800" fontAlgn="base">
+              <a:spcBef>
+                <a:spcPct val="0"/>
+              </a:spcBef>
+              <a:spcAft>
+                <a:spcPct val="0"/>
+              </a:spcAft>
+              <a:defRPr sz="2000" b="1">
+                <a:latin typeface="Arial" charset="0"/>
+              </a:defRPr>
+            </a:lvl9pPr>
+          </a:lstStyle>
+          <a:p>
+            <a:r>
+              <a:rPr lang="en-US" sz="5400" dirty="0" smtClean="0"/>
+              <a:t>Python is free</a:t>
+            </a:r>
+            <a:endParaRPr lang="en-US" sz="5400" dirty="0"/>
           </a:p>
         </p:txBody>
       </p:sp>
     </p:spTree>
     <p:extLst>
       <p:ext uri="{BB962C8B-B14F-4D97-AF65-F5344CB8AC3E}">
-        <p14:creationId xmlns:p14="http://schemas.microsoft.com/office/powerpoint/2010/main" val="3808562461"/>
+        <p14:creationId xmlns:p14="http://schemas.microsoft.com/office/powerpoint/2010/main" val="1124046397"/>
       </p:ext>
     </p:extLst>
   </p:cSld>
@@ -4838,7 +4899,7 @@
                   <a:srgbClr val="3366FF"/>
                 </a:solidFill>
               </a:rPr>
-              <a:t>#1</a:t>
+              <a:t>#2</a:t>
             </a:r>
             <a:endParaRPr lang="en-US" sz="8000" dirty="0">
               <a:solidFill>
@@ -5006,7 +5067,7 @@
           <a:p>
             <a:r>
               <a:rPr lang="en-US" sz="5400" dirty="0" smtClean="0"/>
-              <a:t>Python is free</a:t>
+              <a:t>Python is a general purpose language</a:t>
             </a:r>
             <a:endParaRPr lang="en-US" sz="5400" dirty="0"/>
           </a:p>
@@ -5015,7 +5076,7 @@
     </p:spTree>
     <p:extLst>
       <p:ext uri="{BB962C8B-B14F-4D97-AF65-F5344CB8AC3E}">
-        <p14:creationId xmlns:p14="http://schemas.microsoft.com/office/powerpoint/2010/main" val="1124046397"/>
+        <p14:creationId xmlns:p14="http://schemas.microsoft.com/office/powerpoint/2010/main" val="3699404758"/>
       </p:ext>
     </p:extLst>
   </p:cSld>
@@ -5211,7 +5272,7 @@
                   <a:srgbClr val="3366FF"/>
                 </a:solidFill>
               </a:rPr>
-              <a:t>#2</a:t>
+              <a:t>#3</a:t>
             </a:r>
             <a:endParaRPr lang="en-US" sz="8000" dirty="0">
               <a:solidFill>
@@ -5379,7 +5440,7 @@
           <a:p>
             <a:r>
               <a:rPr lang="en-US" sz="5400" dirty="0" smtClean="0"/>
-              <a:t>Python is a general purpose language</a:t>
+              <a:t>Python is designed for ease of use</a:t>
             </a:r>
             <a:endParaRPr lang="en-US" sz="5400" dirty="0"/>
           </a:p>
@@ -5388,7 +5449,7 @@
     </p:spTree>
     <p:extLst>
       <p:ext uri="{BB962C8B-B14F-4D97-AF65-F5344CB8AC3E}">
-        <p14:creationId xmlns:p14="http://schemas.microsoft.com/office/powerpoint/2010/main" val="3699404758"/>
+        <p14:creationId xmlns:p14="http://schemas.microsoft.com/office/powerpoint/2010/main" val="3440001969"/>
       </p:ext>
     </p:extLst>
   </p:cSld>
@@ -5584,7 +5645,7 @@
                   <a:srgbClr val="3366FF"/>
                 </a:solidFill>
               </a:rPr>
-              <a:t>#3</a:t>
+              <a:t>#4</a:t>
             </a:r>
             <a:endParaRPr lang="en-US" sz="8000" dirty="0">
               <a:solidFill>
@@ -5752,379 +5813,6 @@
           <a:p>
             <a:r>
               <a:rPr lang="en-US" sz="5400" dirty="0" smtClean="0"/>
-              <a:t>Python is designed for ease of use</a:t>
-            </a:r>
-            <a:endParaRPr lang="en-US" sz="5400" dirty="0"/>
-          </a:p>
-        </p:txBody>
-      </p:sp>
-    </p:spTree>
-    <p:extLst>
-      <p:ext uri="{BB962C8B-B14F-4D97-AF65-F5344CB8AC3E}">
-        <p14:creationId xmlns:p14="http://schemas.microsoft.com/office/powerpoint/2010/main" val="3440001969"/>
-      </p:ext>
-    </p:extLst>
-  </p:cSld>
-  <p:clrMapOvr>
-    <a:masterClrMapping/>
-  </p:clrMapOvr>
-  <p:timing>
-    <p:tnLst>
-      <p:par>
-        <p:cTn id="1" dur="indefinite" restart="never" nodeType="tmRoot"/>
-      </p:par>
-    </p:tnLst>
-  </p:timing>
-</p:sld>
-</file>
-
-<file path=ppt/slides/slide14.xml><?xml version="1.0" encoding="utf-8"?>
-<p:sld xmlns:a="http://schemas.openxmlformats.org/drawingml/2006/main" xmlns:r="http://schemas.openxmlformats.org/officeDocument/2006/relationships" xmlns:p="http://schemas.openxmlformats.org/presentationml/2006/main">
-  <p:cSld>
-    <p:spTree>
-      <p:nvGrpSpPr>
-        <p:cNvPr id="1" name=""/>
-        <p:cNvGrpSpPr/>
-        <p:nvPr/>
-      </p:nvGrpSpPr>
-      <p:grpSpPr>
-        <a:xfrm>
-          <a:off x="0" y="0"/>
-          <a:ext cx="0" cy="0"/>
-          <a:chOff x="0" y="0"/>
-          <a:chExt cx="0" cy="0"/>
-        </a:xfrm>
-      </p:grpSpPr>
-      <p:sp>
-        <p:nvSpPr>
-          <p:cNvPr id="10" name="Title 1"/>
-          <p:cNvSpPr txBox="1">
-            <a:spLocks/>
-          </p:cNvSpPr>
-          <p:nvPr/>
-        </p:nvSpPr>
-        <p:spPr>
-          <a:xfrm>
-            <a:off x="762000" y="1676400"/>
-            <a:ext cx="3581400" cy="1248614"/>
-          </a:xfrm>
-          <a:prstGeom prst="rect">
-            <a:avLst/>
-          </a:prstGeom>
-          <a:noFill/>
-          <a:ln>
-            <a:noFill/>
-          </a:ln>
-          <a:extLst>
-            <a:ext uri="{909E8E84-426E-40DD-AFC4-6F175D3DCCD1}">
-              <a14:hiddenFill xmlns:a14="http://schemas.microsoft.com/office/drawing/2010/main">
-                <a:solidFill>
-                  <a:srgbClr val="FFFFFF"/>
-                </a:solidFill>
-              </a14:hiddenFill>
-            </a:ext>
-            <a:ext uri="{91240B29-F687-4F45-9708-019B960494DF}">
-              <a14:hiddenLine xmlns:a14="http://schemas.microsoft.com/office/drawing/2010/main" w="9525">
-                <a:solidFill>
-                  <a:srgbClr val="000000"/>
-                </a:solidFill>
-                <a:miter lim="800000"/>
-                <a:headEnd/>
-                <a:tailEnd/>
-              </a14:hiddenLine>
-            </a:ext>
-          </a:extLst>
-        </p:spPr>
-        <p:txBody>
-          <a:bodyPr vert="horz" wrap="square" lIns="0" tIns="0" rIns="0" bIns="0" numCol="1" anchor="ctr" anchorCtr="0" compatLnSpc="1">
-            <a:prstTxWarp prst="textNoShape">
-              <a:avLst/>
-            </a:prstTxWarp>
-          </a:bodyPr>
-          <a:lstStyle>
-            <a:lvl1pPr eaLnBrk="0" fontAlgn="base" hangingPunct="0">
-              <a:spcBef>
-                <a:spcPct val="0"/>
-              </a:spcBef>
-              <a:spcAft>
-                <a:spcPct val="0"/>
-              </a:spcAft>
-              <a:defRPr sz="4000" b="1">
-                <a:solidFill>
-                  <a:schemeClr val="tx1">
-                    <a:lumMod val="85000"/>
-                    <a:lumOff val="15000"/>
-                  </a:schemeClr>
-                </a:solidFill>
-                <a:latin typeface="+mj-lt"/>
-                <a:ea typeface="+mj-ea"/>
-                <a:cs typeface="+mj-cs"/>
-              </a:defRPr>
-            </a:lvl1pPr>
-            <a:lvl2pPr eaLnBrk="0" fontAlgn="base" hangingPunct="0">
-              <a:spcBef>
-                <a:spcPct val="0"/>
-              </a:spcBef>
-              <a:spcAft>
-                <a:spcPct val="0"/>
-              </a:spcAft>
-              <a:defRPr sz="2000" b="1">
-                <a:latin typeface="Arial" charset="0"/>
-              </a:defRPr>
-            </a:lvl2pPr>
-            <a:lvl3pPr eaLnBrk="0" fontAlgn="base" hangingPunct="0">
-              <a:spcBef>
-                <a:spcPct val="0"/>
-              </a:spcBef>
-              <a:spcAft>
-                <a:spcPct val="0"/>
-              </a:spcAft>
-              <a:defRPr sz="2000" b="1">
-                <a:latin typeface="Arial" charset="0"/>
-              </a:defRPr>
-            </a:lvl3pPr>
-            <a:lvl4pPr eaLnBrk="0" fontAlgn="base" hangingPunct="0">
-              <a:spcBef>
-                <a:spcPct val="0"/>
-              </a:spcBef>
-              <a:spcAft>
-                <a:spcPct val="0"/>
-              </a:spcAft>
-              <a:defRPr sz="2000" b="1">
-                <a:latin typeface="Arial" charset="0"/>
-              </a:defRPr>
-            </a:lvl4pPr>
-            <a:lvl5pPr eaLnBrk="0" fontAlgn="base" hangingPunct="0">
-              <a:spcBef>
-                <a:spcPct val="0"/>
-              </a:spcBef>
-              <a:spcAft>
-                <a:spcPct val="0"/>
-              </a:spcAft>
-              <a:defRPr sz="2000" b="1">
-                <a:latin typeface="Arial" charset="0"/>
-              </a:defRPr>
-            </a:lvl5pPr>
-            <a:lvl6pPr marL="457200" fontAlgn="base">
-              <a:spcBef>
-                <a:spcPct val="0"/>
-              </a:spcBef>
-              <a:spcAft>
-                <a:spcPct val="0"/>
-              </a:spcAft>
-              <a:defRPr sz="2000" b="1">
-                <a:latin typeface="Arial" charset="0"/>
-              </a:defRPr>
-            </a:lvl6pPr>
-            <a:lvl7pPr marL="914400" fontAlgn="base">
-              <a:spcBef>
-                <a:spcPct val="0"/>
-              </a:spcBef>
-              <a:spcAft>
-                <a:spcPct val="0"/>
-              </a:spcAft>
-              <a:defRPr sz="2000" b="1">
-                <a:latin typeface="Arial" charset="0"/>
-              </a:defRPr>
-            </a:lvl7pPr>
-            <a:lvl8pPr marL="1371600" fontAlgn="base">
-              <a:spcBef>
-                <a:spcPct val="0"/>
-              </a:spcBef>
-              <a:spcAft>
-                <a:spcPct val="0"/>
-              </a:spcAft>
-              <a:defRPr sz="2000" b="1">
-                <a:latin typeface="Arial" charset="0"/>
-              </a:defRPr>
-            </a:lvl8pPr>
-            <a:lvl9pPr marL="1828800" fontAlgn="base">
-              <a:spcBef>
-                <a:spcPct val="0"/>
-              </a:spcBef>
-              <a:spcAft>
-                <a:spcPct val="0"/>
-              </a:spcAft>
-              <a:defRPr sz="2000" b="1">
-                <a:latin typeface="Arial" charset="0"/>
-              </a:defRPr>
-            </a:lvl9pPr>
-          </a:lstStyle>
-          <a:p>
-            <a:r>
-              <a:rPr lang="en-US" sz="8000" dirty="0" smtClean="0">
-                <a:solidFill>
-                  <a:srgbClr val="3366FF"/>
-                </a:solidFill>
-              </a:rPr>
-              <a:t>#4</a:t>
-            </a:r>
-            <a:endParaRPr lang="en-US" sz="8000" dirty="0">
-              <a:solidFill>
-                <a:srgbClr val="3366FF"/>
-              </a:solidFill>
-            </a:endParaRPr>
-          </a:p>
-        </p:txBody>
-      </p:sp>
-      <p:sp>
-        <p:nvSpPr>
-          <p:cNvPr id="11" name="Title 1"/>
-          <p:cNvSpPr txBox="1">
-            <a:spLocks/>
-          </p:cNvSpPr>
-          <p:nvPr/>
-        </p:nvSpPr>
-        <p:spPr>
-          <a:xfrm>
-            <a:off x="685800" y="2960033"/>
-            <a:ext cx="8001000" cy="2069167"/>
-          </a:xfrm>
-          <a:prstGeom prst="rect">
-            <a:avLst/>
-          </a:prstGeom>
-          <a:noFill/>
-          <a:ln>
-            <a:noFill/>
-          </a:ln>
-          <a:extLst>
-            <a:ext uri="{909E8E84-426E-40DD-AFC4-6F175D3DCCD1}">
-              <a14:hiddenFill xmlns:a14="http://schemas.microsoft.com/office/drawing/2010/main">
-                <a:solidFill>
-                  <a:srgbClr val="FFFFFF"/>
-                </a:solidFill>
-              </a14:hiddenFill>
-            </a:ext>
-            <a:ext uri="{91240B29-F687-4F45-9708-019B960494DF}">
-              <a14:hiddenLine xmlns:a14="http://schemas.microsoft.com/office/drawing/2010/main" w="9525">
-                <a:solidFill>
-                  <a:srgbClr val="000000"/>
-                </a:solidFill>
-                <a:miter lim="800000"/>
-                <a:headEnd/>
-                <a:tailEnd/>
-              </a14:hiddenLine>
-            </a:ext>
-          </a:extLst>
-        </p:spPr>
-        <p:txBody>
-          <a:bodyPr vert="horz" wrap="square" lIns="0" tIns="0" rIns="0" bIns="0" numCol="1" anchor="t" anchorCtr="0" compatLnSpc="1">
-            <a:prstTxWarp prst="textNoShape">
-              <a:avLst/>
-            </a:prstTxWarp>
-          </a:bodyPr>
-          <a:lstStyle>
-            <a:lvl1pPr eaLnBrk="0" fontAlgn="base" hangingPunct="0">
-              <a:spcBef>
-                <a:spcPct val="0"/>
-              </a:spcBef>
-              <a:spcAft>
-                <a:spcPct val="0"/>
-              </a:spcAft>
-              <a:defRPr sz="4000" b="1">
-                <a:solidFill>
-                  <a:schemeClr val="tx1">
-                    <a:lumMod val="85000"/>
-                    <a:lumOff val="15000"/>
-                  </a:schemeClr>
-                </a:solidFill>
-                <a:latin typeface="+mj-lt"/>
-                <a:ea typeface="+mj-ea"/>
-                <a:cs typeface="+mj-cs"/>
-              </a:defRPr>
-            </a:lvl1pPr>
-            <a:lvl2pPr eaLnBrk="0" fontAlgn="base" hangingPunct="0">
-              <a:spcBef>
-                <a:spcPct val="0"/>
-              </a:spcBef>
-              <a:spcAft>
-                <a:spcPct val="0"/>
-              </a:spcAft>
-              <a:defRPr sz="2000" b="1">
-                <a:latin typeface="Arial" charset="0"/>
-              </a:defRPr>
-            </a:lvl2pPr>
-            <a:lvl3pPr eaLnBrk="0" fontAlgn="base" hangingPunct="0">
-              <a:spcBef>
-                <a:spcPct val="0"/>
-              </a:spcBef>
-              <a:spcAft>
-                <a:spcPct val="0"/>
-              </a:spcAft>
-              <a:defRPr sz="2000" b="1">
-                <a:latin typeface="Arial" charset="0"/>
-              </a:defRPr>
-            </a:lvl3pPr>
-            <a:lvl4pPr eaLnBrk="0" fontAlgn="base" hangingPunct="0">
-              <a:spcBef>
-                <a:spcPct val="0"/>
-              </a:spcBef>
-              <a:spcAft>
-                <a:spcPct val="0"/>
-              </a:spcAft>
-              <a:defRPr sz="2000" b="1">
-                <a:latin typeface="Arial" charset="0"/>
-              </a:defRPr>
-            </a:lvl4pPr>
-            <a:lvl5pPr eaLnBrk="0" fontAlgn="base" hangingPunct="0">
-              <a:spcBef>
-                <a:spcPct val="0"/>
-              </a:spcBef>
-              <a:spcAft>
-                <a:spcPct val="0"/>
-              </a:spcAft>
-              <a:defRPr sz="2000" b="1">
-                <a:latin typeface="Arial" charset="0"/>
-              </a:defRPr>
-            </a:lvl5pPr>
-            <a:lvl6pPr marL="457200" fontAlgn="base">
-              <a:spcBef>
-                <a:spcPct val="0"/>
-              </a:spcBef>
-              <a:spcAft>
-                <a:spcPct val="0"/>
-              </a:spcAft>
-              <a:defRPr sz="2000" b="1">
-                <a:latin typeface="Arial" charset="0"/>
-              </a:defRPr>
-            </a:lvl6pPr>
-            <a:lvl7pPr marL="914400" fontAlgn="base">
-              <a:spcBef>
-                <a:spcPct val="0"/>
-              </a:spcBef>
-              <a:spcAft>
-                <a:spcPct val="0"/>
-              </a:spcAft>
-              <a:defRPr sz="2000" b="1">
-                <a:latin typeface="Arial" charset="0"/>
-              </a:defRPr>
-            </a:lvl7pPr>
-            <a:lvl8pPr marL="1371600" fontAlgn="base">
-              <a:spcBef>
-                <a:spcPct val="0"/>
-              </a:spcBef>
-              <a:spcAft>
-                <a:spcPct val="0"/>
-              </a:spcAft>
-              <a:defRPr sz="2000" b="1">
-                <a:latin typeface="Arial" charset="0"/>
-              </a:defRPr>
-            </a:lvl8pPr>
-            <a:lvl9pPr marL="1828800" fontAlgn="base">
-              <a:spcBef>
-                <a:spcPct val="0"/>
-              </a:spcBef>
-              <a:spcAft>
-                <a:spcPct val="0"/>
-              </a:spcAft>
-              <a:defRPr sz="2000" b="1">
-                <a:latin typeface="Arial" charset="0"/>
-              </a:defRPr>
-            </a:lvl9pPr>
-          </a:lstStyle>
-          <a:p>
-            <a:r>
-              <a:rPr lang="en-US" sz="5400" dirty="0" smtClean="0"/>
               <a:t>Python has an organized development community</a:t>
             </a:r>
             <a:endParaRPr lang="en-US" sz="5400" dirty="0"/>
@@ -6151,7 +5839,7 @@
 </p:sld>
 </file>
 
-<file path=ppt/slides/slide15.xml><?xml version="1.0" encoding="utf-8"?>
+<file path=ppt/slides/slide14.xml><?xml version="1.0" encoding="utf-8"?>
 <p:sld xmlns:a="http://schemas.openxmlformats.org/drawingml/2006/main" xmlns:r="http://schemas.openxmlformats.org/officeDocument/2006/relationships" xmlns:p="http://schemas.openxmlformats.org/presentationml/2006/main">
   <p:cSld>
     <p:spTree>
@@ -6236,27 +5924,7 @@
                 <a:latin typeface="Arial" panose="020B0604020202020204" pitchFamily="34" charset="0"/>
                 <a:cs typeface="Arial" panose="020B0604020202020204" pitchFamily="34" charset="0"/>
               </a:rPr>
-              <a:t>In contrast to R, which has 5000+ packages, Python has a smaller and richer </a:t>
-            </a:r>
-            <a:r>
-              <a:rPr lang="en-US" sz="2400" b="1" dirty="0" smtClean="0">
-                <a:solidFill>
-                  <a:schemeClr val="bg1"/>
-                </a:solidFill>
-                <a:latin typeface="Arial" panose="020B0604020202020204" pitchFamily="34" charset="0"/>
-                <a:cs typeface="Arial" panose="020B0604020202020204" pitchFamily="34" charset="0"/>
-              </a:rPr>
-              <a:t>package </a:t>
-            </a:r>
-            <a:r>
-              <a:rPr lang="en-US" sz="2400" b="1" dirty="0" smtClean="0">
-                <a:solidFill>
-                  <a:schemeClr val="bg1"/>
-                </a:solidFill>
-                <a:latin typeface="Arial" panose="020B0604020202020204" pitchFamily="34" charset="0"/>
-                <a:cs typeface="Arial" panose="020B0604020202020204" pitchFamily="34" charset="0"/>
-              </a:rPr>
-              <a:t>ecosystem</a:t>
+              <a:t>In contrast to R, which has 5000+ packages, Python has a smaller and richer package ecosystem</a:t>
             </a:r>
           </a:p>
         </p:txBody>
@@ -8777,7 +8445,7 @@
 </p:sld>
 </file>
 
-<file path=ppt/slides/slide16.xml><?xml version="1.0" encoding="utf-8"?>
+<file path=ppt/slides/slide15.xml><?xml version="1.0" encoding="utf-8"?>
 <p:sld xmlns:a="http://schemas.openxmlformats.org/drawingml/2006/main" xmlns:r="http://schemas.openxmlformats.org/officeDocument/2006/relationships" xmlns:p="http://schemas.openxmlformats.org/presentationml/2006/main">
   <p:cSld>
     <p:spTree>
@@ -9154,17 +8822,32 @@
                 </a:solidFill>
                 <a:latin typeface="+mj-lt"/>
               </a:rPr>
-              <a:t>Why learn python?</a:t>
+              <a:t>Why learn </a:t>
             </a:r>
-            <a:endParaRPr lang="en-US" sz="3200" dirty="0" smtClean="0">
-              <a:solidFill>
-                <a:schemeClr val="tx1">
-                  <a:lumMod val="85000"/>
-                  <a:lumOff val="15000"/>
-                </a:schemeClr>
-              </a:solidFill>
-              <a:latin typeface="+mj-lt"/>
-            </a:endParaRPr>
+            <a:r>
+              <a:rPr lang="en-US" sz="3200" dirty="0" smtClean="0">
+                <a:solidFill>
+                  <a:schemeClr val="tx1">
+                    <a:lumMod val="85000"/>
+                    <a:lumOff val="15000"/>
+                  </a:schemeClr>
+                </a:solidFill>
+                <a:latin typeface="+mj-lt"/>
+              </a:rPr>
+              <a:t>to program in python</a:t>
+            </a:r>
+            <a:r>
+              <a:rPr lang="en-US" sz="3200" dirty="0" smtClean="0">
+                <a:solidFill>
+                  <a:schemeClr val="tx1">
+                    <a:lumMod val="85000"/>
+                    <a:lumOff val="15000"/>
+                  </a:schemeClr>
+                </a:solidFill>
+                <a:latin typeface="+mj-lt"/>
+              </a:rPr>
+              <a:t>?</a:t>
+            </a:r>
           </a:p>
           <a:p>
             <a:pPr>
@@ -9183,29 +8866,8 @@
                 </a:solidFill>
                 <a:latin typeface="+mj-lt"/>
               </a:rPr>
-              <a:t>Code </a:t>
+              <a:t>Code Walkthrough &amp; Exercise</a:t>
             </a:r>
-            <a:r>
-              <a:rPr lang="en-US" sz="3200" dirty="0" smtClean="0">
-                <a:solidFill>
-                  <a:schemeClr val="tx1">
-                    <a:lumMod val="85000"/>
-                    <a:lumOff val="15000"/>
-                  </a:schemeClr>
-                </a:solidFill>
-                <a:latin typeface="+mj-lt"/>
-              </a:rPr>
-              <a:t>Walkthrough &amp; Exercise</a:t>
-            </a:r>
-            <a:endParaRPr lang="en-US" sz="3200" dirty="0" smtClean="0">
-              <a:solidFill>
-                <a:schemeClr val="tx1">
-                  <a:lumMod val="85000"/>
-                  <a:lumOff val="15000"/>
-                </a:schemeClr>
-              </a:solidFill>
-              <a:latin typeface="+mj-lt"/>
-            </a:endParaRPr>
           </a:p>
         </p:txBody>
       </p:sp>
@@ -9477,8 +9139,8 @@
         </p:nvSpPr>
         <p:spPr>
           <a:xfrm>
-            <a:off x="685800" y="685800"/>
-            <a:ext cx="7863840" cy="1754326"/>
+            <a:off x="4234964" y="417856"/>
+            <a:ext cx="4376019" cy="2677656"/>
           </a:xfrm>
           <a:prstGeom prst="rect">
             <a:avLst/>
@@ -9491,16 +9153,54 @@
           </a:bodyPr>
           <a:lstStyle/>
           <a:p>
-            <a:pPr algn="ctr"/>
+            <a:pPr>
+              <a:lnSpc>
+                <a:spcPct val="120000"/>
+              </a:lnSpc>
+            </a:pPr>
             <a:r>
-              <a:rPr lang="en-US" sz="3600" dirty="0" smtClean="0">
+              <a:rPr lang="en-US" sz="2800" i="1" dirty="0" smtClean="0">
                 <a:solidFill>
                   <a:prstClr val="black"/>
                 </a:solidFill>
                 <a:latin typeface="Arial" panose="020B0604020202020204" pitchFamily="34" charset="0"/>
                 <a:cs typeface="Arial" panose="020B0604020202020204" pitchFamily="34" charset="0"/>
               </a:rPr>
-              <a:t>Data analysis is the process by which data becomes understanding, knowledge and insight.</a:t>
+              <a:t>Data analysis is the process by which data becomes understanding, knowledge and insight. </a:t>
+            </a:r>
+            <a:endParaRPr lang="en-US" sz="2800" dirty="0">
+              <a:solidFill>
+                <a:prstClr val="black"/>
+              </a:solidFill>
+              <a:latin typeface="Arial" panose="020B0604020202020204" pitchFamily="34" charset="0"/>
+              <a:cs typeface="Arial" panose="020B0604020202020204" pitchFamily="34" charset="0"/>
+            </a:endParaRPr>
+          </a:p>
+          <a:p>
+            <a:pPr>
+              <a:lnSpc>
+                <a:spcPct val="120000"/>
+              </a:lnSpc>
+            </a:pPr>
+            <a:r>
+              <a:rPr lang="en-US" sz="2800" dirty="0" smtClean="0">
+                <a:solidFill>
+                  <a:srgbClr val="2E9626"/>
+                </a:solidFill>
+                <a:latin typeface="Arial" panose="020B0604020202020204" pitchFamily="34" charset="0"/>
+                <a:cs typeface="Arial" panose="020B0604020202020204" pitchFamily="34" charset="0"/>
+              </a:rPr>
+              <a:t>Hadley </a:t>
+            </a:r>
+            <a:r>
+              <a:rPr lang="en-US" sz="2800" dirty="0" smtClean="0">
+                <a:solidFill>
+                  <a:srgbClr val="2E9626"/>
+                </a:solidFill>
+                <a:latin typeface="Arial" panose="020B0604020202020204" pitchFamily="34" charset="0"/>
+                <a:cs typeface="Arial" panose="020B0604020202020204" pitchFamily="34" charset="0"/>
+              </a:rPr>
+              <a:t>Wickham</a:t>
             </a:r>
           </a:p>
         </p:txBody>
@@ -9513,7 +9213,7 @@
           </p:cNvPicPr>
           <p:nvPr/>
         </p:nvPicPr>
-        <p:blipFill>
+        <p:blipFill rotWithShape="1">
           <a:blip r:embed="rId3">
             <a:extLst>
               <a:ext uri="{28A0092B-C50C-407E-A947-70E740481C1C}">
@@ -9521,15 +9221,13 @@
               </a:ext>
             </a:extLst>
           </a:blip>
-          <a:srcRect/>
-          <a:stretch>
-            <a:fillRect/>
-          </a:stretch>
+          <a:srcRect l="17190" r="23733"/>
+          <a:stretch/>
         </p:blipFill>
         <p:spPr bwMode="auto">
           <a:xfrm>
-            <a:off x="3177822" y="2634016"/>
-            <a:ext cx="2852500" cy="2991956"/>
+            <a:off x="-19050" y="0"/>
+            <a:ext cx="3862680" cy="6858000"/>
           </a:xfrm>
           <a:prstGeom prst="rect">
             <a:avLst/>
@@ -9548,35 +9246,58 @@
       </p:pic>
       <p:sp>
         <p:nvSpPr>
-          <p:cNvPr id="3" name="Rectangle 2"/>
-          <p:cNvSpPr/>
+          <p:cNvPr id="18" name="TextBox 17"/>
+          <p:cNvSpPr txBox="1"/>
           <p:nvPr/>
         </p:nvSpPr>
         <p:spPr>
           <a:xfrm>
-            <a:off x="3126767" y="5879068"/>
-            <a:ext cx="2981907" cy="523220"/>
+            <a:off x="4234964" y="3276600"/>
+            <a:ext cx="3962400" cy="3062377"/>
           </a:xfrm>
           <a:prstGeom prst="rect">
             <a:avLst/>
           </a:prstGeom>
+          <a:noFill/>
         </p:spPr>
         <p:txBody>
-          <a:bodyPr wrap="none">
+          <a:bodyPr wrap="square" rtlCol="0">
             <a:spAutoFit/>
           </a:bodyPr>
           <a:lstStyle/>
           <a:p>
+            <a:pPr marL="693738" indent="-630238">
+              <a:spcBef>
+                <a:spcPts val="300"/>
+              </a:spcBef>
+              <a:spcAft>
+                <a:spcPts val="300"/>
+              </a:spcAft>
+              <a:buFont typeface="+mj-lt"/>
+              <a:buAutoNum type="arabicPeriod"/>
+            </a:pPr>
             <a:r>
-              <a:rPr lang="en-US" sz="2800" dirty="0">
+              <a:rPr lang="en-US" sz="2800" dirty="0" smtClean="0">
                 <a:solidFill>
                   <a:prstClr val="black"/>
                 </a:solidFill>
                 <a:latin typeface="Arial" panose="020B0604020202020204" pitchFamily="34" charset="0"/>
                 <a:cs typeface="Arial" panose="020B0604020202020204" pitchFamily="34" charset="0"/>
               </a:rPr>
-              <a:t>Hadley </a:t>
+              <a:t>Define</a:t>
             </a:r>
+          </a:p>
+          <a:p>
+            <a:pPr marL="693738" indent="-630238">
+              <a:spcBef>
+                <a:spcPts val="300"/>
+              </a:spcBef>
+              <a:spcAft>
+                <a:spcPts val="300"/>
+              </a:spcAft>
+              <a:buFont typeface="+mj-lt"/>
+              <a:buAutoNum type="arabicPeriod"/>
+            </a:pPr>
             <a:r>
               <a:rPr lang="en-US" sz="2800" dirty="0" smtClean="0">
                 <a:solidFill>
@@ -9585,16 +9306,103 @@
                 <a:latin typeface="Arial" panose="020B0604020202020204" pitchFamily="34" charset="0"/>
                 <a:cs typeface="Arial" panose="020B0604020202020204" pitchFamily="34" charset="0"/>
               </a:rPr>
-              <a:t>Wickham </a:t>
+              <a:t>Collect</a:t>
             </a:r>
-            <a:endParaRPr lang="en-US" sz="2800" dirty="0"/>
+          </a:p>
+          <a:p>
+            <a:pPr marL="693738" indent="-630238">
+              <a:spcBef>
+                <a:spcPts val="300"/>
+              </a:spcBef>
+              <a:spcAft>
+                <a:spcPts val="300"/>
+              </a:spcAft>
+              <a:buFont typeface="+mj-lt"/>
+              <a:buAutoNum type="arabicPeriod"/>
+            </a:pPr>
+            <a:r>
+              <a:rPr lang="en-US" sz="2800" dirty="0">
+                <a:solidFill>
+                  <a:prstClr val="black"/>
+                </a:solidFill>
+                <a:latin typeface="Arial" panose="020B0604020202020204" pitchFamily="34" charset="0"/>
+                <a:cs typeface="Arial" panose="020B0604020202020204" pitchFamily="34" charset="0"/>
+              </a:rPr>
+              <a:t>Transform</a:t>
+            </a:r>
+          </a:p>
+          <a:p>
+            <a:pPr marL="693738" indent="-630238">
+              <a:spcBef>
+                <a:spcPts val="300"/>
+              </a:spcBef>
+              <a:spcAft>
+                <a:spcPts val="300"/>
+              </a:spcAft>
+              <a:buFont typeface="+mj-lt"/>
+              <a:buAutoNum type="arabicPeriod"/>
+            </a:pPr>
+            <a:r>
+              <a:rPr lang="en-US" sz="2800" dirty="0" smtClean="0">
+                <a:solidFill>
+                  <a:prstClr val="black"/>
+                </a:solidFill>
+                <a:latin typeface="Arial" panose="020B0604020202020204" pitchFamily="34" charset="0"/>
+                <a:cs typeface="Arial" panose="020B0604020202020204" pitchFamily="34" charset="0"/>
+              </a:rPr>
+              <a:t>Explore</a:t>
+            </a:r>
+          </a:p>
+          <a:p>
+            <a:pPr marL="693738" indent="-630238">
+              <a:spcBef>
+                <a:spcPts val="300"/>
+              </a:spcBef>
+              <a:spcAft>
+                <a:spcPts val="300"/>
+              </a:spcAft>
+              <a:buFont typeface="+mj-lt"/>
+              <a:buAutoNum type="arabicPeriod"/>
+            </a:pPr>
+            <a:r>
+              <a:rPr lang="en-US" sz="2800" dirty="0" smtClean="0">
+                <a:solidFill>
+                  <a:prstClr val="black"/>
+                </a:solidFill>
+                <a:latin typeface="Arial" panose="020B0604020202020204" pitchFamily="34" charset="0"/>
+                <a:cs typeface="Arial" panose="020B0604020202020204" pitchFamily="34" charset="0"/>
+              </a:rPr>
+              <a:t>Model</a:t>
+            </a:r>
+          </a:p>
+          <a:p>
+            <a:pPr marL="693738" indent="-630238">
+              <a:spcBef>
+                <a:spcPts val="300"/>
+              </a:spcBef>
+              <a:spcAft>
+                <a:spcPts val="300"/>
+              </a:spcAft>
+              <a:buFont typeface="+mj-lt"/>
+              <a:buAutoNum type="arabicPeriod"/>
+            </a:pPr>
+            <a:r>
+              <a:rPr lang="en-US" sz="2800" dirty="0" smtClean="0">
+                <a:solidFill>
+                  <a:prstClr val="black"/>
+                </a:solidFill>
+                <a:latin typeface="Arial" panose="020B0604020202020204" pitchFamily="34" charset="0"/>
+                <a:cs typeface="Arial" panose="020B0604020202020204" pitchFamily="34" charset="0"/>
+              </a:rPr>
+              <a:t>Communicate</a:t>
+            </a:r>
           </a:p>
         </p:txBody>
       </p:sp>
     </p:spTree>
     <p:extLst>
       <p:ext uri="{BB962C8B-B14F-4D97-AF65-F5344CB8AC3E}">
-        <p14:creationId xmlns:p14="http://schemas.microsoft.com/office/powerpoint/2010/main" val="1999481825"/>
+        <p14:creationId xmlns:p14="http://schemas.microsoft.com/office/powerpoint/2010/main" val="763221270"/>
       </p:ext>
     </p:extLst>
   </p:cSld>
@@ -9612,216 +9420,6 @@
 </file>
 
 <file path=ppt/slides/slide5.xml><?xml version="1.0" encoding="utf-8"?>
-<p:sld xmlns:a="http://schemas.openxmlformats.org/drawingml/2006/main" xmlns:r="http://schemas.openxmlformats.org/officeDocument/2006/relationships" xmlns:p="http://schemas.openxmlformats.org/presentationml/2006/main">
-  <p:cSld>
-    <p:spTree>
-      <p:nvGrpSpPr>
-        <p:cNvPr id="1" name=""/>
-        <p:cNvGrpSpPr/>
-        <p:nvPr/>
-      </p:nvGrpSpPr>
-      <p:grpSpPr>
-        <a:xfrm>
-          <a:off x="0" y="0"/>
-          <a:ext cx="0" cy="0"/>
-          <a:chOff x="0" y="0"/>
-          <a:chExt cx="0" cy="0"/>
-        </a:xfrm>
-      </p:grpSpPr>
-      <p:sp>
-        <p:nvSpPr>
-          <p:cNvPr id="5" name="TextBox 4"/>
-          <p:cNvSpPr txBox="1"/>
-          <p:nvPr/>
-        </p:nvSpPr>
-        <p:spPr>
-          <a:xfrm>
-            <a:off x="685800" y="1219200"/>
-            <a:ext cx="7863840" cy="4185761"/>
-          </a:xfrm>
-          <a:prstGeom prst="rect">
-            <a:avLst/>
-          </a:prstGeom>
-          <a:noFill/>
-        </p:spPr>
-        <p:txBody>
-          <a:bodyPr wrap="square" rtlCol="0">
-            <a:spAutoFit/>
-          </a:bodyPr>
-          <a:lstStyle/>
-          <a:p>
-            <a:pPr marL="693738" indent="-630238">
-              <a:spcBef>
-                <a:spcPts val="600"/>
-              </a:spcBef>
-              <a:spcAft>
-                <a:spcPts val="600"/>
-              </a:spcAft>
-              <a:buClr>
-                <a:srgbClr val="2E9626"/>
-              </a:buClr>
-              <a:buFont typeface="+mj-lt"/>
-              <a:buAutoNum type="arabicPeriod"/>
-            </a:pPr>
-            <a:r>
-              <a:rPr lang="en-US" sz="3600" dirty="0" smtClean="0">
-                <a:solidFill>
-                  <a:prstClr val="black"/>
-                </a:solidFill>
-                <a:latin typeface="Arial" panose="020B0604020202020204" pitchFamily="34" charset="0"/>
-                <a:cs typeface="Arial" panose="020B0604020202020204" pitchFamily="34" charset="0"/>
-              </a:rPr>
-              <a:t>Define</a:t>
-            </a:r>
-          </a:p>
-          <a:p>
-            <a:pPr marL="693738" indent="-630238">
-              <a:spcBef>
-                <a:spcPts val="600"/>
-              </a:spcBef>
-              <a:spcAft>
-                <a:spcPts val="600"/>
-              </a:spcAft>
-              <a:buClr>
-                <a:srgbClr val="2E9626"/>
-              </a:buClr>
-              <a:buFont typeface="+mj-lt"/>
-              <a:buAutoNum type="arabicPeriod"/>
-            </a:pPr>
-            <a:r>
-              <a:rPr lang="en-US" sz="3600" dirty="0" smtClean="0">
-                <a:solidFill>
-                  <a:prstClr val="black"/>
-                </a:solidFill>
-                <a:latin typeface="Arial" panose="020B0604020202020204" pitchFamily="34" charset="0"/>
-                <a:cs typeface="Arial" panose="020B0604020202020204" pitchFamily="34" charset="0"/>
-              </a:rPr>
-              <a:t>Collect</a:t>
-            </a:r>
-          </a:p>
-          <a:p>
-            <a:pPr marL="693738" indent="-630238">
-              <a:spcBef>
-                <a:spcPts val="600"/>
-              </a:spcBef>
-              <a:spcAft>
-                <a:spcPts val="600"/>
-              </a:spcAft>
-              <a:buClr>
-                <a:srgbClr val="2E9626"/>
-              </a:buClr>
-              <a:buFont typeface="+mj-lt"/>
-              <a:buAutoNum type="arabicPeriod"/>
-            </a:pPr>
-            <a:r>
-              <a:rPr lang="en-US" sz="3600" dirty="0">
-                <a:solidFill>
-                  <a:prstClr val="black"/>
-                </a:solidFill>
-                <a:latin typeface="Arial" panose="020B0604020202020204" pitchFamily="34" charset="0"/>
-                <a:cs typeface="Arial" panose="020B0604020202020204" pitchFamily="34" charset="0"/>
-              </a:rPr>
-              <a:t>Transform</a:t>
-            </a:r>
-          </a:p>
-          <a:p>
-            <a:pPr marL="693738" indent="-630238">
-              <a:spcBef>
-                <a:spcPts val="600"/>
-              </a:spcBef>
-              <a:spcAft>
-                <a:spcPts val="600"/>
-              </a:spcAft>
-              <a:buClr>
-                <a:srgbClr val="2E9626"/>
-              </a:buClr>
-              <a:buFont typeface="+mj-lt"/>
-              <a:buAutoNum type="arabicPeriod"/>
-            </a:pPr>
-            <a:r>
-              <a:rPr lang="en-US" sz="3600" dirty="0" smtClean="0">
-                <a:solidFill>
-                  <a:prstClr val="black"/>
-                </a:solidFill>
-                <a:latin typeface="Arial" panose="020B0604020202020204" pitchFamily="34" charset="0"/>
-                <a:cs typeface="Arial" panose="020B0604020202020204" pitchFamily="34" charset="0"/>
-              </a:rPr>
-              <a:t>Explore</a:t>
-            </a:r>
-          </a:p>
-          <a:p>
-            <a:pPr marL="693738" indent="-630238">
-              <a:spcBef>
-                <a:spcPts val="600"/>
-              </a:spcBef>
-              <a:spcAft>
-                <a:spcPts val="600"/>
-              </a:spcAft>
-              <a:buClr>
-                <a:srgbClr val="2E9626"/>
-              </a:buClr>
-              <a:buFont typeface="+mj-lt"/>
-              <a:buAutoNum type="arabicPeriod"/>
-            </a:pPr>
-            <a:r>
-              <a:rPr lang="en-US" sz="3600" dirty="0" smtClean="0">
-                <a:solidFill>
-                  <a:prstClr val="black"/>
-                </a:solidFill>
-                <a:latin typeface="Arial" panose="020B0604020202020204" pitchFamily="34" charset="0"/>
-                <a:cs typeface="Arial" panose="020B0604020202020204" pitchFamily="34" charset="0"/>
-              </a:rPr>
-              <a:t>Model</a:t>
-            </a:r>
-          </a:p>
-          <a:p>
-            <a:pPr marL="693738" indent="-630238">
-              <a:spcBef>
-                <a:spcPts val="600"/>
-              </a:spcBef>
-              <a:spcAft>
-                <a:spcPts val="600"/>
-              </a:spcAft>
-              <a:buClr>
-                <a:srgbClr val="2E9626"/>
-              </a:buClr>
-              <a:buFont typeface="+mj-lt"/>
-              <a:buAutoNum type="arabicPeriod"/>
-            </a:pPr>
-            <a:r>
-              <a:rPr lang="en-US" sz="3600" dirty="0" smtClean="0">
-                <a:solidFill>
-                  <a:prstClr val="black"/>
-                </a:solidFill>
-                <a:latin typeface="Arial" panose="020B0604020202020204" pitchFamily="34" charset="0"/>
-                <a:cs typeface="Arial" panose="020B0604020202020204" pitchFamily="34" charset="0"/>
-              </a:rPr>
-              <a:t>Communicate</a:t>
-            </a:r>
-          </a:p>
-        </p:txBody>
-      </p:sp>
-    </p:spTree>
-    <p:extLst>
-      <p:ext uri="{BB962C8B-B14F-4D97-AF65-F5344CB8AC3E}">
-        <p14:creationId xmlns:p14="http://schemas.microsoft.com/office/powerpoint/2010/main" val="3635945441"/>
-      </p:ext>
-    </p:extLst>
-  </p:cSld>
-  <p:clrMapOvr>
-    <a:masterClrMapping/>
-  </p:clrMapOvr>
-  <p:timing>
-    <p:tnLst>
-      <p:par>
-        <p:cTn id="1" dur="indefinite" restart="never" nodeType="tmRoot"/>
-      </p:par>
-    </p:tnLst>
-  </p:timing>
-</p:sld>
-</file>
-
-<file path=ppt/slides/slide6.xml><?xml version="1.0" encoding="utf-8"?>
 <p:sld xmlns:a="http://schemas.openxmlformats.org/drawingml/2006/main" xmlns:r="http://schemas.openxmlformats.org/officeDocument/2006/relationships" xmlns:p="http://schemas.openxmlformats.org/presentationml/2006/main">
   <p:cSld>
     <p:spTree>
@@ -10018,6 +9616,379 @@
     <p:extLst>
       <p:ext uri="{BB962C8B-B14F-4D97-AF65-F5344CB8AC3E}">
         <p14:creationId xmlns:p14="http://schemas.microsoft.com/office/powerpoint/2010/main" val="4065884192"/>
+      </p:ext>
+    </p:extLst>
+  </p:cSld>
+  <p:clrMapOvr>
+    <a:masterClrMapping/>
+  </p:clrMapOvr>
+  <p:timing>
+    <p:tnLst>
+      <p:par>
+        <p:cTn id="1" dur="indefinite" restart="never" nodeType="tmRoot"/>
+      </p:par>
+    </p:tnLst>
+  </p:timing>
+</p:sld>
+</file>
+
+<file path=ppt/slides/slide6.xml><?xml version="1.0" encoding="utf-8"?>
+<p:sld xmlns:a="http://schemas.openxmlformats.org/drawingml/2006/main" xmlns:r="http://schemas.openxmlformats.org/officeDocument/2006/relationships" xmlns:p="http://schemas.openxmlformats.org/presentationml/2006/main">
+  <p:cSld>
+    <p:spTree>
+      <p:nvGrpSpPr>
+        <p:cNvPr id="1" name=""/>
+        <p:cNvGrpSpPr/>
+        <p:nvPr/>
+      </p:nvGrpSpPr>
+      <p:grpSpPr>
+        <a:xfrm>
+          <a:off x="0" y="0"/>
+          <a:ext cx="0" cy="0"/>
+          <a:chOff x="0" y="0"/>
+          <a:chExt cx="0" cy="0"/>
+        </a:xfrm>
+      </p:grpSpPr>
+      <p:sp>
+        <p:nvSpPr>
+          <p:cNvPr id="10" name="Title 1"/>
+          <p:cNvSpPr txBox="1">
+            <a:spLocks/>
+          </p:cNvSpPr>
+          <p:nvPr/>
+        </p:nvSpPr>
+        <p:spPr>
+          <a:xfrm>
+            <a:off x="762000" y="1676400"/>
+            <a:ext cx="3581400" cy="1248614"/>
+          </a:xfrm>
+          <a:prstGeom prst="rect">
+            <a:avLst/>
+          </a:prstGeom>
+          <a:noFill/>
+          <a:ln>
+            <a:noFill/>
+          </a:ln>
+          <a:extLst>
+            <a:ext uri="{909E8E84-426E-40DD-AFC4-6F175D3DCCD1}">
+              <a14:hiddenFill xmlns:a14="http://schemas.microsoft.com/office/drawing/2010/main">
+                <a:solidFill>
+                  <a:srgbClr val="FFFFFF"/>
+                </a:solidFill>
+              </a14:hiddenFill>
+            </a:ext>
+            <a:ext uri="{91240B29-F687-4F45-9708-019B960494DF}">
+              <a14:hiddenLine xmlns:a14="http://schemas.microsoft.com/office/drawing/2010/main" w="9525">
+                <a:solidFill>
+                  <a:srgbClr val="000000"/>
+                </a:solidFill>
+                <a:miter lim="800000"/>
+                <a:headEnd/>
+                <a:tailEnd/>
+              </a14:hiddenLine>
+            </a:ext>
+          </a:extLst>
+        </p:spPr>
+        <p:txBody>
+          <a:bodyPr vert="horz" wrap="square" lIns="0" tIns="0" rIns="0" bIns="0" numCol="1" anchor="ctr" anchorCtr="0" compatLnSpc="1">
+            <a:prstTxWarp prst="textNoShape">
+              <a:avLst/>
+            </a:prstTxWarp>
+          </a:bodyPr>
+          <a:lstStyle>
+            <a:lvl1pPr eaLnBrk="0" fontAlgn="base" hangingPunct="0">
+              <a:spcBef>
+                <a:spcPct val="0"/>
+              </a:spcBef>
+              <a:spcAft>
+                <a:spcPct val="0"/>
+              </a:spcAft>
+              <a:defRPr sz="4000" b="1">
+                <a:solidFill>
+                  <a:schemeClr val="tx1">
+                    <a:lumMod val="85000"/>
+                    <a:lumOff val="15000"/>
+                  </a:schemeClr>
+                </a:solidFill>
+                <a:latin typeface="+mj-lt"/>
+                <a:ea typeface="+mj-ea"/>
+                <a:cs typeface="+mj-cs"/>
+              </a:defRPr>
+            </a:lvl1pPr>
+            <a:lvl2pPr eaLnBrk="0" fontAlgn="base" hangingPunct="0">
+              <a:spcBef>
+                <a:spcPct val="0"/>
+              </a:spcBef>
+              <a:spcAft>
+                <a:spcPct val="0"/>
+              </a:spcAft>
+              <a:defRPr sz="2000" b="1">
+                <a:latin typeface="Arial" charset="0"/>
+              </a:defRPr>
+            </a:lvl2pPr>
+            <a:lvl3pPr eaLnBrk="0" fontAlgn="base" hangingPunct="0">
+              <a:spcBef>
+                <a:spcPct val="0"/>
+              </a:spcBef>
+              <a:spcAft>
+                <a:spcPct val="0"/>
+              </a:spcAft>
+              <a:defRPr sz="2000" b="1">
+                <a:latin typeface="Arial" charset="0"/>
+              </a:defRPr>
+            </a:lvl3pPr>
+            <a:lvl4pPr eaLnBrk="0" fontAlgn="base" hangingPunct="0">
+              <a:spcBef>
+                <a:spcPct val="0"/>
+              </a:spcBef>
+              <a:spcAft>
+                <a:spcPct val="0"/>
+              </a:spcAft>
+              <a:defRPr sz="2000" b="1">
+                <a:latin typeface="Arial" charset="0"/>
+              </a:defRPr>
+            </a:lvl4pPr>
+            <a:lvl5pPr eaLnBrk="0" fontAlgn="base" hangingPunct="0">
+              <a:spcBef>
+                <a:spcPct val="0"/>
+              </a:spcBef>
+              <a:spcAft>
+                <a:spcPct val="0"/>
+              </a:spcAft>
+              <a:defRPr sz="2000" b="1">
+                <a:latin typeface="Arial" charset="0"/>
+              </a:defRPr>
+            </a:lvl5pPr>
+            <a:lvl6pPr marL="457200" fontAlgn="base">
+              <a:spcBef>
+                <a:spcPct val="0"/>
+              </a:spcBef>
+              <a:spcAft>
+                <a:spcPct val="0"/>
+              </a:spcAft>
+              <a:defRPr sz="2000" b="1">
+                <a:latin typeface="Arial" charset="0"/>
+              </a:defRPr>
+            </a:lvl6pPr>
+            <a:lvl7pPr marL="914400" fontAlgn="base">
+              <a:spcBef>
+                <a:spcPct val="0"/>
+              </a:spcBef>
+              <a:spcAft>
+                <a:spcPct val="0"/>
+              </a:spcAft>
+              <a:defRPr sz="2000" b="1">
+                <a:latin typeface="Arial" charset="0"/>
+              </a:defRPr>
+            </a:lvl7pPr>
+            <a:lvl8pPr marL="1371600" fontAlgn="base">
+              <a:spcBef>
+                <a:spcPct val="0"/>
+              </a:spcBef>
+              <a:spcAft>
+                <a:spcPct val="0"/>
+              </a:spcAft>
+              <a:defRPr sz="2000" b="1">
+                <a:latin typeface="Arial" charset="0"/>
+              </a:defRPr>
+            </a:lvl8pPr>
+            <a:lvl9pPr marL="1828800" fontAlgn="base">
+              <a:spcBef>
+                <a:spcPct val="0"/>
+              </a:spcBef>
+              <a:spcAft>
+                <a:spcPct val="0"/>
+              </a:spcAft>
+              <a:defRPr sz="2000" b="1">
+                <a:latin typeface="Arial" charset="0"/>
+              </a:defRPr>
+            </a:lvl9pPr>
+          </a:lstStyle>
+          <a:p>
+            <a:r>
+              <a:rPr lang="en-US" sz="8000" dirty="0" smtClean="0">
+                <a:solidFill>
+                  <a:srgbClr val="D62728"/>
+                </a:solidFill>
+              </a:rPr>
+              <a:t>#1</a:t>
+            </a:r>
+            <a:endParaRPr lang="en-US" sz="8000" dirty="0">
+              <a:solidFill>
+                <a:srgbClr val="D62728"/>
+              </a:solidFill>
+            </a:endParaRPr>
+          </a:p>
+        </p:txBody>
+      </p:sp>
+      <p:sp>
+        <p:nvSpPr>
+          <p:cNvPr id="11" name="Title 1"/>
+          <p:cNvSpPr txBox="1">
+            <a:spLocks/>
+          </p:cNvSpPr>
+          <p:nvPr/>
+        </p:nvSpPr>
+        <p:spPr>
+          <a:xfrm>
+            <a:off x="685800" y="2906508"/>
+            <a:ext cx="8001000" cy="2503692"/>
+          </a:xfrm>
+          <a:prstGeom prst="rect">
+            <a:avLst/>
+          </a:prstGeom>
+          <a:noFill/>
+          <a:ln>
+            <a:noFill/>
+          </a:ln>
+          <a:extLst>
+            <a:ext uri="{909E8E84-426E-40DD-AFC4-6F175D3DCCD1}">
+              <a14:hiddenFill xmlns:a14="http://schemas.microsoft.com/office/drawing/2010/main">
+                <a:solidFill>
+                  <a:srgbClr val="FFFFFF"/>
+                </a:solidFill>
+              </a14:hiddenFill>
+            </a:ext>
+            <a:ext uri="{91240B29-F687-4F45-9708-019B960494DF}">
+              <a14:hiddenLine xmlns:a14="http://schemas.microsoft.com/office/drawing/2010/main" w="9525">
+                <a:solidFill>
+                  <a:srgbClr val="000000"/>
+                </a:solidFill>
+                <a:miter lim="800000"/>
+                <a:headEnd/>
+                <a:tailEnd/>
+              </a14:hiddenLine>
+            </a:ext>
+          </a:extLst>
+        </p:spPr>
+        <p:txBody>
+          <a:bodyPr vert="horz" wrap="square" lIns="0" tIns="0" rIns="0" bIns="0" numCol="1" anchor="t" anchorCtr="0" compatLnSpc="1">
+            <a:prstTxWarp prst="textNoShape">
+              <a:avLst/>
+            </a:prstTxWarp>
+          </a:bodyPr>
+          <a:lstStyle>
+            <a:lvl1pPr eaLnBrk="0" fontAlgn="base" hangingPunct="0">
+              <a:spcBef>
+                <a:spcPct val="0"/>
+              </a:spcBef>
+              <a:spcAft>
+                <a:spcPct val="0"/>
+              </a:spcAft>
+              <a:defRPr sz="4000" b="1">
+                <a:solidFill>
+                  <a:schemeClr val="tx1">
+                    <a:lumMod val="85000"/>
+                    <a:lumOff val="15000"/>
+                  </a:schemeClr>
+                </a:solidFill>
+                <a:latin typeface="+mj-lt"/>
+                <a:ea typeface="+mj-ea"/>
+                <a:cs typeface="+mj-cs"/>
+              </a:defRPr>
+            </a:lvl1pPr>
+            <a:lvl2pPr eaLnBrk="0" fontAlgn="base" hangingPunct="0">
+              <a:spcBef>
+                <a:spcPct val="0"/>
+              </a:spcBef>
+              <a:spcAft>
+                <a:spcPct val="0"/>
+              </a:spcAft>
+              <a:defRPr sz="2000" b="1">
+                <a:latin typeface="Arial" charset="0"/>
+              </a:defRPr>
+            </a:lvl2pPr>
+            <a:lvl3pPr eaLnBrk="0" fontAlgn="base" hangingPunct="0">
+              <a:spcBef>
+                <a:spcPct val="0"/>
+              </a:spcBef>
+              <a:spcAft>
+                <a:spcPct val="0"/>
+              </a:spcAft>
+              <a:defRPr sz="2000" b="1">
+                <a:latin typeface="Arial" charset="0"/>
+              </a:defRPr>
+            </a:lvl3pPr>
+            <a:lvl4pPr eaLnBrk="0" fontAlgn="base" hangingPunct="0">
+              <a:spcBef>
+                <a:spcPct val="0"/>
+              </a:spcBef>
+              <a:spcAft>
+                <a:spcPct val="0"/>
+              </a:spcAft>
+              <a:defRPr sz="2000" b="1">
+                <a:latin typeface="Arial" charset="0"/>
+              </a:defRPr>
+            </a:lvl4pPr>
+            <a:lvl5pPr eaLnBrk="0" fontAlgn="base" hangingPunct="0">
+              <a:spcBef>
+                <a:spcPct val="0"/>
+              </a:spcBef>
+              <a:spcAft>
+                <a:spcPct val="0"/>
+              </a:spcAft>
+              <a:defRPr sz="2000" b="1">
+                <a:latin typeface="Arial" charset="0"/>
+              </a:defRPr>
+            </a:lvl5pPr>
+            <a:lvl6pPr marL="457200" fontAlgn="base">
+              <a:spcBef>
+                <a:spcPct val="0"/>
+              </a:spcBef>
+              <a:spcAft>
+                <a:spcPct val="0"/>
+              </a:spcAft>
+              <a:defRPr sz="2000" b="1">
+                <a:latin typeface="Arial" charset="0"/>
+              </a:defRPr>
+            </a:lvl6pPr>
+            <a:lvl7pPr marL="914400" fontAlgn="base">
+              <a:spcBef>
+                <a:spcPct val="0"/>
+              </a:spcBef>
+              <a:spcAft>
+                <a:spcPct val="0"/>
+              </a:spcAft>
+              <a:defRPr sz="2000" b="1">
+                <a:latin typeface="Arial" charset="0"/>
+              </a:defRPr>
+            </a:lvl7pPr>
+            <a:lvl8pPr marL="1371600" fontAlgn="base">
+              <a:spcBef>
+                <a:spcPct val="0"/>
+              </a:spcBef>
+              <a:spcAft>
+                <a:spcPct val="0"/>
+              </a:spcAft>
+              <a:defRPr sz="2000" b="1">
+                <a:latin typeface="Arial" charset="0"/>
+              </a:defRPr>
+            </a:lvl8pPr>
+            <a:lvl9pPr marL="1828800" fontAlgn="base">
+              <a:spcBef>
+                <a:spcPct val="0"/>
+              </a:spcBef>
+              <a:spcAft>
+                <a:spcPct val="0"/>
+              </a:spcAft>
+              <a:defRPr sz="2000" b="1">
+                <a:latin typeface="Arial" charset="0"/>
+              </a:defRPr>
+            </a:lvl9pPr>
+          </a:lstStyle>
+          <a:p>
+            <a:r>
+              <a:rPr lang="en-US" sz="5400" dirty="0" smtClean="0"/>
+              <a:t>Provides liberation to analyze data on its own terms</a:t>
+            </a:r>
+            <a:endParaRPr lang="en-US" sz="5400" dirty="0"/>
+          </a:p>
+        </p:txBody>
+      </p:sp>
+    </p:spTree>
+    <p:extLst>
+      <p:ext uri="{BB962C8B-B14F-4D97-AF65-F5344CB8AC3E}">
+        <p14:creationId xmlns:p14="http://schemas.microsoft.com/office/powerpoint/2010/main" val="1360115604"/>
       </p:ext>
     </p:extLst>
   </p:cSld>
@@ -10213,7 +10184,7 @@
                   <a:srgbClr val="D62728"/>
                 </a:solidFill>
               </a:rPr>
-              <a:t>#1</a:t>
+              <a:t>#2</a:t>
             </a:r>
             <a:endParaRPr lang="en-US" sz="8000" dirty="0">
               <a:solidFill>
@@ -10381,7 +10352,7 @@
           <a:p>
             <a:r>
               <a:rPr lang="en-US" sz="5400" dirty="0" smtClean="0"/>
-              <a:t>Provides liberation to analyze data on its own terms</a:t>
+              <a:t>Provokes knowledge sharing and reproducibility</a:t>
             </a:r>
             <a:endParaRPr lang="en-US" sz="5400" dirty="0"/>
           </a:p>
@@ -10390,7 +10361,7 @@
     </p:spTree>
     <p:extLst>
       <p:ext uri="{BB962C8B-B14F-4D97-AF65-F5344CB8AC3E}">
-        <p14:creationId xmlns:p14="http://schemas.microsoft.com/office/powerpoint/2010/main" val="1360115604"/>
+        <p14:creationId xmlns:p14="http://schemas.microsoft.com/office/powerpoint/2010/main" val="4153817909"/>
       </p:ext>
     </p:extLst>
   </p:cSld>
@@ -10586,7 +10557,7 @@
                   <a:srgbClr val="D62728"/>
                 </a:solidFill>
               </a:rPr>
-              <a:t>#2</a:t>
+              <a:t>#3</a:t>
             </a:r>
             <a:endParaRPr lang="en-US" sz="8000" dirty="0">
               <a:solidFill>
@@ -10754,7 +10725,7 @@
           <a:p>
             <a:r>
               <a:rPr lang="en-US" sz="5400" dirty="0" smtClean="0"/>
-              <a:t>Provokes knowledge sharing and reproducibility</a:t>
+              <a:t>Promotes continuous improvement through automation</a:t>
             </a:r>
             <a:endParaRPr lang="en-US" sz="5400" dirty="0"/>
           </a:p>
@@ -10763,7 +10734,7 @@
     </p:spTree>
     <p:extLst>
       <p:ext uri="{BB962C8B-B14F-4D97-AF65-F5344CB8AC3E}">
-        <p14:creationId xmlns:p14="http://schemas.microsoft.com/office/powerpoint/2010/main" val="4153817909"/>
+        <p14:creationId xmlns:p14="http://schemas.microsoft.com/office/powerpoint/2010/main" val="2048697367"/>
       </p:ext>
     </p:extLst>
   </p:cSld>
@@ -10799,7 +10770,7 @@
       </p:grpSpPr>
       <p:sp>
         <p:nvSpPr>
-          <p:cNvPr id="10" name="Title 1"/>
+          <p:cNvPr id="2" name="Title 1"/>
           <p:cNvSpPr txBox="1">
             <a:spLocks/>
           </p:cNvSpPr>
@@ -10807,8 +10778,8 @@
         </p:nvSpPr>
         <p:spPr>
           <a:xfrm>
-            <a:off x="762000" y="1676400"/>
-            <a:ext cx="3581400" cy="1248614"/>
+            <a:off x="825982" y="2645647"/>
+            <a:ext cx="7492037" cy="1248614"/>
           </a:xfrm>
           <a:prstGeom prst="rect">
             <a:avLst/>
@@ -10954,189 +10925,29 @@
           </a:lstStyle>
           <a:p>
             <a:r>
-              <a:rPr lang="en-US" sz="8000" dirty="0" smtClean="0">
-                <a:solidFill>
-                  <a:srgbClr val="D62728"/>
+              <a:rPr lang="en-US" sz="5400" dirty="0" smtClean="0"/>
+              <a:t>Why program in </a:t>
+            </a:r>
+            <a:r>
+              <a:rPr lang="en-US" sz="5400" dirty="0" smtClean="0">
+                <a:solidFill>
+                  <a:srgbClr val="3366FF"/>
                 </a:solidFill>
               </a:rPr>
-              <a:t>#3</a:t>
+              <a:t>Python?</a:t>
             </a:r>
-            <a:endParaRPr lang="en-US" sz="8000" dirty="0">
+            <a:endParaRPr lang="en-US" sz="5400" dirty="0">
               <a:solidFill>
-                <a:srgbClr val="D62728"/>
+                <a:srgbClr val="3366FF"/>
               </a:solidFill>
             </a:endParaRPr>
-          </a:p>
-        </p:txBody>
-      </p:sp>
-      <p:sp>
-        <p:nvSpPr>
-          <p:cNvPr id="11" name="Title 1"/>
-          <p:cNvSpPr txBox="1">
-            <a:spLocks/>
-          </p:cNvSpPr>
-          <p:nvPr/>
-        </p:nvSpPr>
-        <p:spPr>
-          <a:xfrm>
-            <a:off x="685800" y="2906508"/>
-            <a:ext cx="8001000" cy="2503692"/>
-          </a:xfrm>
-          <a:prstGeom prst="rect">
-            <a:avLst/>
-          </a:prstGeom>
-          <a:noFill/>
-          <a:ln>
-            <a:noFill/>
-          </a:ln>
-          <a:extLst>
-            <a:ext uri="{909E8E84-426E-40DD-AFC4-6F175D3DCCD1}">
-              <a14:hiddenFill xmlns:a14="http://schemas.microsoft.com/office/drawing/2010/main">
-                <a:solidFill>
-                  <a:srgbClr val="FFFFFF"/>
-                </a:solidFill>
-              </a14:hiddenFill>
-            </a:ext>
-            <a:ext uri="{91240B29-F687-4F45-9708-019B960494DF}">
-              <a14:hiddenLine xmlns:a14="http://schemas.microsoft.com/office/drawing/2010/main" w="9525">
-                <a:solidFill>
-                  <a:srgbClr val="000000"/>
-                </a:solidFill>
-                <a:miter lim="800000"/>
-                <a:headEnd/>
-                <a:tailEnd/>
-              </a14:hiddenLine>
-            </a:ext>
-          </a:extLst>
-        </p:spPr>
-        <p:txBody>
-          <a:bodyPr vert="horz" wrap="square" lIns="0" tIns="0" rIns="0" bIns="0" numCol="1" anchor="t" anchorCtr="0" compatLnSpc="1">
-            <a:prstTxWarp prst="textNoShape">
-              <a:avLst/>
-            </a:prstTxWarp>
-          </a:bodyPr>
-          <a:lstStyle>
-            <a:lvl1pPr eaLnBrk="0" fontAlgn="base" hangingPunct="0">
-              <a:spcBef>
-                <a:spcPct val="0"/>
-              </a:spcBef>
-              <a:spcAft>
-                <a:spcPct val="0"/>
-              </a:spcAft>
-              <a:defRPr sz="4000" b="1">
-                <a:solidFill>
-                  <a:schemeClr val="tx1">
-                    <a:lumMod val="85000"/>
-                    <a:lumOff val="15000"/>
-                  </a:schemeClr>
-                </a:solidFill>
-                <a:latin typeface="+mj-lt"/>
-                <a:ea typeface="+mj-ea"/>
-                <a:cs typeface="+mj-cs"/>
-              </a:defRPr>
-            </a:lvl1pPr>
-            <a:lvl2pPr eaLnBrk="0" fontAlgn="base" hangingPunct="0">
-              <a:spcBef>
-                <a:spcPct val="0"/>
-              </a:spcBef>
-              <a:spcAft>
-                <a:spcPct val="0"/>
-              </a:spcAft>
-              <a:defRPr sz="2000" b="1">
-                <a:latin typeface="Arial" charset="0"/>
-              </a:defRPr>
-            </a:lvl2pPr>
-            <a:lvl3pPr eaLnBrk="0" fontAlgn="base" hangingPunct="0">
-              <a:spcBef>
-                <a:spcPct val="0"/>
-              </a:spcBef>
-              <a:spcAft>
-                <a:spcPct val="0"/>
-              </a:spcAft>
-              <a:defRPr sz="2000" b="1">
-                <a:latin typeface="Arial" charset="0"/>
-              </a:defRPr>
-            </a:lvl3pPr>
-            <a:lvl4pPr eaLnBrk="0" fontAlgn="base" hangingPunct="0">
-              <a:spcBef>
-                <a:spcPct val="0"/>
-              </a:spcBef>
-              <a:spcAft>
-                <a:spcPct val="0"/>
-              </a:spcAft>
-              <a:defRPr sz="2000" b="1">
-                <a:latin typeface="Arial" charset="0"/>
-              </a:defRPr>
-            </a:lvl4pPr>
-            <a:lvl5pPr eaLnBrk="0" fontAlgn="base" hangingPunct="0">
-              <a:spcBef>
-                <a:spcPct val="0"/>
-              </a:spcBef>
-              <a:spcAft>
-                <a:spcPct val="0"/>
-              </a:spcAft>
-              <a:defRPr sz="2000" b="1">
-                <a:latin typeface="Arial" charset="0"/>
-              </a:defRPr>
-            </a:lvl5pPr>
-            <a:lvl6pPr marL="457200" fontAlgn="base">
-              <a:spcBef>
-                <a:spcPct val="0"/>
-              </a:spcBef>
-              <a:spcAft>
-                <a:spcPct val="0"/>
-              </a:spcAft>
-              <a:defRPr sz="2000" b="1">
-                <a:latin typeface="Arial" charset="0"/>
-              </a:defRPr>
-            </a:lvl6pPr>
-            <a:lvl7pPr marL="914400" fontAlgn="base">
-              <a:spcBef>
-                <a:spcPct val="0"/>
-              </a:spcBef>
-              <a:spcAft>
-                <a:spcPct val="0"/>
-              </a:spcAft>
-              <a:defRPr sz="2000" b="1">
-                <a:latin typeface="Arial" charset="0"/>
-              </a:defRPr>
-            </a:lvl7pPr>
-            <a:lvl8pPr marL="1371600" fontAlgn="base">
-              <a:spcBef>
-                <a:spcPct val="0"/>
-              </a:spcBef>
-              <a:spcAft>
-                <a:spcPct val="0"/>
-              </a:spcAft>
-              <a:defRPr sz="2000" b="1">
-                <a:latin typeface="Arial" charset="0"/>
-              </a:defRPr>
-            </a:lvl8pPr>
-            <a:lvl9pPr marL="1828800" fontAlgn="base">
-              <a:spcBef>
-                <a:spcPct val="0"/>
-              </a:spcBef>
-              <a:spcAft>
-                <a:spcPct val="0"/>
-              </a:spcAft>
-              <a:defRPr sz="2000" b="1">
-                <a:latin typeface="Arial" charset="0"/>
-              </a:defRPr>
-            </a:lvl9pPr>
-          </a:lstStyle>
-          <a:p>
-            <a:r>
-              <a:rPr lang="en-US" sz="5400" dirty="0" smtClean="0"/>
-              <a:t>Promotes continuous improvement through automation</a:t>
-            </a:r>
-            <a:endParaRPr lang="en-US" sz="5400" dirty="0"/>
           </a:p>
         </p:txBody>
       </p:sp>
     </p:spTree>
     <p:extLst>
       <p:ext uri="{BB962C8B-B14F-4D97-AF65-F5344CB8AC3E}">
-        <p14:creationId xmlns:p14="http://schemas.microsoft.com/office/powerpoint/2010/main" val="2048697367"/>
+        <p14:creationId xmlns:p14="http://schemas.microsoft.com/office/powerpoint/2010/main" val="3808562461"/>
       </p:ext>
     </p:extLst>
   </p:cSld>

</xml_diff>

<commit_message>
Added zen of python slide
</commit_message>
<xml_diff>
--- a/python_data_analysis.pptx
+++ b/python_data_analysis.pptx
@@ -5,7 +5,7 @@
     <p:sldMasterId id="2147483660" r:id="rId1"/>
   </p:sldMasterIdLst>
   <p:notesMasterIdLst>
-    <p:notesMasterId r:id="rId17"/>
+    <p:notesMasterId r:id="rId18"/>
   </p:notesMasterIdLst>
   <p:sldIdLst>
     <p:sldId id="257" r:id="rId2"/>
@@ -20,9 +20,10 @@
     <p:sldId id="410" r:id="rId11"/>
     <p:sldId id="413" r:id="rId12"/>
     <p:sldId id="414" r:id="rId13"/>
-    <p:sldId id="415" r:id="rId14"/>
-    <p:sldId id="424" r:id="rId15"/>
-    <p:sldId id="386" r:id="rId16"/>
+    <p:sldId id="433" r:id="rId14"/>
+    <p:sldId id="415" r:id="rId15"/>
+    <p:sldId id="424" r:id="rId16"/>
+    <p:sldId id="386" r:id="rId17"/>
   </p:sldIdLst>
   <p:sldSz cx="9144000" cy="6858000" type="screen4x3"/>
   <p:notesSz cx="6858000" cy="9144000"/>
@@ -206,7 +207,7 @@
           <a:p>
             <a:fld id="{CE8756B7-FE9A-44EA-B6E4-A03085980E01}" type="datetimeFigureOut">
               <a:rPr lang="en-US" smtClean="0"/>
-              <a:t>2/12/2015</a:t>
+              <a:t>2/13/2015</a:t>
             </a:fld>
             <a:endParaRPr lang="en-US"/>
           </a:p>
@@ -791,7 +792,7 @@
           <a:p>
             <a:fld id="{279FA0F1-D8D2-4E3C-BDF2-9C18F52EC6B9}" type="slidenum">
               <a:rPr lang="en-US" smtClean="0"/>
-              <a:t>13</a:t>
+              <a:t>14</a:t>
             </a:fld>
             <a:endParaRPr lang="en-US"/>
           </a:p>
@@ -875,7 +876,7 @@
           <a:p>
             <a:fld id="{279FA0F1-D8D2-4E3C-BDF2-9C18F52EC6B9}" type="slidenum">
               <a:rPr lang="en-US" smtClean="0"/>
-              <a:t>14</a:t>
+              <a:t>15</a:t>
             </a:fld>
             <a:endParaRPr lang="en-US"/>
           </a:p>
@@ -959,7 +960,7 @@
           <a:p>
             <a:fld id="{279FA0F1-D8D2-4E3C-BDF2-9C18F52EC6B9}" type="slidenum">
               <a:rPr lang="en-US" smtClean="0"/>
-              <a:t>15</a:t>
+              <a:t>16</a:t>
             </a:fld>
             <a:endParaRPr lang="en-US"/>
           </a:p>
@@ -3172,7 +3173,7 @@
                 </a:solidFill>
               </a:rPr>
               <a:pPr/>
-              <a:t>2/12/2015</a:t>
+              <a:t>2/13/2015</a:t>
             </a:fld>
             <a:endParaRPr lang="en-US">
               <a:solidFill>
@@ -5485,6 +5486,153 @@
       </p:grpSpPr>
       <p:sp>
         <p:nvSpPr>
+          <p:cNvPr id="2" name="Rectangle 1"/>
+          <p:cNvSpPr/>
+          <p:nvPr/>
+        </p:nvSpPr>
+        <p:spPr bwMode="auto">
+          <a:xfrm>
+            <a:off x="0" y="0"/>
+            <a:ext cx="9144000" cy="6858000"/>
+          </a:xfrm>
+          <a:prstGeom prst="rect">
+            <a:avLst/>
+          </a:prstGeom>
+          <a:solidFill>
+            <a:schemeClr val="bg1"/>
+          </a:solidFill>
+          <a:ln w="9525" cap="flat" cmpd="sng" algn="ctr">
+            <a:noFill/>
+            <a:prstDash val="solid"/>
+            <a:round/>
+            <a:headEnd type="none" w="med" len="med"/>
+            <a:tailEnd type="none" w="med" len="med"/>
+          </a:ln>
+          <a:effectLst/>
+        </p:spPr>
+        <p:txBody>
+          <a:bodyPr vert="horz" wrap="square" lIns="0" tIns="0" rIns="0" bIns="0" numCol="1" rtlCol="0" anchor="t" anchorCtr="0" compatLnSpc="1">
+            <a:prstTxWarp prst="textNoShape">
+              <a:avLst/>
+            </a:prstTxWarp>
+          </a:bodyPr>
+          <a:lstStyle/>
+          <a:p>
+            <a:pPr marL="231775" marR="0" indent="-231775" algn="l" defTabSz="914400" rtl="0" eaLnBrk="1" fontAlgn="base" latinLnBrk="0" hangingPunct="1">
+              <a:lnSpc>
+                <a:spcPct val="106000"/>
+              </a:lnSpc>
+              <a:spcBef>
+                <a:spcPct val="0"/>
+              </a:spcBef>
+              <a:spcAft>
+                <a:spcPct val="0"/>
+              </a:spcAft>
+              <a:buClrTx/>
+              <a:buSzTx/>
+              <a:buFont typeface="Wingdings 2" pitchFamily="18" charset="2"/>
+              <a:buNone/>
+              <a:tabLst/>
+            </a:pPr>
+            <a:endParaRPr kumimoji="0" lang="en-US" sz="2400" b="0" i="0" u="none" strike="noStrike" cap="none" normalizeH="0" baseline="0" smtClean="0">
+              <a:ln>
+                <a:noFill/>
+              </a:ln>
+              <a:solidFill>
+                <a:schemeClr val="tx1"/>
+              </a:solidFill>
+              <a:effectLst/>
+              <a:latin typeface="Arial" charset="0"/>
+            </a:endParaRPr>
+          </a:p>
+        </p:txBody>
+      </p:sp>
+      <p:pic>
+        <p:nvPicPr>
+          <p:cNvPr id="1026" name="Picture 2"/>
+          <p:cNvPicPr>
+            <a:picLocks noChangeAspect="1" noChangeArrowheads="1"/>
+          </p:cNvPicPr>
+          <p:nvPr/>
+        </p:nvPicPr>
+        <p:blipFill>
+          <a:blip r:embed="rId2">
+            <a:extLst>
+              <a:ext uri="{28A0092B-C50C-407E-A947-70E740481C1C}">
+                <a14:useLocalDpi xmlns:a14="http://schemas.microsoft.com/office/drawing/2010/main" val="0"/>
+              </a:ext>
+            </a:extLst>
+          </a:blip>
+          <a:srcRect/>
+          <a:stretch>
+            <a:fillRect/>
+          </a:stretch>
+        </p:blipFill>
+        <p:spPr bwMode="auto">
+          <a:xfrm>
+            <a:off x="307430" y="595116"/>
+            <a:ext cx="8586500" cy="5667768"/>
+          </a:xfrm>
+          <a:prstGeom prst="rect">
+            <a:avLst/>
+          </a:prstGeom>
+          <a:noFill/>
+          <a:ln w="28575">
+            <a:noFill/>
+            <a:miter lim="800000"/>
+            <a:headEnd/>
+            <a:tailEnd/>
+          </a:ln>
+          <a:extLst>
+            <a:ext uri="{909E8E84-426E-40DD-AFC4-6F175D3DCCD1}">
+              <a14:hiddenFill xmlns:a14="http://schemas.microsoft.com/office/drawing/2010/main">
+                <a:solidFill>
+                  <a:schemeClr val="accent1"/>
+                </a:solidFill>
+              </a14:hiddenFill>
+            </a:ext>
+          </a:extLst>
+        </p:spPr>
+      </p:pic>
+    </p:spTree>
+    <p:extLst>
+      <p:ext uri="{BB962C8B-B14F-4D97-AF65-F5344CB8AC3E}">
+        <p14:creationId xmlns:p14="http://schemas.microsoft.com/office/powerpoint/2010/main" val="942371414"/>
+      </p:ext>
+    </p:extLst>
+  </p:cSld>
+  <p:clrMapOvr>
+    <a:masterClrMapping/>
+  </p:clrMapOvr>
+  <p:timing>
+    <p:tnLst>
+      <p:par>
+        <p:cTn id="1" dur="indefinite" restart="never" nodeType="tmRoot"/>
+      </p:par>
+    </p:tnLst>
+  </p:timing>
+</p:sld>
+</file>
+
+<file path=ppt/slides/slide14.xml><?xml version="1.0" encoding="utf-8"?>
+<p:sld xmlns:a="http://schemas.openxmlformats.org/drawingml/2006/main" xmlns:r="http://schemas.openxmlformats.org/officeDocument/2006/relationships" xmlns:p="http://schemas.openxmlformats.org/presentationml/2006/main">
+  <p:cSld>
+    <p:spTree>
+      <p:nvGrpSpPr>
+        <p:cNvPr id="1" name=""/>
+        <p:cNvGrpSpPr/>
+        <p:nvPr/>
+      </p:nvGrpSpPr>
+      <p:grpSpPr>
+        <a:xfrm>
+          <a:off x="0" y="0"/>
+          <a:ext cx="0" cy="0"/>
+          <a:chOff x="0" y="0"/>
+          <a:chExt cx="0" cy="0"/>
+        </a:xfrm>
+      </p:grpSpPr>
+      <p:sp>
+        <p:nvSpPr>
           <p:cNvPr id="10" name="Title 1"/>
           <p:cNvSpPr txBox="1">
             <a:spLocks/>
@@ -5839,7 +5987,7 @@
 </p:sld>
 </file>
 
-<file path=ppt/slides/slide14.xml><?xml version="1.0" encoding="utf-8"?>
+<file path=ppt/slides/slide15.xml><?xml version="1.0" encoding="utf-8"?>
 <p:sld xmlns:a="http://schemas.openxmlformats.org/drawingml/2006/main" xmlns:r="http://schemas.openxmlformats.org/officeDocument/2006/relationships" xmlns:p="http://schemas.openxmlformats.org/presentationml/2006/main">
   <p:cSld>
     <p:spTree>
@@ -5901,8 +6049,8 @@
         </p:nvSpPr>
         <p:spPr>
           <a:xfrm>
-            <a:off x="791786" y="955344"/>
-            <a:ext cx="7481373" cy="1200329"/>
+            <a:off x="791786" y="1049940"/>
+            <a:ext cx="7481373" cy="954107"/>
           </a:xfrm>
           <a:prstGeom prst="rect">
             <a:avLst/>
@@ -5917,15 +6065,42 @@
           <a:p>
             <a:pPr algn="ctr"/>
             <a:r>
-              <a:rPr lang="en-US" sz="2400" b="1" dirty="0" smtClean="0">
+              <a:rPr lang="en-US" sz="2800" b="1" dirty="0" smtClean="0">
                 <a:solidFill>
                   <a:schemeClr val="bg1"/>
                 </a:solidFill>
                 <a:latin typeface="Arial" panose="020B0604020202020204" pitchFamily="34" charset="0"/>
                 <a:cs typeface="Arial" panose="020B0604020202020204" pitchFamily="34" charset="0"/>
               </a:rPr>
-              <a:t>In contrast to R, which has 5000+ packages, Python has a smaller and richer package ecosystem</a:t>
+              <a:t>Python </a:t>
             </a:r>
+            <a:r>
+              <a:rPr lang="en-US" sz="2800" b="1" dirty="0" smtClean="0">
+                <a:solidFill>
+                  <a:schemeClr val="bg1"/>
+                </a:solidFill>
+                <a:latin typeface="Arial" panose="020B0604020202020204" pitchFamily="34" charset="0"/>
+                <a:cs typeface="Arial" panose="020B0604020202020204" pitchFamily="34" charset="0"/>
+              </a:rPr>
+              <a:t>has a </a:t>
+            </a:r>
+            <a:r>
+              <a:rPr lang="en-US" sz="2800" b="1" dirty="0" smtClean="0">
+                <a:solidFill>
+                  <a:schemeClr val="bg1"/>
+                </a:solidFill>
+                <a:latin typeface="Arial" panose="020B0604020202020204" pitchFamily="34" charset="0"/>
+                <a:cs typeface="Arial" panose="020B0604020202020204" pitchFamily="34" charset="0"/>
+              </a:rPr>
+              <a:t>rich and cohesive package ecosystem for conducting data science</a:t>
+            </a:r>
+            <a:endParaRPr lang="en-US" sz="2800" b="1" dirty="0" smtClean="0">
+              <a:solidFill>
+                <a:schemeClr val="bg1"/>
+              </a:solidFill>
+              <a:latin typeface="Arial" panose="020B0604020202020204" pitchFamily="34" charset="0"/>
+              <a:cs typeface="Arial" panose="020B0604020202020204" pitchFamily="34" charset="0"/>
+            </a:endParaRPr>
           </a:p>
         </p:txBody>
       </p:sp>
@@ -8445,7 +8620,7 @@
 </p:sld>
 </file>
 
-<file path=ppt/slides/slide15.xml><?xml version="1.0" encoding="utf-8"?>
+<file path=ppt/slides/slide16.xml><?xml version="1.0" encoding="utf-8"?>
 <p:sld xmlns:a="http://schemas.openxmlformats.org/drawingml/2006/main" xmlns:r="http://schemas.openxmlformats.org/officeDocument/2006/relationships" xmlns:p="http://schemas.openxmlformats.org/presentationml/2006/main">
   <p:cSld>
     <p:spTree>
@@ -8822,31 +8997,7 @@
                 </a:solidFill>
                 <a:latin typeface="+mj-lt"/>
               </a:rPr>
-              <a:t>Why learn </a:t>
-            </a:r>
-            <a:r>
-              <a:rPr lang="en-US" sz="3200" dirty="0" smtClean="0">
-                <a:solidFill>
-                  <a:schemeClr val="tx1">
-                    <a:lumMod val="85000"/>
-                    <a:lumOff val="15000"/>
-                  </a:schemeClr>
-                </a:solidFill>
-                <a:latin typeface="+mj-lt"/>
-              </a:rPr>
-              <a:t>to program in python</a:t>
-            </a:r>
-            <a:r>
-              <a:rPr lang="en-US" sz="3200" dirty="0" smtClean="0">
-                <a:solidFill>
-                  <a:schemeClr val="tx1">
-                    <a:lumMod val="85000"/>
-                    <a:lumOff val="15000"/>
-                  </a:schemeClr>
-                </a:solidFill>
-                <a:latin typeface="+mj-lt"/>
-              </a:rPr>
-              <a:t>?</a:t>
+              <a:t>Why learn to program in python?</a:t>
             </a:r>
           </a:p>
           <a:p>
@@ -9190,17 +9341,7 @@
                 <a:latin typeface="Arial" panose="020B0604020202020204" pitchFamily="34" charset="0"/>
                 <a:cs typeface="Arial" panose="020B0604020202020204" pitchFamily="34" charset="0"/>
               </a:rPr>
-              <a:t>Hadley </a:t>
-            </a:r>
-            <a:r>
-              <a:rPr lang="en-US" sz="2800" dirty="0" smtClean="0">
-                <a:solidFill>
-                  <a:srgbClr val="2E9626"/>
-                </a:solidFill>
-                <a:latin typeface="Arial" panose="020B0604020202020204" pitchFamily="34" charset="0"/>
-                <a:cs typeface="Arial" panose="020B0604020202020204" pitchFamily="34" charset="0"/>
-              </a:rPr>
-              <a:t>Wickham</a:t>
+              <a:t>Hadley Wickham</a:t>
             </a:r>
           </a:p>
         </p:txBody>

</xml_diff>

<commit_message>
Changed datas terms to your terms
</commit_message>
<xml_diff>
--- a/python_data_analysis.pptx
+++ b/python_data_analysis.pptx
@@ -209,7 +209,7 @@
           <a:p>
             <a:fld id="{CE8756B7-FE9A-44EA-B6E4-A03085980E01}" type="datetimeFigureOut">
               <a:rPr lang="en-US" smtClean="0"/>
-              <a:t>2/13/2015</a:t>
+              <a:t>4/15/2015</a:t>
             </a:fld>
             <a:endParaRPr lang="en-US"/>
           </a:p>
@@ -3259,7 +3259,7 @@
                 </a:solidFill>
               </a:rPr>
               <a:pPr/>
-              <a:t>2/13/2015</a:t>
+              <a:t>4/15/2015</a:t>
             </a:fld>
             <a:endParaRPr lang="en-US">
               <a:solidFill>
@@ -10900,7 +10900,19 @@
           <a:p>
             <a:r>
               <a:rPr lang="en-US" sz="5400" dirty="0" smtClean="0"/>
-              <a:t>Provides liberation to analyze data on its own terms</a:t>
+              <a:t>Provides liberation to analyze data on </a:t>
+            </a:r>
+            <a:r>
+              <a:rPr lang="en-US" sz="5400" dirty="0" smtClean="0"/>
+              <a:t>your</a:t>
+            </a:r>
+            <a:r>
+              <a:rPr lang="en-US" sz="5400" dirty="0" smtClean="0"/>
+              <a:t> </a:t>
+            </a:r>
+            <a:r>
+              <a:rPr lang="en-US" sz="5400" dirty="0" smtClean="0"/>
+              <a:t>own terms</a:t>
             </a:r>
             <a:endParaRPr lang="en-US" sz="5400" dirty="0"/>
           </a:p>

</xml_diff>

<commit_message>
adding a pdf document
</commit_message>
<xml_diff>
--- a/python_data_analysis.pptx
+++ b/python_data_analysis.pptx
@@ -9,22 +9,22 @@
   </p:notesMasterIdLst>
   <p:sldIdLst>
     <p:sldId id="257" r:id="rId2"/>
-    <p:sldId id="357" r:id="rId3"/>
-    <p:sldId id="416" r:id="rId4"/>
-    <p:sldId id="432" r:id="rId5"/>
-    <p:sldId id="411" r:id="rId6"/>
-    <p:sldId id="405" r:id="rId7"/>
-    <p:sldId id="408" r:id="rId8"/>
-    <p:sldId id="409" r:id="rId9"/>
-    <p:sldId id="401" r:id="rId10"/>
-    <p:sldId id="410" r:id="rId11"/>
-    <p:sldId id="413" r:id="rId12"/>
-    <p:sldId id="414" r:id="rId13"/>
-    <p:sldId id="433" r:id="rId14"/>
-    <p:sldId id="415" r:id="rId15"/>
-    <p:sldId id="424" r:id="rId16"/>
-    <p:sldId id="435" r:id="rId17"/>
-    <p:sldId id="436" r:id="rId18"/>
+    <p:sldId id="439" r:id="rId3"/>
+    <p:sldId id="357" r:id="rId4"/>
+    <p:sldId id="416" r:id="rId5"/>
+    <p:sldId id="432" r:id="rId6"/>
+    <p:sldId id="411" r:id="rId7"/>
+    <p:sldId id="405" r:id="rId8"/>
+    <p:sldId id="408" r:id="rId9"/>
+    <p:sldId id="409" r:id="rId10"/>
+    <p:sldId id="401" r:id="rId11"/>
+    <p:sldId id="410" r:id="rId12"/>
+    <p:sldId id="413" r:id="rId13"/>
+    <p:sldId id="414" r:id="rId14"/>
+    <p:sldId id="433" r:id="rId15"/>
+    <p:sldId id="415" r:id="rId16"/>
+    <p:sldId id="424" r:id="rId17"/>
+    <p:sldId id="435" r:id="rId18"/>
     <p:sldId id="437" r:id="rId19"/>
   </p:sldIdLst>
   <p:sldSz cx="9144000" cy="6858000" type="screen4x3"/>
@@ -209,7 +209,7 @@
           <a:p>
             <a:fld id="{CE8756B7-FE9A-44EA-B6E4-A03085980E01}" type="datetimeFigureOut">
               <a:rPr lang="en-US" smtClean="0"/>
-              <a:t>4/15/2015</a:t>
+              <a:t>11/10/15</a:t>
             </a:fld>
             <a:endParaRPr lang="en-US"/>
           </a:p>
@@ -626,7 +626,7 @@
           <a:p>
             <a:fld id="{279FA0F1-D8D2-4E3C-BDF2-9C18F52EC6B9}" type="slidenum">
               <a:rPr lang="en-US" smtClean="0"/>
-              <a:t>11</a:t>
+              <a:t>12</a:t>
             </a:fld>
             <a:endParaRPr lang="en-US"/>
           </a:p>
@@ -710,7 +710,7 @@
           <a:p>
             <a:fld id="{279FA0F1-D8D2-4E3C-BDF2-9C18F52EC6B9}" type="slidenum">
               <a:rPr lang="en-US" smtClean="0"/>
-              <a:t>12</a:t>
+              <a:t>13</a:t>
             </a:fld>
             <a:endParaRPr lang="en-US"/>
           </a:p>
@@ -794,7 +794,7 @@
           <a:p>
             <a:fld id="{279FA0F1-D8D2-4E3C-BDF2-9C18F52EC6B9}" type="slidenum">
               <a:rPr lang="en-US" smtClean="0"/>
-              <a:t>14</a:t>
+              <a:t>15</a:t>
             </a:fld>
             <a:endParaRPr lang="en-US"/>
           </a:p>
@@ -878,7 +878,7 @@
           <a:p>
             <a:fld id="{279FA0F1-D8D2-4E3C-BDF2-9C18F52EC6B9}" type="slidenum">
               <a:rPr lang="en-US" smtClean="0"/>
-              <a:t>15</a:t>
+              <a:t>16</a:t>
             </a:fld>
             <a:endParaRPr lang="en-US"/>
           </a:p>
@@ -962,90 +962,6 @@
           <a:p>
             <a:fld id="{279FA0F1-D8D2-4E3C-BDF2-9C18F52EC6B9}" type="slidenum">
               <a:rPr lang="en-US" smtClean="0"/>
-              <a:t>16</a:t>
-            </a:fld>
-            <a:endParaRPr lang="en-US"/>
-          </a:p>
-        </p:txBody>
-      </p:sp>
-    </p:spTree>
-    <p:extLst>
-      <p:ext uri="{BB962C8B-B14F-4D97-AF65-F5344CB8AC3E}">
-        <p14:creationId xmlns:p14="http://schemas.microsoft.com/office/powerpoint/2010/main" val="2851216896"/>
-      </p:ext>
-    </p:extLst>
-  </p:cSld>
-  <p:clrMapOvr>
-    <a:masterClrMapping/>
-  </p:clrMapOvr>
-</p:notes>
-</file>
-
-<file path=ppt/notesSlides/notesSlide15.xml><?xml version="1.0" encoding="utf-8"?>
-<p:notes xmlns:a="http://schemas.openxmlformats.org/drawingml/2006/main" xmlns:r="http://schemas.openxmlformats.org/officeDocument/2006/relationships" xmlns:p="http://schemas.openxmlformats.org/presentationml/2006/main">
-  <p:cSld>
-    <p:spTree>
-      <p:nvGrpSpPr>
-        <p:cNvPr id="1" name=""/>
-        <p:cNvGrpSpPr/>
-        <p:nvPr/>
-      </p:nvGrpSpPr>
-      <p:grpSpPr>
-        <a:xfrm>
-          <a:off x="0" y="0"/>
-          <a:ext cx="0" cy="0"/>
-          <a:chOff x="0" y="0"/>
-          <a:chExt cx="0" cy="0"/>
-        </a:xfrm>
-      </p:grpSpPr>
-      <p:sp>
-        <p:nvSpPr>
-          <p:cNvPr id="2" name="Slide Image Placeholder 1"/>
-          <p:cNvSpPr>
-            <a:spLocks noGrp="1" noRot="1" noChangeAspect="1"/>
-          </p:cNvSpPr>
-          <p:nvPr>
-            <p:ph type="sldImg"/>
-          </p:nvPr>
-        </p:nvSpPr>
-        <p:spPr/>
-      </p:sp>
-      <p:sp>
-        <p:nvSpPr>
-          <p:cNvPr id="3" name="Notes Placeholder 2"/>
-          <p:cNvSpPr>
-            <a:spLocks noGrp="1"/>
-          </p:cNvSpPr>
-          <p:nvPr>
-            <p:ph type="body" idx="1"/>
-          </p:nvPr>
-        </p:nvSpPr>
-        <p:spPr/>
-        <p:txBody>
-          <a:bodyPr/>
-          <a:lstStyle/>
-          <a:p>
-            <a:endParaRPr lang="en-US" baseline="0" dirty="0" smtClean="0"/>
-          </a:p>
-        </p:txBody>
-      </p:sp>
-      <p:sp>
-        <p:nvSpPr>
-          <p:cNvPr id="4" name="Slide Number Placeholder 3"/>
-          <p:cNvSpPr>
-            <a:spLocks noGrp="1"/>
-          </p:cNvSpPr>
-          <p:nvPr>
-            <p:ph type="sldNum" sz="quarter" idx="10"/>
-          </p:nvPr>
-        </p:nvSpPr>
-        <p:spPr/>
-        <p:txBody>
-          <a:bodyPr/>
-          <a:lstStyle/>
-          <a:p>
-            <a:fld id="{279FA0F1-D8D2-4E3C-BDF2-9C18F52EC6B9}" type="slidenum">
-              <a:rPr lang="en-US" smtClean="0"/>
               <a:t>17</a:t>
             </a:fld>
             <a:endParaRPr lang="en-US"/>
@@ -1130,7 +1046,7 @@
           <a:p>
             <a:fld id="{279FA0F1-D8D2-4E3C-BDF2-9C18F52EC6B9}" type="slidenum">
               <a:rPr lang="en-US" smtClean="0"/>
-              <a:t>3</a:t>
+              <a:t>4</a:t>
             </a:fld>
             <a:endParaRPr lang="en-US"/>
           </a:p>
@@ -1214,7 +1130,7 @@
           <a:p>
             <a:fld id="{279FA0F1-D8D2-4E3C-BDF2-9C18F52EC6B9}" type="slidenum">
               <a:rPr lang="en-US" smtClean="0"/>
-              <a:t>4</a:t>
+              <a:t>5</a:t>
             </a:fld>
             <a:endParaRPr lang="en-US"/>
           </a:p>
@@ -1298,7 +1214,7 @@
           <a:p>
             <a:fld id="{279FA0F1-D8D2-4E3C-BDF2-9C18F52EC6B9}" type="slidenum">
               <a:rPr lang="en-US" smtClean="0"/>
-              <a:t>5</a:t>
+              <a:t>6</a:t>
             </a:fld>
             <a:endParaRPr lang="en-US"/>
           </a:p>
@@ -1382,7 +1298,7 @@
           <a:p>
             <a:fld id="{279FA0F1-D8D2-4E3C-BDF2-9C18F52EC6B9}" type="slidenum">
               <a:rPr lang="en-US" smtClean="0"/>
-              <a:t>6</a:t>
+              <a:t>7</a:t>
             </a:fld>
             <a:endParaRPr lang="en-US"/>
           </a:p>
@@ -1466,7 +1382,7 @@
           <a:p>
             <a:fld id="{279FA0F1-D8D2-4E3C-BDF2-9C18F52EC6B9}" type="slidenum">
               <a:rPr lang="en-US" smtClean="0"/>
-              <a:t>7</a:t>
+              <a:t>8</a:t>
             </a:fld>
             <a:endParaRPr lang="en-US"/>
           </a:p>
@@ -1550,7 +1466,7 @@
           <a:p>
             <a:fld id="{279FA0F1-D8D2-4E3C-BDF2-9C18F52EC6B9}" type="slidenum">
               <a:rPr lang="en-US" smtClean="0"/>
-              <a:t>8</a:t>
+              <a:t>9</a:t>
             </a:fld>
             <a:endParaRPr lang="en-US"/>
           </a:p>
@@ -1634,7 +1550,7 @@
           <a:p>
             <a:fld id="{279FA0F1-D8D2-4E3C-BDF2-9C18F52EC6B9}" type="slidenum">
               <a:rPr lang="en-US" smtClean="0"/>
-              <a:t>9</a:t>
+              <a:t>10</a:t>
             </a:fld>
             <a:endParaRPr lang="en-US"/>
           </a:p>
@@ -1718,7 +1634,7 @@
           <a:p>
             <a:fld id="{279FA0F1-D8D2-4E3C-BDF2-9C18F52EC6B9}" type="slidenum">
               <a:rPr lang="en-US" smtClean="0"/>
-              <a:t>10</a:t>
+              <a:t>11</a:t>
             </a:fld>
             <a:endParaRPr lang="en-US"/>
           </a:p>
@@ -1847,14 +1763,14 @@
             <a:noFill/>
           </a:ln>
           <a:extLst>
-            <a:ext uri="{909E8E84-426E-40DD-AFC4-6F175D3DCCD1}">
+            <a:ext uri="{909E8E84-426E-40dd-AFC4-6F175D3DCCD1}">
               <a14:hiddenFill xmlns:a14="http://schemas.microsoft.com/office/drawing/2010/main">
                 <a:solidFill>
                   <a:srgbClr val="FFFFFF"/>
                 </a:solidFill>
               </a14:hiddenFill>
             </a:ext>
-            <a:ext uri="{91240B29-F687-4F45-9708-019B960494DF}">
+            <a:ext uri="{91240B29-F687-4f45-9708-019B960494DF}">
               <a14:hiddenLine xmlns:a14="http://schemas.microsoft.com/office/drawing/2010/main" w="9525">
                 <a:solidFill>
                   <a:srgbClr val="000000"/>
@@ -1965,7 +1881,7 @@
   <p:timing>
     <p:tnLst>
       <p:par>
-        <p:cTn id="1" dur="indefinite" restart="never" nodeType="tmRoot"/>
+        <p:cTn xmlns:p14="http://schemas.microsoft.com/office/powerpoint/2010/main" id="1" dur="indefinite" restart="never" nodeType="tmRoot"/>
       </p:par>
     </p:tnLst>
   </p:timing>
@@ -2041,7 +1957,7 @@
             <a:tailEnd/>
           </a:ln>
           <a:extLst>
-            <a:ext uri="{909E8E84-426E-40DD-AFC4-6F175D3DCCD1}">
+            <a:ext uri="{909E8E84-426E-40dd-AFC4-6F175D3DCCD1}">
               <a14:hiddenFill xmlns:a14="http://schemas.microsoft.com/office/drawing/2010/main">
                 <a:noFill/>
               </a14:hiddenFill>
@@ -2291,7 +2207,7 @@
   <p:timing>
     <p:tnLst>
       <p:par>
-        <p:cTn id="1" dur="indefinite" restart="never" nodeType="tmRoot"/>
+        <p:cTn xmlns:p14="http://schemas.microsoft.com/office/powerpoint/2010/main" id="1" dur="indefinite" restart="never" nodeType="tmRoot"/>
       </p:par>
     </p:tnLst>
   </p:timing>
@@ -2404,7 +2320,7 @@
             <a:tailEnd/>
           </a:ln>
           <a:extLst>
-            <a:ext uri="{909E8E84-426E-40DD-AFC4-6F175D3DCCD1}">
+            <a:ext uri="{909E8E84-426E-40dd-AFC4-6F175D3DCCD1}">
               <a14:hiddenFill xmlns:a14="http://schemas.microsoft.com/office/drawing/2010/main">
                 <a:noFill/>
               </a14:hiddenFill>
@@ -2654,7 +2570,7 @@
   <p:timing>
     <p:tnLst>
       <p:par>
-        <p:cTn id="1" dur="indefinite" restart="never" nodeType="tmRoot"/>
+        <p:cTn xmlns:p14="http://schemas.microsoft.com/office/powerpoint/2010/main" id="1" dur="indefinite" restart="never" nodeType="tmRoot"/>
       </p:par>
     </p:tnLst>
   </p:timing>
@@ -2691,7 +2607,7 @@
   <p:timing>
     <p:tnLst>
       <p:par>
-        <p:cTn id="1" dur="indefinite" restart="never" nodeType="tmRoot"/>
+        <p:cTn xmlns:p14="http://schemas.microsoft.com/office/powerpoint/2010/main" id="1" dur="indefinite" restart="never" nodeType="tmRoot"/>
       </p:par>
     </p:tnLst>
   </p:timing>
@@ -2801,7 +2717,7 @@
             <a:tailEnd/>
           </a:ln>
           <a:extLst>
-            <a:ext uri="{909E8E84-426E-40DD-AFC4-6F175D3DCCD1}">
+            <a:ext uri="{909E8E84-426E-40dd-AFC4-6F175D3DCCD1}">
               <a14:hiddenFill xmlns:a14="http://schemas.microsoft.com/office/drawing/2010/main">
                 <a:noFill/>
               </a14:hiddenFill>
@@ -3051,7 +2967,7 @@
   <p:timing>
     <p:tnLst>
       <p:par>
-        <p:cTn id="1" dur="indefinite" restart="never" nodeType="tmRoot"/>
+        <p:cTn xmlns:p14="http://schemas.microsoft.com/office/powerpoint/2010/main" id="1" dur="indefinite" restart="never" nodeType="tmRoot"/>
       </p:par>
     </p:tnLst>
   </p:timing>
@@ -3128,7 +3044,7 @@
   <p:timing>
     <p:tnLst>
       <p:par>
-        <p:cTn id="1" dur="indefinite" restart="never" nodeType="tmRoot"/>
+        <p:cTn xmlns:p14="http://schemas.microsoft.com/office/powerpoint/2010/main" id="1" dur="indefinite" restart="never" nodeType="tmRoot"/>
       </p:par>
     </p:tnLst>
   </p:timing>
@@ -3259,7 +3175,7 @@
                 </a:solidFill>
               </a:rPr>
               <a:pPr/>
-              <a:t>4/15/2015</a:t>
+              <a:t>11/10/15</a:t>
             </a:fld>
             <a:endParaRPr lang="en-US">
               <a:solidFill>
@@ -3361,7 +3277,7 @@
   <p:timing>
     <p:tnLst>
       <p:par>
-        <p:cTn id="1" dur="indefinite" restart="never" nodeType="tmRoot"/>
+        <p:cTn xmlns:p14="http://schemas.microsoft.com/office/powerpoint/2010/main" id="1" dur="indefinite" restart="never" nodeType="tmRoot"/>
       </p:par>
     </p:tnLst>
   </p:timing>
@@ -3433,14 +3349,14 @@
             <a:noFill/>
           </a:ln>
           <a:extLst>
-            <a:ext uri="{909E8E84-426E-40DD-AFC4-6F175D3DCCD1}">
+            <a:ext uri="{909E8E84-426E-40dd-AFC4-6F175D3DCCD1}">
               <a14:hiddenFill xmlns:a14="http://schemas.microsoft.com/office/drawing/2010/main">
                 <a:solidFill>
                   <a:srgbClr val="FFFFFF"/>
                 </a:solidFill>
               </a14:hiddenFill>
             </a:ext>
-            <a:ext uri="{91240B29-F687-4F45-9708-019B960494DF}">
+            <a:ext uri="{91240B29-F687-4f45-9708-019B960494DF}">
               <a14:hiddenLine xmlns:a14="http://schemas.microsoft.com/office/drawing/2010/main" w="9525">
                 <a:solidFill>
                   <a:srgbClr val="000000"/>
@@ -3491,14 +3407,14 @@
             <a:noFill/>
           </a:ln>
           <a:extLst>
-            <a:ext uri="{909E8E84-426E-40DD-AFC4-6F175D3DCCD1}">
+            <a:ext uri="{909E8E84-426E-40dd-AFC4-6F175D3DCCD1}">
               <a14:hiddenFill xmlns:a14="http://schemas.microsoft.com/office/drawing/2010/main">
                 <a:solidFill>
                   <a:srgbClr val="FFFFFF"/>
                 </a:solidFill>
               </a14:hiddenFill>
             </a:ext>
-            <a:ext uri="{91240B29-F687-4F45-9708-019B960494DF}">
+            <a:ext uri="{91240B29-F687-4f45-9708-019B960494DF}">
               <a14:hiddenLine xmlns:a14="http://schemas.microsoft.com/office/drawing/2010/main" w="9525">
                 <a:solidFill>
                   <a:srgbClr val="000000"/>
@@ -3734,7 +3650,7 @@
   <p:timing>
     <p:tnLst>
       <p:par>
-        <p:cTn id="1" dur="indefinite" restart="never" nodeType="tmRoot"/>
+        <p:cTn xmlns:p14="http://schemas.microsoft.com/office/powerpoint/2010/main" id="1" dur="indefinite" restart="never" nodeType="tmRoot"/>
       </p:par>
     </p:tnLst>
   </p:timing>
@@ -4213,7 +4129,7 @@
           </a:prstGeom>
           <a:noFill/>
           <a:extLst>
-            <a:ext uri="{909E8E84-426E-40DD-AFC4-6F175D3DCCD1}">
+            <a:ext uri="{909E8E84-426E-40dd-AFC4-6F175D3DCCD1}">
               <a14:hiddenFill xmlns:a14="http://schemas.microsoft.com/office/drawing/2010/main">
                 <a:solidFill>
                   <a:srgbClr val="FFFFFF"/>
@@ -4244,14 +4160,14 @@
             <a:noFill/>
           </a:ln>
           <a:extLst>
-            <a:ext uri="{909E8E84-426E-40DD-AFC4-6F175D3DCCD1}">
+            <a:ext uri="{909E8E84-426E-40dd-AFC4-6F175D3DCCD1}">
               <a14:hiddenFill xmlns:a14="http://schemas.microsoft.com/office/drawing/2010/main">
                 <a:solidFill>
                   <a:srgbClr val="FFFFFF"/>
                 </a:solidFill>
               </a14:hiddenFill>
             </a:ext>
-            <a:ext uri="{91240B29-F687-4F45-9708-019B960494DF}">
+            <a:ext uri="{91240B29-F687-4f45-9708-019B960494DF}">
               <a14:hiddenLine xmlns:a14="http://schemas.microsoft.com/office/drawing/2010/main" w="9525">
                 <a:solidFill>
                   <a:srgbClr val="000000"/>
@@ -4404,7 +4320,7 @@
               <a:t>Data </a:t>
             </a:r>
             <a:r>
-              <a:rPr lang="en-US" sz="4800" dirty="0">
+              <a:rPr lang="en-US" sz="4800" dirty="0" smtClean="0">
                 <a:solidFill>
                   <a:schemeClr val="bg1"/>
                 </a:solidFill>
@@ -4427,7 +4343,7 @@
   <p:timing>
     <p:tnLst>
       <p:par>
-        <p:cTn id="1" dur="indefinite" restart="never" nodeType="tmRoot"/>
+        <p:cTn xmlns:p14="http://schemas.microsoft.com/office/powerpoint/2010/main" id="1" dur="indefinite" restart="never" nodeType="tmRoot"/>
       </p:par>
     </p:tnLst>
   </p:timing>
@@ -4453,7 +4369,7 @@
       </p:grpSpPr>
       <p:sp>
         <p:nvSpPr>
-          <p:cNvPr id="10" name="Title 1"/>
+          <p:cNvPr id="2" name="Title 1"/>
           <p:cNvSpPr txBox="1">
             <a:spLocks/>
           </p:cNvSpPr>
@@ -4461,8 +4377,8 @@
         </p:nvSpPr>
         <p:spPr>
           <a:xfrm>
-            <a:off x="762000" y="1676400"/>
-            <a:ext cx="3581400" cy="1248614"/>
+            <a:off x="825982" y="2645647"/>
+            <a:ext cx="7492037" cy="1248614"/>
           </a:xfrm>
           <a:prstGeom prst="rect">
             <a:avLst/>
@@ -4472,14 +4388,14 @@
             <a:noFill/>
           </a:ln>
           <a:extLst>
-            <a:ext uri="{909E8E84-426E-40DD-AFC4-6F175D3DCCD1}">
+            <a:ext uri="{909E8E84-426E-40dd-AFC4-6F175D3DCCD1}">
               <a14:hiddenFill xmlns:a14="http://schemas.microsoft.com/office/drawing/2010/main">
                 <a:solidFill>
                   <a:srgbClr val="FFFFFF"/>
                 </a:solidFill>
               </a14:hiddenFill>
             </a:ext>
-            <a:ext uri="{91240B29-F687-4F45-9708-019B960494DF}">
+            <a:ext uri="{91240B29-F687-4f45-9708-019B960494DF}">
               <a14:hiddenLine xmlns:a14="http://schemas.microsoft.com/office/drawing/2010/main" w="9525">
                 <a:solidFill>
                   <a:srgbClr val="000000"/>
@@ -4608,189 +4524,29 @@
           </a:lstStyle>
           <a:p>
             <a:r>
-              <a:rPr lang="en-US" sz="8000" dirty="0" smtClean="0">
+              <a:rPr lang="en-US" sz="5400" dirty="0" smtClean="0"/>
+              <a:t>Why program in </a:t>
+            </a:r>
+            <a:r>
+              <a:rPr lang="en-US" sz="5400" dirty="0" smtClean="0">
                 <a:solidFill>
                   <a:srgbClr val="3366FF"/>
                 </a:solidFill>
               </a:rPr>
-              <a:t>#1</a:t>
+              <a:t>Python?</a:t>
             </a:r>
-            <a:endParaRPr lang="en-US" sz="8000" dirty="0">
+            <a:endParaRPr lang="en-US" sz="5400" dirty="0">
               <a:solidFill>
                 <a:srgbClr val="3366FF"/>
               </a:solidFill>
             </a:endParaRPr>
-          </a:p>
-        </p:txBody>
-      </p:sp>
-      <p:sp>
-        <p:nvSpPr>
-          <p:cNvPr id="11" name="Title 1"/>
-          <p:cNvSpPr txBox="1">
-            <a:spLocks/>
-          </p:cNvSpPr>
-          <p:nvPr/>
-        </p:nvSpPr>
-        <p:spPr>
-          <a:xfrm>
-            <a:off x="685800" y="2960033"/>
-            <a:ext cx="8001000" cy="2069167"/>
-          </a:xfrm>
-          <a:prstGeom prst="rect">
-            <a:avLst/>
-          </a:prstGeom>
-          <a:noFill/>
-          <a:ln>
-            <a:noFill/>
-          </a:ln>
-          <a:extLst>
-            <a:ext uri="{909E8E84-426E-40DD-AFC4-6F175D3DCCD1}">
-              <a14:hiddenFill xmlns:a14="http://schemas.microsoft.com/office/drawing/2010/main">
-                <a:solidFill>
-                  <a:srgbClr val="FFFFFF"/>
-                </a:solidFill>
-              </a14:hiddenFill>
-            </a:ext>
-            <a:ext uri="{91240B29-F687-4F45-9708-019B960494DF}">
-              <a14:hiddenLine xmlns:a14="http://schemas.microsoft.com/office/drawing/2010/main" w="9525">
-                <a:solidFill>
-                  <a:srgbClr val="000000"/>
-                </a:solidFill>
-                <a:miter lim="800000"/>
-                <a:headEnd/>
-                <a:tailEnd/>
-              </a14:hiddenLine>
-            </a:ext>
-          </a:extLst>
-        </p:spPr>
-        <p:txBody>
-          <a:bodyPr vert="horz" wrap="square" lIns="0" tIns="0" rIns="0" bIns="0" numCol="1" anchor="t" anchorCtr="0" compatLnSpc="1">
-            <a:prstTxWarp prst="textNoShape">
-              <a:avLst/>
-            </a:prstTxWarp>
-          </a:bodyPr>
-          <a:lstStyle>
-            <a:lvl1pPr eaLnBrk="0" fontAlgn="base" hangingPunct="0">
-              <a:spcBef>
-                <a:spcPct val="0"/>
-              </a:spcBef>
-              <a:spcAft>
-                <a:spcPct val="0"/>
-              </a:spcAft>
-              <a:defRPr sz="4000" b="1">
-                <a:solidFill>
-                  <a:schemeClr val="tx1">
-                    <a:lumMod val="85000"/>
-                    <a:lumOff val="15000"/>
-                  </a:schemeClr>
-                </a:solidFill>
-                <a:latin typeface="+mj-lt"/>
-                <a:ea typeface="+mj-ea"/>
-                <a:cs typeface="+mj-cs"/>
-              </a:defRPr>
-            </a:lvl1pPr>
-            <a:lvl2pPr eaLnBrk="0" fontAlgn="base" hangingPunct="0">
-              <a:spcBef>
-                <a:spcPct val="0"/>
-              </a:spcBef>
-              <a:spcAft>
-                <a:spcPct val="0"/>
-              </a:spcAft>
-              <a:defRPr sz="2000" b="1">
-                <a:latin typeface="Arial" charset="0"/>
-              </a:defRPr>
-            </a:lvl2pPr>
-            <a:lvl3pPr eaLnBrk="0" fontAlgn="base" hangingPunct="0">
-              <a:spcBef>
-                <a:spcPct val="0"/>
-              </a:spcBef>
-              <a:spcAft>
-                <a:spcPct val="0"/>
-              </a:spcAft>
-              <a:defRPr sz="2000" b="1">
-                <a:latin typeface="Arial" charset="0"/>
-              </a:defRPr>
-            </a:lvl3pPr>
-            <a:lvl4pPr eaLnBrk="0" fontAlgn="base" hangingPunct="0">
-              <a:spcBef>
-                <a:spcPct val="0"/>
-              </a:spcBef>
-              <a:spcAft>
-                <a:spcPct val="0"/>
-              </a:spcAft>
-              <a:defRPr sz="2000" b="1">
-                <a:latin typeface="Arial" charset="0"/>
-              </a:defRPr>
-            </a:lvl4pPr>
-            <a:lvl5pPr eaLnBrk="0" fontAlgn="base" hangingPunct="0">
-              <a:spcBef>
-                <a:spcPct val="0"/>
-              </a:spcBef>
-              <a:spcAft>
-                <a:spcPct val="0"/>
-              </a:spcAft>
-              <a:defRPr sz="2000" b="1">
-                <a:latin typeface="Arial" charset="0"/>
-              </a:defRPr>
-            </a:lvl5pPr>
-            <a:lvl6pPr marL="457200" fontAlgn="base">
-              <a:spcBef>
-                <a:spcPct val="0"/>
-              </a:spcBef>
-              <a:spcAft>
-                <a:spcPct val="0"/>
-              </a:spcAft>
-              <a:defRPr sz="2000" b="1">
-                <a:latin typeface="Arial" charset="0"/>
-              </a:defRPr>
-            </a:lvl6pPr>
-            <a:lvl7pPr marL="914400" fontAlgn="base">
-              <a:spcBef>
-                <a:spcPct val="0"/>
-              </a:spcBef>
-              <a:spcAft>
-                <a:spcPct val="0"/>
-              </a:spcAft>
-              <a:defRPr sz="2000" b="1">
-                <a:latin typeface="Arial" charset="0"/>
-              </a:defRPr>
-            </a:lvl7pPr>
-            <a:lvl8pPr marL="1371600" fontAlgn="base">
-              <a:spcBef>
-                <a:spcPct val="0"/>
-              </a:spcBef>
-              <a:spcAft>
-                <a:spcPct val="0"/>
-              </a:spcAft>
-              <a:defRPr sz="2000" b="1">
-                <a:latin typeface="Arial" charset="0"/>
-              </a:defRPr>
-            </a:lvl8pPr>
-            <a:lvl9pPr marL="1828800" fontAlgn="base">
-              <a:spcBef>
-                <a:spcPct val="0"/>
-              </a:spcBef>
-              <a:spcAft>
-                <a:spcPct val="0"/>
-              </a:spcAft>
-              <a:defRPr sz="2000" b="1">
-                <a:latin typeface="Arial" charset="0"/>
-              </a:defRPr>
-            </a:lvl9pPr>
-          </a:lstStyle>
-          <a:p>
-            <a:r>
-              <a:rPr lang="en-US" sz="5400" dirty="0" smtClean="0"/>
-              <a:t>Python is free</a:t>
-            </a:r>
-            <a:endParaRPr lang="en-US" sz="5400" dirty="0"/>
           </a:p>
         </p:txBody>
       </p:sp>
     </p:spTree>
     <p:extLst>
       <p:ext uri="{BB962C8B-B14F-4D97-AF65-F5344CB8AC3E}">
-        <p14:creationId xmlns:p14="http://schemas.microsoft.com/office/powerpoint/2010/main" val="1124046397"/>
+        <p14:creationId xmlns:p14="http://schemas.microsoft.com/office/powerpoint/2010/main" val="3808562461"/>
       </p:ext>
     </p:extLst>
   </p:cSld>
@@ -4800,7 +4556,7 @@
   <p:timing>
     <p:tnLst>
       <p:par>
-        <p:cTn id="1" dur="indefinite" restart="never" nodeType="tmRoot"/>
+        <p:cTn xmlns:p14="http://schemas.microsoft.com/office/powerpoint/2010/main" id="1" dur="indefinite" restart="never" nodeType="tmRoot"/>
       </p:par>
     </p:tnLst>
   </p:timing>
@@ -4845,14 +4601,14 @@
             <a:noFill/>
           </a:ln>
           <a:extLst>
-            <a:ext uri="{909E8E84-426E-40DD-AFC4-6F175D3DCCD1}">
+            <a:ext uri="{909E8E84-426E-40dd-AFC4-6F175D3DCCD1}">
               <a14:hiddenFill xmlns:a14="http://schemas.microsoft.com/office/drawing/2010/main">
                 <a:solidFill>
                   <a:srgbClr val="FFFFFF"/>
                 </a:solidFill>
               </a14:hiddenFill>
             </a:ext>
-            <a:ext uri="{91240B29-F687-4F45-9708-019B960494DF}">
+            <a:ext uri="{91240B29-F687-4f45-9708-019B960494DF}">
               <a14:hiddenLine xmlns:a14="http://schemas.microsoft.com/office/drawing/2010/main" w="9525">
                 <a:solidFill>
                   <a:srgbClr val="000000"/>
@@ -4986,7 +4742,7 @@
                   <a:srgbClr val="3366FF"/>
                 </a:solidFill>
               </a:rPr>
-              <a:t>#2</a:t>
+              <a:t>#1</a:t>
             </a:r>
             <a:endParaRPr lang="en-US" sz="8000" dirty="0">
               <a:solidFill>
@@ -5017,14 +4773,14 @@
             <a:noFill/>
           </a:ln>
           <a:extLst>
-            <a:ext uri="{909E8E84-426E-40DD-AFC4-6F175D3DCCD1}">
+            <a:ext uri="{909E8E84-426E-40dd-AFC4-6F175D3DCCD1}">
               <a14:hiddenFill xmlns:a14="http://schemas.microsoft.com/office/drawing/2010/main">
                 <a:solidFill>
                   <a:srgbClr val="FFFFFF"/>
                 </a:solidFill>
               </a14:hiddenFill>
             </a:ext>
-            <a:ext uri="{91240B29-F687-4F45-9708-019B960494DF}">
+            <a:ext uri="{91240B29-F687-4f45-9708-019B960494DF}">
               <a14:hiddenLine xmlns:a14="http://schemas.microsoft.com/office/drawing/2010/main" w="9525">
                 <a:solidFill>
                   <a:srgbClr val="000000"/>
@@ -5154,7 +4910,7 @@
           <a:p>
             <a:r>
               <a:rPr lang="en-US" sz="5400" dirty="0" smtClean="0"/>
-              <a:t>Python is a general purpose language</a:t>
+              <a:t>Python is free</a:t>
             </a:r>
             <a:endParaRPr lang="en-US" sz="5400" dirty="0"/>
           </a:p>
@@ -5163,7 +4919,7 @@
     </p:spTree>
     <p:extLst>
       <p:ext uri="{BB962C8B-B14F-4D97-AF65-F5344CB8AC3E}">
-        <p14:creationId xmlns:p14="http://schemas.microsoft.com/office/powerpoint/2010/main" val="3699404758"/>
+        <p14:creationId xmlns:p14="http://schemas.microsoft.com/office/powerpoint/2010/main" val="1124046397"/>
       </p:ext>
     </p:extLst>
   </p:cSld>
@@ -5173,7 +4929,7 @@
   <p:timing>
     <p:tnLst>
       <p:par>
-        <p:cTn id="1" dur="indefinite" restart="never" nodeType="tmRoot"/>
+        <p:cTn xmlns:p14="http://schemas.microsoft.com/office/powerpoint/2010/main" id="1" dur="indefinite" restart="never" nodeType="tmRoot"/>
       </p:par>
     </p:tnLst>
   </p:timing>
@@ -5218,14 +4974,14 @@
             <a:noFill/>
           </a:ln>
           <a:extLst>
-            <a:ext uri="{909E8E84-426E-40DD-AFC4-6F175D3DCCD1}">
+            <a:ext uri="{909E8E84-426E-40dd-AFC4-6F175D3DCCD1}">
               <a14:hiddenFill xmlns:a14="http://schemas.microsoft.com/office/drawing/2010/main">
                 <a:solidFill>
                   <a:srgbClr val="FFFFFF"/>
                 </a:solidFill>
               </a14:hiddenFill>
             </a:ext>
-            <a:ext uri="{91240B29-F687-4F45-9708-019B960494DF}">
+            <a:ext uri="{91240B29-F687-4f45-9708-019B960494DF}">
               <a14:hiddenLine xmlns:a14="http://schemas.microsoft.com/office/drawing/2010/main" w="9525">
                 <a:solidFill>
                   <a:srgbClr val="000000"/>
@@ -5359,7 +5115,7 @@
                   <a:srgbClr val="3366FF"/>
                 </a:solidFill>
               </a:rPr>
-              <a:t>#3</a:t>
+              <a:t>#2</a:t>
             </a:r>
             <a:endParaRPr lang="en-US" sz="8000" dirty="0">
               <a:solidFill>
@@ -5390,14 +5146,14 @@
             <a:noFill/>
           </a:ln>
           <a:extLst>
-            <a:ext uri="{909E8E84-426E-40DD-AFC4-6F175D3DCCD1}">
+            <a:ext uri="{909E8E84-426E-40dd-AFC4-6F175D3DCCD1}">
               <a14:hiddenFill xmlns:a14="http://schemas.microsoft.com/office/drawing/2010/main">
                 <a:solidFill>
                   <a:srgbClr val="FFFFFF"/>
                 </a:solidFill>
               </a14:hiddenFill>
             </a:ext>
-            <a:ext uri="{91240B29-F687-4F45-9708-019B960494DF}">
+            <a:ext uri="{91240B29-F687-4f45-9708-019B960494DF}">
               <a14:hiddenLine xmlns:a14="http://schemas.microsoft.com/office/drawing/2010/main" w="9525">
                 <a:solidFill>
                   <a:srgbClr val="000000"/>
@@ -5527,6 +5283,379 @@
           <a:p>
             <a:r>
               <a:rPr lang="en-US" sz="5400" dirty="0" smtClean="0"/>
+              <a:t>Python is a general purpose language</a:t>
+            </a:r>
+            <a:endParaRPr lang="en-US" sz="5400" dirty="0"/>
+          </a:p>
+        </p:txBody>
+      </p:sp>
+    </p:spTree>
+    <p:extLst>
+      <p:ext uri="{BB962C8B-B14F-4D97-AF65-F5344CB8AC3E}">
+        <p14:creationId xmlns:p14="http://schemas.microsoft.com/office/powerpoint/2010/main" val="3699404758"/>
+      </p:ext>
+    </p:extLst>
+  </p:cSld>
+  <p:clrMapOvr>
+    <a:masterClrMapping/>
+  </p:clrMapOvr>
+  <p:timing>
+    <p:tnLst>
+      <p:par>
+        <p:cTn xmlns:p14="http://schemas.microsoft.com/office/powerpoint/2010/main" id="1" dur="indefinite" restart="never" nodeType="tmRoot"/>
+      </p:par>
+    </p:tnLst>
+  </p:timing>
+</p:sld>
+</file>
+
+<file path=ppt/slides/slide13.xml><?xml version="1.0" encoding="utf-8"?>
+<p:sld xmlns:a="http://schemas.openxmlformats.org/drawingml/2006/main" xmlns:r="http://schemas.openxmlformats.org/officeDocument/2006/relationships" xmlns:p="http://schemas.openxmlformats.org/presentationml/2006/main">
+  <p:cSld>
+    <p:spTree>
+      <p:nvGrpSpPr>
+        <p:cNvPr id="1" name=""/>
+        <p:cNvGrpSpPr/>
+        <p:nvPr/>
+      </p:nvGrpSpPr>
+      <p:grpSpPr>
+        <a:xfrm>
+          <a:off x="0" y="0"/>
+          <a:ext cx="0" cy="0"/>
+          <a:chOff x="0" y="0"/>
+          <a:chExt cx="0" cy="0"/>
+        </a:xfrm>
+      </p:grpSpPr>
+      <p:sp>
+        <p:nvSpPr>
+          <p:cNvPr id="10" name="Title 1"/>
+          <p:cNvSpPr txBox="1">
+            <a:spLocks/>
+          </p:cNvSpPr>
+          <p:nvPr/>
+        </p:nvSpPr>
+        <p:spPr>
+          <a:xfrm>
+            <a:off x="762000" y="1676400"/>
+            <a:ext cx="3581400" cy="1248614"/>
+          </a:xfrm>
+          <a:prstGeom prst="rect">
+            <a:avLst/>
+          </a:prstGeom>
+          <a:noFill/>
+          <a:ln>
+            <a:noFill/>
+          </a:ln>
+          <a:extLst>
+            <a:ext uri="{909E8E84-426E-40dd-AFC4-6F175D3DCCD1}">
+              <a14:hiddenFill xmlns:a14="http://schemas.microsoft.com/office/drawing/2010/main">
+                <a:solidFill>
+                  <a:srgbClr val="FFFFFF"/>
+                </a:solidFill>
+              </a14:hiddenFill>
+            </a:ext>
+            <a:ext uri="{91240B29-F687-4f45-9708-019B960494DF}">
+              <a14:hiddenLine xmlns:a14="http://schemas.microsoft.com/office/drawing/2010/main" w="9525">
+                <a:solidFill>
+                  <a:srgbClr val="000000"/>
+                </a:solidFill>
+                <a:miter lim="800000"/>
+                <a:headEnd/>
+                <a:tailEnd/>
+              </a14:hiddenLine>
+            </a:ext>
+          </a:extLst>
+        </p:spPr>
+        <p:txBody>
+          <a:bodyPr vert="horz" wrap="square" lIns="0" tIns="0" rIns="0" bIns="0" numCol="1" anchor="ctr" anchorCtr="0" compatLnSpc="1">
+            <a:prstTxWarp prst="textNoShape">
+              <a:avLst/>
+            </a:prstTxWarp>
+          </a:bodyPr>
+          <a:lstStyle>
+            <a:lvl1pPr eaLnBrk="0" fontAlgn="base" hangingPunct="0">
+              <a:spcBef>
+                <a:spcPct val="0"/>
+              </a:spcBef>
+              <a:spcAft>
+                <a:spcPct val="0"/>
+              </a:spcAft>
+              <a:defRPr sz="4000" b="1">
+                <a:solidFill>
+                  <a:schemeClr val="tx1">
+                    <a:lumMod val="85000"/>
+                    <a:lumOff val="15000"/>
+                  </a:schemeClr>
+                </a:solidFill>
+                <a:latin typeface="+mj-lt"/>
+                <a:ea typeface="+mj-ea"/>
+                <a:cs typeface="+mj-cs"/>
+              </a:defRPr>
+            </a:lvl1pPr>
+            <a:lvl2pPr eaLnBrk="0" fontAlgn="base" hangingPunct="0">
+              <a:spcBef>
+                <a:spcPct val="0"/>
+              </a:spcBef>
+              <a:spcAft>
+                <a:spcPct val="0"/>
+              </a:spcAft>
+              <a:defRPr sz="2000" b="1">
+                <a:latin typeface="Arial" charset="0"/>
+              </a:defRPr>
+            </a:lvl2pPr>
+            <a:lvl3pPr eaLnBrk="0" fontAlgn="base" hangingPunct="0">
+              <a:spcBef>
+                <a:spcPct val="0"/>
+              </a:spcBef>
+              <a:spcAft>
+                <a:spcPct val="0"/>
+              </a:spcAft>
+              <a:defRPr sz="2000" b="1">
+                <a:latin typeface="Arial" charset="0"/>
+              </a:defRPr>
+            </a:lvl3pPr>
+            <a:lvl4pPr eaLnBrk="0" fontAlgn="base" hangingPunct="0">
+              <a:spcBef>
+                <a:spcPct val="0"/>
+              </a:spcBef>
+              <a:spcAft>
+                <a:spcPct val="0"/>
+              </a:spcAft>
+              <a:defRPr sz="2000" b="1">
+                <a:latin typeface="Arial" charset="0"/>
+              </a:defRPr>
+            </a:lvl4pPr>
+            <a:lvl5pPr eaLnBrk="0" fontAlgn="base" hangingPunct="0">
+              <a:spcBef>
+                <a:spcPct val="0"/>
+              </a:spcBef>
+              <a:spcAft>
+                <a:spcPct val="0"/>
+              </a:spcAft>
+              <a:defRPr sz="2000" b="1">
+                <a:latin typeface="Arial" charset="0"/>
+              </a:defRPr>
+            </a:lvl5pPr>
+            <a:lvl6pPr marL="457200" fontAlgn="base">
+              <a:spcBef>
+                <a:spcPct val="0"/>
+              </a:spcBef>
+              <a:spcAft>
+                <a:spcPct val="0"/>
+              </a:spcAft>
+              <a:defRPr sz="2000" b="1">
+                <a:latin typeface="Arial" charset="0"/>
+              </a:defRPr>
+            </a:lvl6pPr>
+            <a:lvl7pPr marL="914400" fontAlgn="base">
+              <a:spcBef>
+                <a:spcPct val="0"/>
+              </a:spcBef>
+              <a:spcAft>
+                <a:spcPct val="0"/>
+              </a:spcAft>
+              <a:defRPr sz="2000" b="1">
+                <a:latin typeface="Arial" charset="0"/>
+              </a:defRPr>
+            </a:lvl7pPr>
+            <a:lvl8pPr marL="1371600" fontAlgn="base">
+              <a:spcBef>
+                <a:spcPct val="0"/>
+              </a:spcBef>
+              <a:spcAft>
+                <a:spcPct val="0"/>
+              </a:spcAft>
+              <a:defRPr sz="2000" b="1">
+                <a:latin typeface="Arial" charset="0"/>
+              </a:defRPr>
+            </a:lvl8pPr>
+            <a:lvl9pPr marL="1828800" fontAlgn="base">
+              <a:spcBef>
+                <a:spcPct val="0"/>
+              </a:spcBef>
+              <a:spcAft>
+                <a:spcPct val="0"/>
+              </a:spcAft>
+              <a:defRPr sz="2000" b="1">
+                <a:latin typeface="Arial" charset="0"/>
+              </a:defRPr>
+            </a:lvl9pPr>
+          </a:lstStyle>
+          <a:p>
+            <a:r>
+              <a:rPr lang="en-US" sz="8000" dirty="0" smtClean="0">
+                <a:solidFill>
+                  <a:srgbClr val="3366FF"/>
+                </a:solidFill>
+              </a:rPr>
+              <a:t>#3</a:t>
+            </a:r>
+            <a:endParaRPr lang="en-US" sz="8000" dirty="0">
+              <a:solidFill>
+                <a:srgbClr val="3366FF"/>
+              </a:solidFill>
+            </a:endParaRPr>
+          </a:p>
+        </p:txBody>
+      </p:sp>
+      <p:sp>
+        <p:nvSpPr>
+          <p:cNvPr id="11" name="Title 1"/>
+          <p:cNvSpPr txBox="1">
+            <a:spLocks/>
+          </p:cNvSpPr>
+          <p:nvPr/>
+        </p:nvSpPr>
+        <p:spPr>
+          <a:xfrm>
+            <a:off x="685800" y="2960033"/>
+            <a:ext cx="8001000" cy="2069167"/>
+          </a:xfrm>
+          <a:prstGeom prst="rect">
+            <a:avLst/>
+          </a:prstGeom>
+          <a:noFill/>
+          <a:ln>
+            <a:noFill/>
+          </a:ln>
+          <a:extLst>
+            <a:ext uri="{909E8E84-426E-40dd-AFC4-6F175D3DCCD1}">
+              <a14:hiddenFill xmlns:a14="http://schemas.microsoft.com/office/drawing/2010/main">
+                <a:solidFill>
+                  <a:srgbClr val="FFFFFF"/>
+                </a:solidFill>
+              </a14:hiddenFill>
+            </a:ext>
+            <a:ext uri="{91240B29-F687-4f45-9708-019B960494DF}">
+              <a14:hiddenLine xmlns:a14="http://schemas.microsoft.com/office/drawing/2010/main" w="9525">
+                <a:solidFill>
+                  <a:srgbClr val="000000"/>
+                </a:solidFill>
+                <a:miter lim="800000"/>
+                <a:headEnd/>
+                <a:tailEnd/>
+              </a14:hiddenLine>
+            </a:ext>
+          </a:extLst>
+        </p:spPr>
+        <p:txBody>
+          <a:bodyPr vert="horz" wrap="square" lIns="0" tIns="0" rIns="0" bIns="0" numCol="1" anchor="t" anchorCtr="0" compatLnSpc="1">
+            <a:prstTxWarp prst="textNoShape">
+              <a:avLst/>
+            </a:prstTxWarp>
+          </a:bodyPr>
+          <a:lstStyle>
+            <a:lvl1pPr eaLnBrk="0" fontAlgn="base" hangingPunct="0">
+              <a:spcBef>
+                <a:spcPct val="0"/>
+              </a:spcBef>
+              <a:spcAft>
+                <a:spcPct val="0"/>
+              </a:spcAft>
+              <a:defRPr sz="4000" b="1">
+                <a:solidFill>
+                  <a:schemeClr val="tx1">
+                    <a:lumMod val="85000"/>
+                    <a:lumOff val="15000"/>
+                  </a:schemeClr>
+                </a:solidFill>
+                <a:latin typeface="+mj-lt"/>
+                <a:ea typeface="+mj-ea"/>
+                <a:cs typeface="+mj-cs"/>
+              </a:defRPr>
+            </a:lvl1pPr>
+            <a:lvl2pPr eaLnBrk="0" fontAlgn="base" hangingPunct="0">
+              <a:spcBef>
+                <a:spcPct val="0"/>
+              </a:spcBef>
+              <a:spcAft>
+                <a:spcPct val="0"/>
+              </a:spcAft>
+              <a:defRPr sz="2000" b="1">
+                <a:latin typeface="Arial" charset="0"/>
+              </a:defRPr>
+            </a:lvl2pPr>
+            <a:lvl3pPr eaLnBrk="0" fontAlgn="base" hangingPunct="0">
+              <a:spcBef>
+                <a:spcPct val="0"/>
+              </a:spcBef>
+              <a:spcAft>
+                <a:spcPct val="0"/>
+              </a:spcAft>
+              <a:defRPr sz="2000" b="1">
+                <a:latin typeface="Arial" charset="0"/>
+              </a:defRPr>
+            </a:lvl3pPr>
+            <a:lvl4pPr eaLnBrk="0" fontAlgn="base" hangingPunct="0">
+              <a:spcBef>
+                <a:spcPct val="0"/>
+              </a:spcBef>
+              <a:spcAft>
+                <a:spcPct val="0"/>
+              </a:spcAft>
+              <a:defRPr sz="2000" b="1">
+                <a:latin typeface="Arial" charset="0"/>
+              </a:defRPr>
+            </a:lvl4pPr>
+            <a:lvl5pPr eaLnBrk="0" fontAlgn="base" hangingPunct="0">
+              <a:spcBef>
+                <a:spcPct val="0"/>
+              </a:spcBef>
+              <a:spcAft>
+                <a:spcPct val="0"/>
+              </a:spcAft>
+              <a:defRPr sz="2000" b="1">
+                <a:latin typeface="Arial" charset="0"/>
+              </a:defRPr>
+            </a:lvl5pPr>
+            <a:lvl6pPr marL="457200" fontAlgn="base">
+              <a:spcBef>
+                <a:spcPct val="0"/>
+              </a:spcBef>
+              <a:spcAft>
+                <a:spcPct val="0"/>
+              </a:spcAft>
+              <a:defRPr sz="2000" b="1">
+                <a:latin typeface="Arial" charset="0"/>
+              </a:defRPr>
+            </a:lvl6pPr>
+            <a:lvl7pPr marL="914400" fontAlgn="base">
+              <a:spcBef>
+                <a:spcPct val="0"/>
+              </a:spcBef>
+              <a:spcAft>
+                <a:spcPct val="0"/>
+              </a:spcAft>
+              <a:defRPr sz="2000" b="1">
+                <a:latin typeface="Arial" charset="0"/>
+              </a:defRPr>
+            </a:lvl7pPr>
+            <a:lvl8pPr marL="1371600" fontAlgn="base">
+              <a:spcBef>
+                <a:spcPct val="0"/>
+              </a:spcBef>
+              <a:spcAft>
+                <a:spcPct val="0"/>
+              </a:spcAft>
+              <a:defRPr sz="2000" b="1">
+                <a:latin typeface="Arial" charset="0"/>
+              </a:defRPr>
+            </a:lvl8pPr>
+            <a:lvl9pPr marL="1828800" fontAlgn="base">
+              <a:spcBef>
+                <a:spcPct val="0"/>
+              </a:spcBef>
+              <a:spcAft>
+                <a:spcPct val="0"/>
+              </a:spcAft>
+              <a:defRPr sz="2000" b="1">
+                <a:latin typeface="Arial" charset="0"/>
+              </a:defRPr>
+            </a:lvl9pPr>
+          </a:lstStyle>
+          <a:p>
+            <a:r>
+              <a:rPr lang="en-US" sz="5400" dirty="0" smtClean="0"/>
               <a:t>Python is designed for ease of use</a:t>
             </a:r>
             <a:endParaRPr lang="en-US" sz="5400" dirty="0"/>
@@ -5546,14 +5675,14 @@
   <p:timing>
     <p:tnLst>
       <p:par>
-        <p:cTn id="1" dur="indefinite" restart="never" nodeType="tmRoot"/>
+        <p:cTn xmlns:p14="http://schemas.microsoft.com/office/powerpoint/2010/main" id="1" dur="indefinite" restart="never" nodeType="tmRoot"/>
       </p:par>
     </p:tnLst>
   </p:timing>
 </p:sld>
 </file>
 
-<file path=ppt/slides/slide13.xml><?xml version="1.0" encoding="utf-8"?>
+<file path=ppt/slides/slide14.xml><?xml version="1.0" encoding="utf-8"?>
 <p:sld xmlns:a="http://schemas.openxmlformats.org/drawingml/2006/main" xmlns:r="http://schemas.openxmlformats.org/officeDocument/2006/relationships" xmlns:p="http://schemas.openxmlformats.org/presentationml/2006/main">
   <p:cSld>
     <p:spTree>
@@ -5670,7 +5799,7 @@
             <a:tailEnd/>
           </a:ln>
           <a:extLst>
-            <a:ext uri="{909E8E84-426E-40DD-AFC4-6F175D3DCCD1}">
+            <a:ext uri="{909E8E84-426E-40dd-AFC4-6F175D3DCCD1}">
               <a14:hiddenFill xmlns:a14="http://schemas.microsoft.com/office/drawing/2010/main">
                 <a:solidFill>
                   <a:schemeClr val="accent1"/>
@@ -5693,14 +5822,14 @@
   <p:timing>
     <p:tnLst>
       <p:par>
-        <p:cTn id="1" dur="indefinite" restart="never" nodeType="tmRoot"/>
+        <p:cTn xmlns:p14="http://schemas.microsoft.com/office/powerpoint/2010/main" id="1" dur="indefinite" restart="never" nodeType="tmRoot"/>
       </p:par>
     </p:tnLst>
   </p:timing>
 </p:sld>
 </file>
 
-<file path=ppt/slides/slide14.xml><?xml version="1.0" encoding="utf-8"?>
+<file path=ppt/slides/slide15.xml><?xml version="1.0" encoding="utf-8"?>
 <p:sld xmlns:a="http://schemas.openxmlformats.org/drawingml/2006/main" xmlns:r="http://schemas.openxmlformats.org/officeDocument/2006/relationships" xmlns:p="http://schemas.openxmlformats.org/presentationml/2006/main">
   <p:cSld>
     <p:spTree>
@@ -5738,14 +5867,14 @@
             <a:noFill/>
           </a:ln>
           <a:extLst>
-            <a:ext uri="{909E8E84-426E-40DD-AFC4-6F175D3DCCD1}">
+            <a:ext uri="{909E8E84-426E-40dd-AFC4-6F175D3DCCD1}">
               <a14:hiddenFill xmlns:a14="http://schemas.microsoft.com/office/drawing/2010/main">
                 <a:solidFill>
                   <a:srgbClr val="FFFFFF"/>
                 </a:solidFill>
               </a14:hiddenFill>
             </a:ext>
-            <a:ext uri="{91240B29-F687-4F45-9708-019B960494DF}">
+            <a:ext uri="{91240B29-F687-4f45-9708-019B960494DF}">
               <a14:hiddenLine xmlns:a14="http://schemas.microsoft.com/office/drawing/2010/main" w="9525">
                 <a:solidFill>
                   <a:srgbClr val="000000"/>
@@ -5910,14 +6039,14 @@
             <a:noFill/>
           </a:ln>
           <a:extLst>
-            <a:ext uri="{909E8E84-426E-40DD-AFC4-6F175D3DCCD1}">
+            <a:ext uri="{909E8E84-426E-40dd-AFC4-6F175D3DCCD1}">
               <a14:hiddenFill xmlns:a14="http://schemas.microsoft.com/office/drawing/2010/main">
                 <a:solidFill>
                   <a:srgbClr val="FFFFFF"/>
                 </a:solidFill>
               </a14:hiddenFill>
             </a:ext>
-            <a:ext uri="{91240B29-F687-4F45-9708-019B960494DF}">
+            <a:ext uri="{91240B29-F687-4f45-9708-019B960494DF}">
               <a14:hiddenLine xmlns:a14="http://schemas.microsoft.com/office/drawing/2010/main" w="9525">
                 <a:solidFill>
                   <a:srgbClr val="000000"/>
@@ -6066,14 +6195,14 @@
   <p:timing>
     <p:tnLst>
       <p:par>
-        <p:cTn id="1" dur="indefinite" restart="never" nodeType="tmRoot"/>
+        <p:cTn xmlns:p14="http://schemas.microsoft.com/office/powerpoint/2010/main" id="1" dur="indefinite" restart="never" nodeType="tmRoot"/>
       </p:par>
     </p:tnLst>
   </p:timing>
 </p:sld>
 </file>
 
-<file path=ppt/slides/slide15.xml><?xml version="1.0" encoding="utf-8"?>
+<file path=ppt/slides/slide16.xml><?xml version="1.0" encoding="utf-8"?>
 <p:sld xmlns:a="http://schemas.openxmlformats.org/drawingml/2006/main" xmlns:r="http://schemas.openxmlformats.org/officeDocument/2006/relationships" xmlns:p="http://schemas.openxmlformats.org/presentationml/2006/main">
   <p:cSld>
     <p:spTree>
@@ -8672,212 +8801,7 @@
   <p:timing>
     <p:tnLst>
       <p:par>
-        <p:cTn id="1" dur="indefinite" restart="never" nodeType="tmRoot"/>
-      </p:par>
-    </p:tnLst>
-  </p:timing>
-</p:sld>
-</file>
-
-<file path=ppt/slides/slide16.xml><?xml version="1.0" encoding="utf-8"?>
-<p:sld xmlns:a="http://schemas.openxmlformats.org/drawingml/2006/main" xmlns:r="http://schemas.openxmlformats.org/officeDocument/2006/relationships" xmlns:p="http://schemas.openxmlformats.org/presentationml/2006/main">
-  <p:cSld>
-    <p:spTree>
-      <p:nvGrpSpPr>
-        <p:cNvPr id="1" name=""/>
-        <p:cNvGrpSpPr/>
-        <p:nvPr/>
-      </p:nvGrpSpPr>
-      <p:grpSpPr>
-        <a:xfrm>
-          <a:off x="0" y="0"/>
-          <a:ext cx="0" cy="0"/>
-          <a:chOff x="0" y="0"/>
-          <a:chExt cx="0" cy="0"/>
-        </a:xfrm>
-      </p:grpSpPr>
-      <p:sp>
-        <p:nvSpPr>
-          <p:cNvPr id="2" name="Title 1"/>
-          <p:cNvSpPr txBox="1">
-            <a:spLocks/>
-          </p:cNvSpPr>
-          <p:nvPr/>
-        </p:nvSpPr>
-        <p:spPr>
-          <a:xfrm>
-            <a:off x="825982" y="2645647"/>
-            <a:ext cx="7492037" cy="1248614"/>
-          </a:xfrm>
-          <a:prstGeom prst="rect">
-            <a:avLst/>
-          </a:prstGeom>
-          <a:noFill/>
-          <a:ln>
-            <a:noFill/>
-          </a:ln>
-          <a:extLst>
-            <a:ext uri="{909E8E84-426E-40DD-AFC4-6F175D3DCCD1}">
-              <a14:hiddenFill xmlns:a14="http://schemas.microsoft.com/office/drawing/2010/main">
-                <a:solidFill>
-                  <a:srgbClr val="FFFFFF"/>
-                </a:solidFill>
-              </a14:hiddenFill>
-            </a:ext>
-            <a:ext uri="{91240B29-F687-4F45-9708-019B960494DF}">
-              <a14:hiddenLine xmlns:a14="http://schemas.microsoft.com/office/drawing/2010/main" w="9525">
-                <a:solidFill>
-                  <a:srgbClr val="000000"/>
-                </a:solidFill>
-                <a:miter lim="800000"/>
-                <a:headEnd/>
-                <a:tailEnd/>
-              </a14:hiddenLine>
-            </a:ext>
-          </a:extLst>
-        </p:spPr>
-        <p:txBody>
-          <a:bodyPr vert="horz" wrap="square" lIns="0" tIns="0" rIns="0" bIns="0" numCol="1" anchor="ctr" anchorCtr="0" compatLnSpc="1">
-            <a:prstTxWarp prst="textNoShape">
-              <a:avLst/>
-            </a:prstTxWarp>
-          </a:bodyPr>
-          <a:lstStyle>
-            <a:lvl1pPr eaLnBrk="0" fontAlgn="base" hangingPunct="0">
-              <a:spcBef>
-                <a:spcPct val="0"/>
-              </a:spcBef>
-              <a:spcAft>
-                <a:spcPct val="0"/>
-              </a:spcAft>
-              <a:defRPr sz="4000" b="1">
-                <a:solidFill>
-                  <a:schemeClr val="tx1">
-                    <a:lumMod val="85000"/>
-                    <a:lumOff val="15000"/>
-                  </a:schemeClr>
-                </a:solidFill>
-                <a:latin typeface="+mj-lt"/>
-                <a:ea typeface="+mj-ea"/>
-                <a:cs typeface="+mj-cs"/>
-              </a:defRPr>
-            </a:lvl1pPr>
-            <a:lvl2pPr eaLnBrk="0" fontAlgn="base" hangingPunct="0">
-              <a:spcBef>
-                <a:spcPct val="0"/>
-              </a:spcBef>
-              <a:spcAft>
-                <a:spcPct val="0"/>
-              </a:spcAft>
-              <a:defRPr sz="2000" b="1">
-                <a:latin typeface="Arial" charset="0"/>
-              </a:defRPr>
-            </a:lvl2pPr>
-            <a:lvl3pPr eaLnBrk="0" fontAlgn="base" hangingPunct="0">
-              <a:spcBef>
-                <a:spcPct val="0"/>
-              </a:spcBef>
-              <a:spcAft>
-                <a:spcPct val="0"/>
-              </a:spcAft>
-              <a:defRPr sz="2000" b="1">
-                <a:latin typeface="Arial" charset="0"/>
-              </a:defRPr>
-            </a:lvl3pPr>
-            <a:lvl4pPr eaLnBrk="0" fontAlgn="base" hangingPunct="0">
-              <a:spcBef>
-                <a:spcPct val="0"/>
-              </a:spcBef>
-              <a:spcAft>
-                <a:spcPct val="0"/>
-              </a:spcAft>
-              <a:defRPr sz="2000" b="1">
-                <a:latin typeface="Arial" charset="0"/>
-              </a:defRPr>
-            </a:lvl4pPr>
-            <a:lvl5pPr eaLnBrk="0" fontAlgn="base" hangingPunct="0">
-              <a:spcBef>
-                <a:spcPct val="0"/>
-              </a:spcBef>
-              <a:spcAft>
-                <a:spcPct val="0"/>
-              </a:spcAft>
-              <a:defRPr sz="2000" b="1">
-                <a:latin typeface="Arial" charset="0"/>
-              </a:defRPr>
-            </a:lvl5pPr>
-            <a:lvl6pPr marL="457200" fontAlgn="base">
-              <a:spcBef>
-                <a:spcPct val="0"/>
-              </a:spcBef>
-              <a:spcAft>
-                <a:spcPct val="0"/>
-              </a:spcAft>
-              <a:defRPr sz="2000" b="1">
-                <a:latin typeface="Arial" charset="0"/>
-              </a:defRPr>
-            </a:lvl6pPr>
-            <a:lvl7pPr marL="914400" fontAlgn="base">
-              <a:spcBef>
-                <a:spcPct val="0"/>
-              </a:spcBef>
-              <a:spcAft>
-                <a:spcPct val="0"/>
-              </a:spcAft>
-              <a:defRPr sz="2000" b="1">
-                <a:latin typeface="Arial" charset="0"/>
-              </a:defRPr>
-            </a:lvl7pPr>
-            <a:lvl8pPr marL="1371600" fontAlgn="base">
-              <a:spcBef>
-                <a:spcPct val="0"/>
-              </a:spcBef>
-              <a:spcAft>
-                <a:spcPct val="0"/>
-              </a:spcAft>
-              <a:defRPr sz="2000" b="1">
-                <a:latin typeface="Arial" charset="0"/>
-              </a:defRPr>
-            </a:lvl8pPr>
-            <a:lvl9pPr marL="1828800" fontAlgn="base">
-              <a:spcBef>
-                <a:spcPct val="0"/>
-              </a:spcBef>
-              <a:spcAft>
-                <a:spcPct val="0"/>
-              </a:spcAft>
-              <a:defRPr sz="2000" b="1">
-                <a:latin typeface="Arial" charset="0"/>
-              </a:defRPr>
-            </a:lvl9pPr>
-          </a:lstStyle>
-          <a:p>
-            <a:r>
-              <a:rPr lang="en-US" sz="5400" dirty="0" smtClean="0"/>
-              <a:t>Code Walkthrough &amp; Exercises</a:t>
-            </a:r>
-            <a:endParaRPr lang="en-US" sz="5400" dirty="0">
-              <a:solidFill>
-                <a:srgbClr val="3366FF"/>
-              </a:solidFill>
-            </a:endParaRPr>
-          </a:p>
-        </p:txBody>
-      </p:sp>
-    </p:spTree>
-    <p:extLst>
-      <p:ext uri="{BB962C8B-B14F-4D97-AF65-F5344CB8AC3E}">
-        <p14:creationId xmlns:p14="http://schemas.microsoft.com/office/powerpoint/2010/main" val="4206122067"/>
-      </p:ext>
-    </p:extLst>
-  </p:cSld>
-  <p:clrMapOvr>
-    <a:masterClrMapping/>
-  </p:clrMapOvr>
-  <p:timing>
-    <p:tnLst>
-      <p:par>
-        <p:cTn id="1" dur="indefinite" restart="never" nodeType="tmRoot"/>
+        <p:cTn xmlns:p14="http://schemas.microsoft.com/office/powerpoint/2010/main" id="1" dur="indefinite" restart="never" nodeType="tmRoot"/>
       </p:par>
     </p:tnLst>
   </p:timing>
@@ -8922,14 +8846,14 @@
             <a:noFill/>
           </a:ln>
           <a:extLst>
-            <a:ext uri="{909E8E84-426E-40DD-AFC4-6F175D3DCCD1}">
+            <a:ext uri="{909E8E84-426E-40dd-AFC4-6F175D3DCCD1}">
               <a14:hiddenFill xmlns:a14="http://schemas.microsoft.com/office/drawing/2010/main">
                 <a:solidFill>
                   <a:srgbClr val="FFFFFF"/>
                 </a:solidFill>
               </a14:hiddenFill>
             </a:ext>
-            <a:ext uri="{91240B29-F687-4F45-9708-019B960494DF}">
+            <a:ext uri="{91240B29-F687-4f45-9708-019B960494DF}">
               <a14:hiddenLine xmlns:a14="http://schemas.microsoft.com/office/drawing/2010/main" w="9525">
                 <a:solidFill>
                   <a:srgbClr val="000000"/>
@@ -9059,7 +8983,7 @@
           <a:p>
             <a:r>
               <a:rPr lang="en-US" sz="5400" dirty="0" smtClean="0"/>
-              <a:t>Resources</a:t>
+              <a:t>Code Walkthrough &amp; Exercises</a:t>
             </a:r>
             <a:endParaRPr lang="en-US" sz="5400" dirty="0">
               <a:solidFill>
@@ -9072,7 +8996,7 @@
     </p:spTree>
     <p:extLst>
       <p:ext uri="{BB962C8B-B14F-4D97-AF65-F5344CB8AC3E}">
-        <p14:creationId xmlns:p14="http://schemas.microsoft.com/office/powerpoint/2010/main" val="1776051389"/>
+        <p14:creationId xmlns:p14="http://schemas.microsoft.com/office/powerpoint/2010/main" val="4206122067"/>
       </p:ext>
     </p:extLst>
   </p:cSld>
@@ -9082,7 +9006,7 @@
   <p:timing>
     <p:tnLst>
       <p:par>
-        <p:cTn id="1" dur="indefinite" restart="never" nodeType="tmRoot"/>
+        <p:cTn xmlns:p14="http://schemas.microsoft.com/office/powerpoint/2010/main" id="1" dur="indefinite" restart="never" nodeType="tmRoot"/>
       </p:par>
     </p:tnLst>
   </p:timing>
@@ -9136,7 +9060,7 @@
                 </a:solidFill>
                 <a:latin typeface="+mj-lt"/>
               </a:rPr>
-              <a:t>Data Science in Python</a:t>
+              <a:t>Stay in touch</a:t>
             </a:r>
             <a:endParaRPr lang="en-US" sz="4000" dirty="0">
               <a:solidFill>
@@ -9170,14 +9094,14 @@
             <a:noFill/>
           </a:ln>
           <a:extLst>
-            <a:ext uri="{909E8E84-426E-40DD-AFC4-6F175D3DCCD1}">
+            <a:ext uri="{909E8E84-426E-40dd-AFC4-6F175D3DCCD1}">
               <a14:hiddenFill xmlns:a14="http://schemas.microsoft.com/office/drawing/2010/main">
                 <a:solidFill>
                   <a:srgbClr val="FFFFFF"/>
                 </a:solidFill>
               </a14:hiddenFill>
             </a:ext>
-            <a:ext uri="{91240B29-F687-4F45-9708-019B960494DF}">
+            <a:ext uri="{91240B29-F687-4f45-9708-019B960494DF}">
               <a14:hiddenLine xmlns:a14="http://schemas.microsoft.com/office/drawing/2010/main" w="9525">
                 <a:solidFill>
                   <a:srgbClr val="000000"/>
@@ -9213,8 +9137,43 @@
                 </a:solidFill>
                 <a:latin typeface="+mj-lt"/>
               </a:rPr>
-              <a:t>Python for Data Analysis</a:t>
+              <a:t>Twitter: </a:t>
             </a:r>
+            <a:r>
+              <a:rPr lang="en-US" sz="3200" dirty="0" smtClean="0">
+                <a:solidFill>
+                  <a:schemeClr val="tx1">
+                    <a:lumMod val="85000"/>
+                    <a:lumOff val="15000"/>
+                  </a:schemeClr>
+                </a:solidFill>
+                <a:latin typeface="+mj-lt"/>
+                <a:hlinkClick r:id="rId2"/>
+              </a:rPr>
+              <a:t>@</a:t>
+            </a:r>
+            <a:r>
+              <a:rPr lang="en-US" sz="3200" dirty="0" err="1" smtClean="0">
+                <a:solidFill>
+                  <a:schemeClr val="tx1">
+                    <a:lumMod val="85000"/>
+                    <a:lumOff val="15000"/>
+                  </a:schemeClr>
+                </a:solidFill>
+                <a:latin typeface="+mj-lt"/>
+                <a:hlinkClick r:id="rId2"/>
+              </a:rPr>
+              <a:t>josiahjdavis</a:t>
+            </a:r>
+            <a:endParaRPr lang="en-US" sz="3200" dirty="0" smtClean="0">
+              <a:solidFill>
+                <a:schemeClr val="tx1">
+                  <a:lumMod val="85000"/>
+                  <a:lumOff val="15000"/>
+                </a:schemeClr>
+              </a:solidFill>
+              <a:latin typeface="+mj-lt"/>
+            </a:endParaRPr>
           </a:p>
           <a:p>
             <a:pPr>
@@ -9234,7 +9193,20 @@
                 </a:solidFill>
                 <a:latin typeface="+mj-lt"/>
               </a:rPr>
-              <a:t>scikit-learn.org</a:t>
+              <a:t>E-mail: </a:t>
+            </a:r>
+            <a:r>
+              <a:rPr lang="en-US" sz="3200" dirty="0" err="1" smtClean="0">
+                <a:solidFill>
+                  <a:schemeClr val="tx1">
+                    <a:lumMod val="85000"/>
+                    <a:lumOff val="15000"/>
+                  </a:schemeClr>
+                </a:solidFill>
+                <a:latin typeface="+mj-lt"/>
+                <a:hlinkClick r:id="rId3"/>
+              </a:rPr>
+              <a:t>josiah.j.davis@gmail.com</a:t>
             </a:r>
             <a:endParaRPr lang="en-US" sz="3200" dirty="0">
               <a:solidFill>
@@ -9255,7 +9227,7 @@
               <a:buChar char="§"/>
             </a:pPr>
             <a:r>
-              <a:rPr lang="en-US" sz="3200" dirty="0">
+              <a:rPr lang="en-US" sz="3200" dirty="0" smtClean="0">
                 <a:solidFill>
                   <a:schemeClr val="tx1">
                     <a:lumMod val="85000"/>
@@ -9264,7 +9236,7 @@
                 </a:solidFill>
                 <a:latin typeface="+mj-lt"/>
               </a:rPr>
-              <a:t>General Assembly’s Data </a:t>
+              <a:t>Website: </a:t>
             </a:r>
             <a:r>
               <a:rPr lang="en-US" sz="3200" dirty="0" smtClean="0">
@@ -9275,293 +9247,11 @@
                   </a:schemeClr>
                 </a:solidFill>
                 <a:latin typeface="+mj-lt"/>
+                <a:hlinkClick r:id="rId4"/>
               </a:rPr>
-              <a:t>Science</a:t>
+              <a:t>www.josiahjdavis.com</a:t>
             </a:r>
-          </a:p>
-          <a:p>
-            <a:pPr>
-              <a:spcBef>
-                <a:spcPts val="1800"/>
-              </a:spcBef>
-              <a:buFont typeface="Wingdings" pitchFamily="2" charset="2"/>
-              <a:buChar char="§"/>
-            </a:pPr>
             <a:endParaRPr lang="en-US" sz="3200" dirty="0" smtClean="0">
-              <a:solidFill>
-                <a:schemeClr val="tx1">
-                  <a:lumMod val="85000"/>
-                  <a:lumOff val="15000"/>
-                </a:schemeClr>
-              </a:solidFill>
-              <a:latin typeface="+mj-lt"/>
-            </a:endParaRPr>
-          </a:p>
-          <a:p>
-            <a:pPr marL="0" indent="0">
-              <a:spcBef>
-                <a:spcPts val="1800"/>
-              </a:spcBef>
-            </a:pPr>
-            <a:endParaRPr lang="en-US" sz="3200" dirty="0">
-              <a:solidFill>
-                <a:schemeClr val="tx1">
-                  <a:lumMod val="85000"/>
-                  <a:lumOff val="15000"/>
-                </a:schemeClr>
-              </a:solidFill>
-              <a:latin typeface="+mj-lt"/>
-            </a:endParaRPr>
-          </a:p>
-          <a:p>
-            <a:pPr>
-              <a:spcBef>
-                <a:spcPts val="1800"/>
-              </a:spcBef>
-              <a:buFont typeface="Wingdings" pitchFamily="2" charset="2"/>
-              <a:buChar char="§"/>
-            </a:pPr>
-            <a:r>
-              <a:rPr lang="en-US" sz="3200" dirty="0">
-                <a:solidFill>
-                  <a:schemeClr val="tx1">
-                    <a:lumMod val="85000"/>
-                    <a:lumOff val="15000"/>
-                  </a:schemeClr>
-                </a:solidFill>
-                <a:latin typeface="+mj-lt"/>
-              </a:rPr>
-              <a:t>Introduction to Statistical Learning</a:t>
-            </a:r>
-          </a:p>
-          <a:p>
-            <a:pPr>
-              <a:spcBef>
-                <a:spcPts val="1800"/>
-              </a:spcBef>
-              <a:buFont typeface="Wingdings" pitchFamily="2" charset="2"/>
-              <a:buChar char="§"/>
-            </a:pPr>
-            <a:r>
-              <a:rPr lang="en-US" sz="3200" dirty="0" err="1">
-                <a:solidFill>
-                  <a:schemeClr val="tx1">
-                    <a:lumMod val="85000"/>
-                    <a:lumOff val="15000"/>
-                  </a:schemeClr>
-                </a:solidFill>
-                <a:latin typeface="+mj-lt"/>
-              </a:rPr>
-              <a:t>Coursera</a:t>
-            </a:r>
-            <a:r>
-              <a:rPr lang="en-US" sz="3200" dirty="0">
-                <a:solidFill>
-                  <a:schemeClr val="tx1">
-                    <a:lumMod val="85000"/>
-                    <a:lumOff val="15000"/>
-                  </a:schemeClr>
-                </a:solidFill>
-                <a:latin typeface="+mj-lt"/>
-              </a:rPr>
-              <a:t> Data Science Specialization</a:t>
-            </a:r>
-          </a:p>
-        </p:txBody>
-      </p:sp>
-      <p:sp>
-        <p:nvSpPr>
-          <p:cNvPr id="4" name="Title 1"/>
-          <p:cNvSpPr txBox="1">
-            <a:spLocks/>
-          </p:cNvSpPr>
-          <p:nvPr/>
-        </p:nvSpPr>
-        <p:spPr bwMode="auto">
-          <a:xfrm>
-            <a:off x="685800" y="4572000"/>
-            <a:ext cx="7863840" cy="365125"/>
-          </a:xfrm>
-          <a:prstGeom prst="rect">
-            <a:avLst/>
-          </a:prstGeom>
-          <a:noFill/>
-          <a:ln>
-            <a:noFill/>
-          </a:ln>
-          <a:extLst>
-            <a:ext uri="{909E8E84-426E-40DD-AFC4-6F175D3DCCD1}">
-              <a14:hiddenFill xmlns:a14="http://schemas.microsoft.com/office/drawing/2010/main">
-                <a:solidFill>
-                  <a:srgbClr val="FFFFFF"/>
-                </a:solidFill>
-              </a14:hiddenFill>
-            </a:ext>
-            <a:ext uri="{91240B29-F687-4F45-9708-019B960494DF}">
-              <a14:hiddenLine xmlns:a14="http://schemas.microsoft.com/office/drawing/2010/main" w="9525">
-                <a:solidFill>
-                  <a:srgbClr val="000000"/>
-                </a:solidFill>
-                <a:miter lim="800000"/>
-                <a:headEnd/>
-                <a:tailEnd/>
-              </a14:hiddenLine>
-            </a:ext>
-          </a:extLst>
-        </p:spPr>
-        <p:txBody>
-          <a:bodyPr vert="horz" wrap="square" lIns="0" tIns="0" rIns="0" bIns="0" numCol="1" anchor="b" anchorCtr="0" compatLnSpc="1">
-            <a:prstTxWarp prst="textNoShape">
-              <a:avLst/>
-            </a:prstTxWarp>
-          </a:bodyPr>
-          <a:lstStyle>
-            <a:lvl1pPr algn="l" rtl="0" eaLnBrk="0" fontAlgn="base" hangingPunct="0">
-              <a:spcBef>
-                <a:spcPct val="0"/>
-              </a:spcBef>
-              <a:spcAft>
-                <a:spcPct val="0"/>
-              </a:spcAft>
-              <a:defRPr sz="2400" b="1">
-                <a:solidFill>
-                  <a:schemeClr val="tx1">
-                    <a:lumMod val="75000"/>
-                    <a:lumOff val="25000"/>
-                  </a:schemeClr>
-                </a:solidFill>
-                <a:latin typeface="Georgia" panose="02040502050405020303" pitchFamily="18" charset="0"/>
-                <a:ea typeface="+mj-ea"/>
-                <a:cs typeface="+mj-cs"/>
-              </a:defRPr>
-            </a:lvl1pPr>
-            <a:lvl2pPr algn="l" rtl="0" eaLnBrk="0" fontAlgn="base" hangingPunct="0">
-              <a:spcBef>
-                <a:spcPct val="0"/>
-              </a:spcBef>
-              <a:spcAft>
-                <a:spcPct val="0"/>
-              </a:spcAft>
-              <a:defRPr sz="2000" b="1">
-                <a:solidFill>
-                  <a:schemeClr val="tx1"/>
-                </a:solidFill>
-                <a:latin typeface="Arial" charset="0"/>
-              </a:defRPr>
-            </a:lvl2pPr>
-            <a:lvl3pPr algn="l" rtl="0" eaLnBrk="0" fontAlgn="base" hangingPunct="0">
-              <a:spcBef>
-                <a:spcPct val="0"/>
-              </a:spcBef>
-              <a:spcAft>
-                <a:spcPct val="0"/>
-              </a:spcAft>
-              <a:defRPr sz="2000" b="1">
-                <a:solidFill>
-                  <a:schemeClr val="tx1"/>
-                </a:solidFill>
-                <a:latin typeface="Arial" charset="0"/>
-              </a:defRPr>
-            </a:lvl3pPr>
-            <a:lvl4pPr algn="l" rtl="0" eaLnBrk="0" fontAlgn="base" hangingPunct="0">
-              <a:spcBef>
-                <a:spcPct val="0"/>
-              </a:spcBef>
-              <a:spcAft>
-                <a:spcPct val="0"/>
-              </a:spcAft>
-              <a:defRPr sz="2000" b="1">
-                <a:solidFill>
-                  <a:schemeClr val="tx1"/>
-                </a:solidFill>
-                <a:latin typeface="Arial" charset="0"/>
-              </a:defRPr>
-            </a:lvl4pPr>
-            <a:lvl5pPr algn="l" rtl="0" eaLnBrk="0" fontAlgn="base" hangingPunct="0">
-              <a:spcBef>
-                <a:spcPct val="0"/>
-              </a:spcBef>
-              <a:spcAft>
-                <a:spcPct val="0"/>
-              </a:spcAft>
-              <a:defRPr sz="2000" b="1">
-                <a:solidFill>
-                  <a:schemeClr val="tx1"/>
-                </a:solidFill>
-                <a:latin typeface="Arial" charset="0"/>
-              </a:defRPr>
-            </a:lvl5pPr>
-            <a:lvl6pPr marL="457200" algn="l" rtl="0" eaLnBrk="1" fontAlgn="base" hangingPunct="1">
-              <a:spcBef>
-                <a:spcPct val="0"/>
-              </a:spcBef>
-              <a:spcAft>
-                <a:spcPct val="0"/>
-              </a:spcAft>
-              <a:defRPr sz="2000" b="1">
-                <a:solidFill>
-                  <a:schemeClr val="tx1"/>
-                </a:solidFill>
-                <a:latin typeface="Arial" charset="0"/>
-              </a:defRPr>
-            </a:lvl6pPr>
-            <a:lvl7pPr marL="914400" algn="l" rtl="0" eaLnBrk="1" fontAlgn="base" hangingPunct="1">
-              <a:spcBef>
-                <a:spcPct val="0"/>
-              </a:spcBef>
-              <a:spcAft>
-                <a:spcPct val="0"/>
-              </a:spcAft>
-              <a:defRPr sz="2000" b="1">
-                <a:solidFill>
-                  <a:schemeClr val="tx1"/>
-                </a:solidFill>
-                <a:latin typeface="Arial" charset="0"/>
-              </a:defRPr>
-            </a:lvl7pPr>
-            <a:lvl8pPr marL="1371600" algn="l" rtl="0" eaLnBrk="1" fontAlgn="base" hangingPunct="1">
-              <a:spcBef>
-                <a:spcPct val="0"/>
-              </a:spcBef>
-              <a:spcAft>
-                <a:spcPct val="0"/>
-              </a:spcAft>
-              <a:defRPr sz="2000" b="1">
-                <a:solidFill>
-                  <a:schemeClr val="tx1"/>
-                </a:solidFill>
-                <a:latin typeface="Arial" charset="0"/>
-              </a:defRPr>
-            </a:lvl8pPr>
-            <a:lvl9pPr marL="1828800" algn="l" rtl="0" eaLnBrk="1" fontAlgn="base" hangingPunct="1">
-              <a:spcBef>
-                <a:spcPct val="0"/>
-              </a:spcBef>
-              <a:spcAft>
-                <a:spcPct val="0"/>
-              </a:spcAft>
-              <a:defRPr sz="2000" b="1">
-                <a:solidFill>
-                  <a:schemeClr val="tx1"/>
-                </a:solidFill>
-                <a:latin typeface="Arial" charset="0"/>
-              </a:defRPr>
-            </a:lvl9pPr>
-          </a:lstStyle>
-          <a:p>
-            <a:r>
-              <a:rPr lang="en-US" sz="4000" kern="0" dirty="0" smtClean="0">
-                <a:solidFill>
-                  <a:schemeClr val="tx1">
-                    <a:lumMod val="85000"/>
-                    <a:lumOff val="15000"/>
-                  </a:schemeClr>
-                </a:solidFill>
-                <a:latin typeface="+mj-lt"/>
-              </a:rPr>
-              <a:t>Data Science</a:t>
-            </a:r>
-            <a:endParaRPr lang="en-US" sz="4000" kern="0" dirty="0">
               <a:solidFill>
                 <a:schemeClr val="tx1">
                   <a:lumMod val="85000"/>
@@ -9586,7 +9276,7 @@
   <p:timing>
     <p:tnLst>
       <p:par>
-        <p:cTn id="1" dur="indefinite" restart="never" nodeType="tmRoot"/>
+        <p:cTn xmlns:p14="http://schemas.microsoft.com/office/powerpoint/2010/main" id="1" dur="indefinite" restart="never" nodeType="tmRoot"/>
       </p:par>
     </p:tnLst>
   </p:timing>
@@ -9640,6 +9330,371 @@
                 </a:solidFill>
                 <a:latin typeface="+mj-lt"/>
               </a:rPr>
+              <a:t>Introduction</a:t>
+            </a:r>
+            <a:endParaRPr lang="en-US" sz="4000" dirty="0">
+              <a:solidFill>
+                <a:schemeClr val="tx1">
+                  <a:lumMod val="85000"/>
+                  <a:lumOff val="15000"/>
+                </a:schemeClr>
+              </a:solidFill>
+              <a:latin typeface="+mj-lt"/>
+            </a:endParaRPr>
+          </a:p>
+        </p:txBody>
+      </p:sp>
+      <p:sp>
+        <p:nvSpPr>
+          <p:cNvPr id="8" name="Content Placeholder 2"/>
+          <p:cNvSpPr>
+            <a:spLocks noGrp="1"/>
+          </p:cNvSpPr>
+          <p:nvPr>
+            <p:ph idx="1"/>
+          </p:nvPr>
+        </p:nvSpPr>
+        <p:spPr>
+          <a:xfrm>
+            <a:off x="685800" y="1371600"/>
+            <a:ext cx="8153400" cy="5029200"/>
+          </a:xfrm>
+          <a:noFill/>
+          <a:ln>
+            <a:noFill/>
+          </a:ln>
+          <a:extLst>
+            <a:ext uri="{909E8E84-426E-40dd-AFC4-6F175D3DCCD1}">
+              <a14:hiddenFill xmlns:a14="http://schemas.microsoft.com/office/drawing/2010/main">
+                <a:solidFill>
+                  <a:srgbClr val="FFFFFF"/>
+                </a:solidFill>
+              </a14:hiddenFill>
+            </a:ext>
+            <a:ext uri="{91240B29-F687-4f45-9708-019B960494DF}">
+              <a14:hiddenLine xmlns:a14="http://schemas.microsoft.com/office/drawing/2010/main" w="9525">
+                <a:solidFill>
+                  <a:srgbClr val="000000"/>
+                </a:solidFill>
+                <a:miter lim="800000"/>
+                <a:headEnd/>
+                <a:tailEnd/>
+              </a14:hiddenLine>
+            </a:ext>
+          </a:extLst>
+        </p:spPr>
+        <p:txBody>
+          <a:bodyPr vert="horz" wrap="square" lIns="0" tIns="0" rIns="0" bIns="0" numCol="1" anchor="t" anchorCtr="0" compatLnSpc="1">
+            <a:prstTxWarp prst="textNoShape">
+              <a:avLst/>
+            </a:prstTxWarp>
+          </a:bodyPr>
+          <a:lstStyle/>
+          <a:p>
+            <a:pPr>
+              <a:spcBef>
+                <a:spcPts val="1800"/>
+              </a:spcBef>
+              <a:buChar char="§"/>
+            </a:pPr>
+            <a:r>
+              <a:rPr lang="en-US" sz="3200" dirty="0" smtClean="0">
+                <a:solidFill>
+                  <a:schemeClr val="tx1">
+                    <a:lumMod val="85000"/>
+                    <a:lumOff val="15000"/>
+                  </a:schemeClr>
+                </a:solidFill>
+                <a:latin typeface="+mj-lt"/>
+              </a:rPr>
+              <a:t>Learned MATLAB in college</a:t>
+            </a:r>
+            <a:endParaRPr lang="en-US" sz="3200" dirty="0" smtClean="0">
+              <a:solidFill>
+                <a:schemeClr val="tx1">
+                  <a:lumMod val="85000"/>
+                  <a:lumOff val="15000"/>
+                </a:schemeClr>
+              </a:solidFill>
+              <a:latin typeface="+mj-lt"/>
+            </a:endParaRPr>
+          </a:p>
+          <a:p>
+            <a:pPr>
+              <a:spcBef>
+                <a:spcPts val="1800"/>
+              </a:spcBef>
+              <a:buChar char="§"/>
+            </a:pPr>
+            <a:r>
+              <a:rPr lang="en-US" sz="3200" dirty="0" smtClean="0">
+                <a:solidFill>
+                  <a:schemeClr val="tx1">
+                    <a:lumMod val="85000"/>
+                    <a:lumOff val="15000"/>
+                  </a:schemeClr>
+                </a:solidFill>
+                <a:latin typeface="+mj-lt"/>
+              </a:rPr>
+              <a:t>Started out as a business </a:t>
+            </a:r>
+            <a:r>
+              <a:rPr lang="en-US" sz="3200" dirty="0">
+                <a:solidFill>
+                  <a:schemeClr val="tx1">
+                    <a:lumMod val="85000"/>
+                    <a:lumOff val="15000"/>
+                  </a:schemeClr>
+                </a:solidFill>
+                <a:latin typeface="+mj-lt"/>
+              </a:rPr>
+              <a:t>a</a:t>
+            </a:r>
+            <a:r>
+              <a:rPr lang="en-US" sz="3200" dirty="0" smtClean="0">
+                <a:solidFill>
+                  <a:schemeClr val="tx1">
+                    <a:lumMod val="85000"/>
+                    <a:lumOff val="15000"/>
+                  </a:schemeClr>
+                </a:solidFill>
+                <a:latin typeface="+mj-lt"/>
+              </a:rPr>
+              <a:t>nalyst</a:t>
+            </a:r>
+            <a:endParaRPr lang="en-US" sz="3200" dirty="0" smtClean="0">
+              <a:solidFill>
+                <a:schemeClr val="tx1">
+                  <a:lumMod val="85000"/>
+                  <a:lumOff val="15000"/>
+                </a:schemeClr>
+              </a:solidFill>
+              <a:latin typeface="+mj-lt"/>
+            </a:endParaRPr>
+          </a:p>
+          <a:p>
+            <a:pPr>
+              <a:spcBef>
+                <a:spcPts val="1800"/>
+              </a:spcBef>
+              <a:buChar char="§"/>
+            </a:pPr>
+            <a:r>
+              <a:rPr lang="en-US" sz="3200" dirty="0" smtClean="0">
+                <a:solidFill>
+                  <a:schemeClr val="tx1">
+                    <a:lumMod val="85000"/>
+                    <a:lumOff val="15000"/>
+                  </a:schemeClr>
+                </a:solidFill>
+                <a:latin typeface="+mj-lt"/>
+              </a:rPr>
+              <a:t>Learned R to apply random </a:t>
+            </a:r>
+            <a:r>
+              <a:rPr lang="en-US" sz="3200" dirty="0">
+                <a:solidFill>
+                  <a:schemeClr val="tx1">
+                    <a:lumMod val="85000"/>
+                    <a:lumOff val="15000"/>
+                  </a:schemeClr>
+                </a:solidFill>
+                <a:latin typeface="+mj-lt"/>
+              </a:rPr>
+              <a:t>f</a:t>
+            </a:r>
+            <a:r>
+              <a:rPr lang="en-US" sz="3200" dirty="0" smtClean="0">
+                <a:solidFill>
+                  <a:schemeClr val="tx1">
+                    <a:lumMod val="85000"/>
+                    <a:lumOff val="15000"/>
+                  </a:schemeClr>
+                </a:solidFill>
+                <a:latin typeface="+mj-lt"/>
+              </a:rPr>
+              <a:t>orests</a:t>
+            </a:r>
+            <a:endParaRPr lang="en-US" sz="3200" dirty="0">
+              <a:solidFill>
+                <a:schemeClr val="tx1">
+                  <a:lumMod val="85000"/>
+                  <a:lumOff val="15000"/>
+                </a:schemeClr>
+              </a:solidFill>
+              <a:latin typeface="+mj-lt"/>
+            </a:endParaRPr>
+          </a:p>
+          <a:p>
+            <a:pPr>
+              <a:spcBef>
+                <a:spcPts val="1800"/>
+              </a:spcBef>
+              <a:buChar char="§"/>
+            </a:pPr>
+            <a:r>
+              <a:rPr lang="en-US" sz="3200" dirty="0" smtClean="0">
+                <a:solidFill>
+                  <a:schemeClr val="tx1">
+                    <a:lumMod val="85000"/>
+                    <a:lumOff val="15000"/>
+                  </a:schemeClr>
+                </a:solidFill>
+                <a:latin typeface="+mj-lt"/>
+              </a:rPr>
+              <a:t>Listened to a lecture by Hadley Wickham</a:t>
+            </a:r>
+            <a:r>
+              <a:rPr lang="en-US" sz="3200" dirty="0" smtClean="0">
+                <a:solidFill>
+                  <a:schemeClr val="tx1">
+                    <a:lumMod val="85000"/>
+                    <a:lumOff val="15000"/>
+                  </a:schemeClr>
+                </a:solidFill>
+                <a:latin typeface="+mj-lt"/>
+              </a:rPr>
+              <a:t> </a:t>
+            </a:r>
+          </a:p>
+          <a:p>
+            <a:pPr>
+              <a:spcBef>
+                <a:spcPts val="1800"/>
+              </a:spcBef>
+              <a:buChar char="§"/>
+            </a:pPr>
+            <a:r>
+              <a:rPr lang="en-US" sz="3200" dirty="0" smtClean="0">
+                <a:solidFill>
+                  <a:schemeClr val="tx1">
+                    <a:lumMod val="85000"/>
+                    <a:lumOff val="15000"/>
+                  </a:schemeClr>
+                </a:solidFill>
+                <a:latin typeface="+mj-lt"/>
+              </a:rPr>
+              <a:t>…</a:t>
+            </a:r>
+          </a:p>
+          <a:p>
+            <a:pPr>
+              <a:spcBef>
+                <a:spcPts val="1800"/>
+              </a:spcBef>
+              <a:buChar char="§"/>
+            </a:pPr>
+            <a:r>
+              <a:rPr lang="en-US" sz="3200" dirty="0" smtClean="0">
+                <a:solidFill>
+                  <a:schemeClr val="tx1">
+                    <a:lumMod val="85000"/>
+                    <a:lumOff val="15000"/>
+                  </a:schemeClr>
+                </a:solidFill>
+                <a:latin typeface="+mj-lt"/>
+              </a:rPr>
+              <a:t>Invited conference speaker</a:t>
+            </a:r>
+          </a:p>
+          <a:p>
+            <a:pPr>
+              <a:spcBef>
+                <a:spcPts val="1800"/>
+              </a:spcBef>
+              <a:buChar char="§"/>
+            </a:pPr>
+            <a:r>
+              <a:rPr lang="en-US" sz="3200" dirty="0" smtClean="0">
+                <a:solidFill>
+                  <a:schemeClr val="tx1">
+                    <a:lumMod val="85000"/>
+                    <a:lumOff val="15000"/>
+                  </a:schemeClr>
+                </a:solidFill>
+                <a:latin typeface="+mj-lt"/>
+              </a:rPr>
+              <a:t>Working as a data scientist at Slalom</a:t>
+            </a:r>
+            <a:endParaRPr lang="en-US" sz="3200" dirty="0" smtClean="0">
+              <a:solidFill>
+                <a:schemeClr val="tx1">
+                  <a:lumMod val="85000"/>
+                  <a:lumOff val="15000"/>
+                </a:schemeClr>
+              </a:solidFill>
+              <a:latin typeface="+mj-lt"/>
+            </a:endParaRPr>
+          </a:p>
+        </p:txBody>
+      </p:sp>
+    </p:spTree>
+    <p:extLst>
+      <p:ext uri="{BB962C8B-B14F-4D97-AF65-F5344CB8AC3E}">
+        <p14:creationId xmlns:p14="http://schemas.microsoft.com/office/powerpoint/2010/main" val="2670919932"/>
+      </p:ext>
+    </p:extLst>
+  </p:cSld>
+  <p:clrMapOvr>
+    <a:masterClrMapping/>
+  </p:clrMapOvr>
+  <p:timing>
+    <p:tnLst>
+      <p:par>
+        <p:cTn xmlns:p14="http://schemas.microsoft.com/office/powerpoint/2010/main" id="1" dur="indefinite" restart="never" nodeType="tmRoot"/>
+      </p:par>
+    </p:tnLst>
+  </p:timing>
+</p:sld>
+</file>
+
+<file path=ppt/slides/slide3.xml><?xml version="1.0" encoding="utf-8"?>
+<p:sld xmlns:a="http://schemas.openxmlformats.org/drawingml/2006/main" xmlns:r="http://schemas.openxmlformats.org/officeDocument/2006/relationships" xmlns:p="http://schemas.openxmlformats.org/presentationml/2006/main">
+  <p:cSld>
+    <p:spTree>
+      <p:nvGrpSpPr>
+        <p:cNvPr id="1" name=""/>
+        <p:cNvGrpSpPr/>
+        <p:nvPr/>
+      </p:nvGrpSpPr>
+      <p:grpSpPr>
+        <a:xfrm>
+          <a:off x="0" y="0"/>
+          <a:ext cx="0" cy="0"/>
+          <a:chOff x="0" y="0"/>
+          <a:chExt cx="0" cy="0"/>
+        </a:xfrm>
+      </p:grpSpPr>
+      <p:sp>
+        <p:nvSpPr>
+          <p:cNvPr id="2" name="Title 1"/>
+          <p:cNvSpPr>
+            <a:spLocks noGrp="1"/>
+          </p:cNvSpPr>
+          <p:nvPr>
+            <p:ph type="title"/>
+          </p:nvPr>
+        </p:nvSpPr>
+        <p:spPr>
+          <a:xfrm>
+            <a:off x="685800" y="701675"/>
+            <a:ext cx="7863840" cy="365125"/>
+          </a:xfrm>
+        </p:spPr>
+        <p:txBody>
+          <a:bodyPr/>
+          <a:lstStyle/>
+          <a:p>
+            <a:r>
+              <a:rPr lang="en-US" sz="4000" dirty="0" smtClean="0">
+                <a:solidFill>
+                  <a:schemeClr val="tx1">
+                    <a:lumMod val="85000"/>
+                    <a:lumOff val="15000"/>
+                  </a:schemeClr>
+                </a:solidFill>
+                <a:latin typeface="+mj-lt"/>
+              </a:rPr>
               <a:t>Agenda</a:t>
             </a:r>
             <a:endParaRPr lang="en-US" sz="4000" dirty="0">
@@ -9674,14 +9729,14 @@
             <a:noFill/>
           </a:ln>
           <a:extLst>
-            <a:ext uri="{909E8E84-426E-40DD-AFC4-6F175D3DCCD1}">
+            <a:ext uri="{909E8E84-426E-40dd-AFC4-6F175D3DCCD1}">
               <a14:hiddenFill xmlns:a14="http://schemas.microsoft.com/office/drawing/2010/main">
                 <a:solidFill>
                   <a:srgbClr val="FFFFFF"/>
                 </a:solidFill>
               </a14:hiddenFill>
             </a:ext>
-            <a:ext uri="{91240B29-F687-4F45-9708-019B960494DF}">
+            <a:ext uri="{91240B29-F687-4f45-9708-019B960494DF}">
               <a14:hiddenLine xmlns:a14="http://schemas.microsoft.com/office/drawing/2010/main" w="9525">
                 <a:solidFill>
                   <a:srgbClr val="000000"/>
@@ -9717,7 +9772,19 @@
                 </a:solidFill>
                 <a:latin typeface="+mj-lt"/>
               </a:rPr>
-              <a:t>What is data analysis?</a:t>
+              <a:t>What </a:t>
+            </a:r>
+            <a:r>
+              <a:rPr lang="en-US" sz="3200" dirty="0" smtClean="0">
+                <a:solidFill>
+                  <a:schemeClr val="tx1">
+                    <a:lumMod val="85000"/>
+                    <a:lumOff val="15000"/>
+                  </a:schemeClr>
+                </a:solidFill>
+                <a:latin typeface="+mj-lt"/>
+              </a:rPr>
+              <a:t>is data analysis?</a:t>
             </a:r>
           </a:p>
           <a:p>
@@ -9815,14 +9882,14 @@
   <p:timing>
     <p:tnLst>
       <p:par>
-        <p:cTn id="1" dur="indefinite" restart="never" nodeType="tmRoot"/>
+        <p:cTn xmlns:p14="http://schemas.microsoft.com/office/powerpoint/2010/main" id="1" dur="indefinite" restart="never" nodeType="tmRoot"/>
       </p:par>
     </p:tnLst>
   </p:timing>
 </p:sld>
 </file>
 
-<file path=ppt/slides/slide3.xml><?xml version="1.0" encoding="utf-8"?>
+<file path=ppt/slides/slide4.xml><?xml version="1.0" encoding="utf-8"?>
 <p:sld xmlns:a="http://schemas.openxmlformats.org/drawingml/2006/main" xmlns:r="http://schemas.openxmlformats.org/officeDocument/2006/relationships" xmlns:p="http://schemas.openxmlformats.org/presentationml/2006/main">
   <p:cSld>
     <p:spTree>
@@ -9860,14 +9927,14 @@
             <a:noFill/>
           </a:ln>
           <a:extLst>
-            <a:ext uri="{909E8E84-426E-40DD-AFC4-6F175D3DCCD1}">
+            <a:ext uri="{909E8E84-426E-40dd-AFC4-6F175D3DCCD1}">
               <a14:hiddenFill xmlns:a14="http://schemas.microsoft.com/office/drawing/2010/main">
                 <a:solidFill>
                   <a:srgbClr val="FFFFFF"/>
                 </a:solidFill>
               </a14:hiddenFill>
             </a:ext>
-            <a:ext uri="{91240B29-F687-4F45-9708-019B960494DF}">
+            <a:ext uri="{91240B29-F687-4f45-9708-019B960494DF}">
               <a14:hiddenLine xmlns:a14="http://schemas.microsoft.com/office/drawing/2010/main" w="9525">
                 <a:solidFill>
                   <a:srgbClr val="000000"/>
@@ -10038,14 +10105,14 @@
   <p:timing>
     <p:tnLst>
       <p:par>
-        <p:cTn id="1" dur="indefinite" restart="never" nodeType="tmRoot"/>
+        <p:cTn xmlns:p14="http://schemas.microsoft.com/office/powerpoint/2010/main" id="1" dur="indefinite" restart="never" nodeType="tmRoot"/>
       </p:par>
     </p:tnLst>
   </p:timing>
 </p:sld>
 </file>
 
-<file path=ppt/slides/slide4.xml><?xml version="1.0" encoding="utf-8"?>
+<file path=ppt/slides/slide5.xml><?xml version="1.0" encoding="utf-8"?>
 <p:sld xmlns:a="http://schemas.openxmlformats.org/drawingml/2006/main" xmlns:r="http://schemas.openxmlformats.org/officeDocument/2006/relationships" xmlns:p="http://schemas.openxmlformats.org/presentationml/2006/main">
   <p:cSld>
     <p:spTree>
@@ -10155,7 +10222,7 @@
           </a:prstGeom>
           <a:noFill/>
           <a:extLst>
-            <a:ext uri="{909E8E84-426E-40DD-AFC4-6F175D3DCCD1}">
+            <a:ext uri="{909E8E84-426E-40dd-AFC4-6F175D3DCCD1}">
               <a14:hiddenFill xmlns:a14="http://schemas.microsoft.com/office/drawing/2010/main">
                 <a:solidFill>
                   <a:srgbClr val="FFFFFF"/>
@@ -10333,14 +10400,14 @@
   <p:timing>
     <p:tnLst>
       <p:par>
-        <p:cTn id="1" dur="indefinite" restart="never" nodeType="tmRoot"/>
+        <p:cTn xmlns:p14="http://schemas.microsoft.com/office/powerpoint/2010/main" id="1" dur="indefinite" restart="never" nodeType="tmRoot"/>
       </p:par>
     </p:tnLst>
   </p:timing>
 </p:sld>
 </file>
 
-<file path=ppt/slides/slide5.xml><?xml version="1.0" encoding="utf-8"?>
+<file path=ppt/slides/slide6.xml><?xml version="1.0" encoding="utf-8"?>
 <p:sld xmlns:a="http://schemas.openxmlformats.org/drawingml/2006/main" xmlns:r="http://schemas.openxmlformats.org/officeDocument/2006/relationships" xmlns:p="http://schemas.openxmlformats.org/presentationml/2006/main">
   <p:cSld>
     <p:spTree>
@@ -10378,14 +10445,14 @@
             <a:noFill/>
           </a:ln>
           <a:extLst>
-            <a:ext uri="{909E8E84-426E-40DD-AFC4-6F175D3DCCD1}">
+            <a:ext uri="{909E8E84-426E-40dd-AFC4-6F175D3DCCD1}">
               <a14:hiddenFill xmlns:a14="http://schemas.microsoft.com/office/drawing/2010/main">
                 <a:solidFill>
                   <a:srgbClr val="FFFFFF"/>
                 </a:solidFill>
               </a14:hiddenFill>
             </a:ext>
-            <a:ext uri="{91240B29-F687-4F45-9708-019B960494DF}">
+            <a:ext uri="{91240B29-F687-4f45-9708-019B960494DF}">
               <a14:hiddenLine xmlns:a14="http://schemas.microsoft.com/office/drawing/2010/main" w="9525">
                 <a:solidFill>
                   <a:srgbClr val="000000"/>
@@ -10546,392 +10613,7 @@
   <p:timing>
     <p:tnLst>
       <p:par>
-        <p:cTn id="1" dur="indefinite" restart="never" nodeType="tmRoot"/>
-      </p:par>
-    </p:tnLst>
-  </p:timing>
-</p:sld>
-</file>
-
-<file path=ppt/slides/slide6.xml><?xml version="1.0" encoding="utf-8"?>
-<p:sld xmlns:a="http://schemas.openxmlformats.org/drawingml/2006/main" xmlns:r="http://schemas.openxmlformats.org/officeDocument/2006/relationships" xmlns:p="http://schemas.openxmlformats.org/presentationml/2006/main">
-  <p:cSld>
-    <p:spTree>
-      <p:nvGrpSpPr>
-        <p:cNvPr id="1" name=""/>
-        <p:cNvGrpSpPr/>
-        <p:nvPr/>
-      </p:nvGrpSpPr>
-      <p:grpSpPr>
-        <a:xfrm>
-          <a:off x="0" y="0"/>
-          <a:ext cx="0" cy="0"/>
-          <a:chOff x="0" y="0"/>
-          <a:chExt cx="0" cy="0"/>
-        </a:xfrm>
-      </p:grpSpPr>
-      <p:sp>
-        <p:nvSpPr>
-          <p:cNvPr id="10" name="Title 1"/>
-          <p:cNvSpPr txBox="1">
-            <a:spLocks/>
-          </p:cNvSpPr>
-          <p:nvPr/>
-        </p:nvSpPr>
-        <p:spPr>
-          <a:xfrm>
-            <a:off x="762000" y="1676400"/>
-            <a:ext cx="3581400" cy="1248614"/>
-          </a:xfrm>
-          <a:prstGeom prst="rect">
-            <a:avLst/>
-          </a:prstGeom>
-          <a:noFill/>
-          <a:ln>
-            <a:noFill/>
-          </a:ln>
-          <a:extLst>
-            <a:ext uri="{909E8E84-426E-40DD-AFC4-6F175D3DCCD1}">
-              <a14:hiddenFill xmlns:a14="http://schemas.microsoft.com/office/drawing/2010/main">
-                <a:solidFill>
-                  <a:srgbClr val="FFFFFF"/>
-                </a:solidFill>
-              </a14:hiddenFill>
-            </a:ext>
-            <a:ext uri="{91240B29-F687-4F45-9708-019B960494DF}">
-              <a14:hiddenLine xmlns:a14="http://schemas.microsoft.com/office/drawing/2010/main" w="9525">
-                <a:solidFill>
-                  <a:srgbClr val="000000"/>
-                </a:solidFill>
-                <a:miter lim="800000"/>
-                <a:headEnd/>
-                <a:tailEnd/>
-              </a14:hiddenLine>
-            </a:ext>
-          </a:extLst>
-        </p:spPr>
-        <p:txBody>
-          <a:bodyPr vert="horz" wrap="square" lIns="0" tIns="0" rIns="0" bIns="0" numCol="1" anchor="ctr" anchorCtr="0" compatLnSpc="1">
-            <a:prstTxWarp prst="textNoShape">
-              <a:avLst/>
-            </a:prstTxWarp>
-          </a:bodyPr>
-          <a:lstStyle>
-            <a:lvl1pPr eaLnBrk="0" fontAlgn="base" hangingPunct="0">
-              <a:spcBef>
-                <a:spcPct val="0"/>
-              </a:spcBef>
-              <a:spcAft>
-                <a:spcPct val="0"/>
-              </a:spcAft>
-              <a:defRPr sz="4000" b="1">
-                <a:solidFill>
-                  <a:schemeClr val="tx1">
-                    <a:lumMod val="85000"/>
-                    <a:lumOff val="15000"/>
-                  </a:schemeClr>
-                </a:solidFill>
-                <a:latin typeface="+mj-lt"/>
-                <a:ea typeface="+mj-ea"/>
-                <a:cs typeface="+mj-cs"/>
-              </a:defRPr>
-            </a:lvl1pPr>
-            <a:lvl2pPr eaLnBrk="0" fontAlgn="base" hangingPunct="0">
-              <a:spcBef>
-                <a:spcPct val="0"/>
-              </a:spcBef>
-              <a:spcAft>
-                <a:spcPct val="0"/>
-              </a:spcAft>
-              <a:defRPr sz="2000" b="1">
-                <a:latin typeface="Arial" charset="0"/>
-              </a:defRPr>
-            </a:lvl2pPr>
-            <a:lvl3pPr eaLnBrk="0" fontAlgn="base" hangingPunct="0">
-              <a:spcBef>
-                <a:spcPct val="0"/>
-              </a:spcBef>
-              <a:spcAft>
-                <a:spcPct val="0"/>
-              </a:spcAft>
-              <a:defRPr sz="2000" b="1">
-                <a:latin typeface="Arial" charset="0"/>
-              </a:defRPr>
-            </a:lvl3pPr>
-            <a:lvl4pPr eaLnBrk="0" fontAlgn="base" hangingPunct="0">
-              <a:spcBef>
-                <a:spcPct val="0"/>
-              </a:spcBef>
-              <a:spcAft>
-                <a:spcPct val="0"/>
-              </a:spcAft>
-              <a:defRPr sz="2000" b="1">
-                <a:latin typeface="Arial" charset="0"/>
-              </a:defRPr>
-            </a:lvl4pPr>
-            <a:lvl5pPr eaLnBrk="0" fontAlgn="base" hangingPunct="0">
-              <a:spcBef>
-                <a:spcPct val="0"/>
-              </a:spcBef>
-              <a:spcAft>
-                <a:spcPct val="0"/>
-              </a:spcAft>
-              <a:defRPr sz="2000" b="1">
-                <a:latin typeface="Arial" charset="0"/>
-              </a:defRPr>
-            </a:lvl5pPr>
-            <a:lvl6pPr marL="457200" fontAlgn="base">
-              <a:spcBef>
-                <a:spcPct val="0"/>
-              </a:spcBef>
-              <a:spcAft>
-                <a:spcPct val="0"/>
-              </a:spcAft>
-              <a:defRPr sz="2000" b="1">
-                <a:latin typeface="Arial" charset="0"/>
-              </a:defRPr>
-            </a:lvl6pPr>
-            <a:lvl7pPr marL="914400" fontAlgn="base">
-              <a:spcBef>
-                <a:spcPct val="0"/>
-              </a:spcBef>
-              <a:spcAft>
-                <a:spcPct val="0"/>
-              </a:spcAft>
-              <a:defRPr sz="2000" b="1">
-                <a:latin typeface="Arial" charset="0"/>
-              </a:defRPr>
-            </a:lvl7pPr>
-            <a:lvl8pPr marL="1371600" fontAlgn="base">
-              <a:spcBef>
-                <a:spcPct val="0"/>
-              </a:spcBef>
-              <a:spcAft>
-                <a:spcPct val="0"/>
-              </a:spcAft>
-              <a:defRPr sz="2000" b="1">
-                <a:latin typeface="Arial" charset="0"/>
-              </a:defRPr>
-            </a:lvl8pPr>
-            <a:lvl9pPr marL="1828800" fontAlgn="base">
-              <a:spcBef>
-                <a:spcPct val="0"/>
-              </a:spcBef>
-              <a:spcAft>
-                <a:spcPct val="0"/>
-              </a:spcAft>
-              <a:defRPr sz="2000" b="1">
-                <a:latin typeface="Arial" charset="0"/>
-              </a:defRPr>
-            </a:lvl9pPr>
-          </a:lstStyle>
-          <a:p>
-            <a:r>
-              <a:rPr lang="en-US" sz="8000" dirty="0" smtClean="0">
-                <a:solidFill>
-                  <a:srgbClr val="D62728"/>
-                </a:solidFill>
-              </a:rPr>
-              <a:t>#1</a:t>
-            </a:r>
-            <a:endParaRPr lang="en-US" sz="8000" dirty="0">
-              <a:solidFill>
-                <a:srgbClr val="D62728"/>
-              </a:solidFill>
-            </a:endParaRPr>
-          </a:p>
-        </p:txBody>
-      </p:sp>
-      <p:sp>
-        <p:nvSpPr>
-          <p:cNvPr id="11" name="Title 1"/>
-          <p:cNvSpPr txBox="1">
-            <a:spLocks/>
-          </p:cNvSpPr>
-          <p:nvPr/>
-        </p:nvSpPr>
-        <p:spPr>
-          <a:xfrm>
-            <a:off x="685800" y="2906508"/>
-            <a:ext cx="8001000" cy="2503692"/>
-          </a:xfrm>
-          <a:prstGeom prst="rect">
-            <a:avLst/>
-          </a:prstGeom>
-          <a:noFill/>
-          <a:ln>
-            <a:noFill/>
-          </a:ln>
-          <a:extLst>
-            <a:ext uri="{909E8E84-426E-40DD-AFC4-6F175D3DCCD1}">
-              <a14:hiddenFill xmlns:a14="http://schemas.microsoft.com/office/drawing/2010/main">
-                <a:solidFill>
-                  <a:srgbClr val="FFFFFF"/>
-                </a:solidFill>
-              </a14:hiddenFill>
-            </a:ext>
-            <a:ext uri="{91240B29-F687-4F45-9708-019B960494DF}">
-              <a14:hiddenLine xmlns:a14="http://schemas.microsoft.com/office/drawing/2010/main" w="9525">
-                <a:solidFill>
-                  <a:srgbClr val="000000"/>
-                </a:solidFill>
-                <a:miter lim="800000"/>
-                <a:headEnd/>
-                <a:tailEnd/>
-              </a14:hiddenLine>
-            </a:ext>
-          </a:extLst>
-        </p:spPr>
-        <p:txBody>
-          <a:bodyPr vert="horz" wrap="square" lIns="0" tIns="0" rIns="0" bIns="0" numCol="1" anchor="t" anchorCtr="0" compatLnSpc="1">
-            <a:prstTxWarp prst="textNoShape">
-              <a:avLst/>
-            </a:prstTxWarp>
-          </a:bodyPr>
-          <a:lstStyle>
-            <a:lvl1pPr eaLnBrk="0" fontAlgn="base" hangingPunct="0">
-              <a:spcBef>
-                <a:spcPct val="0"/>
-              </a:spcBef>
-              <a:spcAft>
-                <a:spcPct val="0"/>
-              </a:spcAft>
-              <a:defRPr sz="4000" b="1">
-                <a:solidFill>
-                  <a:schemeClr val="tx1">
-                    <a:lumMod val="85000"/>
-                    <a:lumOff val="15000"/>
-                  </a:schemeClr>
-                </a:solidFill>
-                <a:latin typeface="+mj-lt"/>
-                <a:ea typeface="+mj-ea"/>
-                <a:cs typeface="+mj-cs"/>
-              </a:defRPr>
-            </a:lvl1pPr>
-            <a:lvl2pPr eaLnBrk="0" fontAlgn="base" hangingPunct="0">
-              <a:spcBef>
-                <a:spcPct val="0"/>
-              </a:spcBef>
-              <a:spcAft>
-                <a:spcPct val="0"/>
-              </a:spcAft>
-              <a:defRPr sz="2000" b="1">
-                <a:latin typeface="Arial" charset="0"/>
-              </a:defRPr>
-            </a:lvl2pPr>
-            <a:lvl3pPr eaLnBrk="0" fontAlgn="base" hangingPunct="0">
-              <a:spcBef>
-                <a:spcPct val="0"/>
-              </a:spcBef>
-              <a:spcAft>
-                <a:spcPct val="0"/>
-              </a:spcAft>
-              <a:defRPr sz="2000" b="1">
-                <a:latin typeface="Arial" charset="0"/>
-              </a:defRPr>
-            </a:lvl3pPr>
-            <a:lvl4pPr eaLnBrk="0" fontAlgn="base" hangingPunct="0">
-              <a:spcBef>
-                <a:spcPct val="0"/>
-              </a:spcBef>
-              <a:spcAft>
-                <a:spcPct val="0"/>
-              </a:spcAft>
-              <a:defRPr sz="2000" b="1">
-                <a:latin typeface="Arial" charset="0"/>
-              </a:defRPr>
-            </a:lvl4pPr>
-            <a:lvl5pPr eaLnBrk="0" fontAlgn="base" hangingPunct="0">
-              <a:spcBef>
-                <a:spcPct val="0"/>
-              </a:spcBef>
-              <a:spcAft>
-                <a:spcPct val="0"/>
-              </a:spcAft>
-              <a:defRPr sz="2000" b="1">
-                <a:latin typeface="Arial" charset="0"/>
-              </a:defRPr>
-            </a:lvl5pPr>
-            <a:lvl6pPr marL="457200" fontAlgn="base">
-              <a:spcBef>
-                <a:spcPct val="0"/>
-              </a:spcBef>
-              <a:spcAft>
-                <a:spcPct val="0"/>
-              </a:spcAft>
-              <a:defRPr sz="2000" b="1">
-                <a:latin typeface="Arial" charset="0"/>
-              </a:defRPr>
-            </a:lvl6pPr>
-            <a:lvl7pPr marL="914400" fontAlgn="base">
-              <a:spcBef>
-                <a:spcPct val="0"/>
-              </a:spcBef>
-              <a:spcAft>
-                <a:spcPct val="0"/>
-              </a:spcAft>
-              <a:defRPr sz="2000" b="1">
-                <a:latin typeface="Arial" charset="0"/>
-              </a:defRPr>
-            </a:lvl7pPr>
-            <a:lvl8pPr marL="1371600" fontAlgn="base">
-              <a:spcBef>
-                <a:spcPct val="0"/>
-              </a:spcBef>
-              <a:spcAft>
-                <a:spcPct val="0"/>
-              </a:spcAft>
-              <a:defRPr sz="2000" b="1">
-                <a:latin typeface="Arial" charset="0"/>
-              </a:defRPr>
-            </a:lvl8pPr>
-            <a:lvl9pPr marL="1828800" fontAlgn="base">
-              <a:spcBef>
-                <a:spcPct val="0"/>
-              </a:spcBef>
-              <a:spcAft>
-                <a:spcPct val="0"/>
-              </a:spcAft>
-              <a:defRPr sz="2000" b="1">
-                <a:latin typeface="Arial" charset="0"/>
-              </a:defRPr>
-            </a:lvl9pPr>
-          </a:lstStyle>
-          <a:p>
-            <a:r>
-              <a:rPr lang="en-US" sz="5400" dirty="0" smtClean="0"/>
-              <a:t>Provides liberation to analyze data on </a:t>
-            </a:r>
-            <a:r>
-              <a:rPr lang="en-US" sz="5400" dirty="0" smtClean="0"/>
-              <a:t>your</a:t>
-            </a:r>
-            <a:r>
-              <a:rPr lang="en-US" sz="5400" dirty="0" smtClean="0"/>
-              <a:t> </a:t>
-            </a:r>
-            <a:r>
-              <a:rPr lang="en-US" sz="5400" dirty="0" smtClean="0"/>
-              <a:t>own terms</a:t>
-            </a:r>
-            <a:endParaRPr lang="en-US" sz="5400" dirty="0"/>
-          </a:p>
-        </p:txBody>
-      </p:sp>
-    </p:spTree>
-    <p:extLst>
-      <p:ext uri="{BB962C8B-B14F-4D97-AF65-F5344CB8AC3E}">
-        <p14:creationId xmlns:p14="http://schemas.microsoft.com/office/powerpoint/2010/main" val="1360115604"/>
-      </p:ext>
-    </p:extLst>
-  </p:cSld>
-  <p:clrMapOvr>
-    <a:masterClrMapping/>
-  </p:clrMapOvr>
-  <p:timing>
-    <p:tnLst>
-      <p:par>
-        <p:cTn id="1" dur="indefinite" restart="never" nodeType="tmRoot"/>
+        <p:cTn xmlns:p14="http://schemas.microsoft.com/office/powerpoint/2010/main" id="1" dur="indefinite" restart="never" nodeType="tmRoot"/>
       </p:par>
     </p:tnLst>
   </p:timing>
@@ -10976,14 +10658,14 @@
             <a:noFill/>
           </a:ln>
           <a:extLst>
-            <a:ext uri="{909E8E84-426E-40DD-AFC4-6F175D3DCCD1}">
+            <a:ext uri="{909E8E84-426E-40dd-AFC4-6F175D3DCCD1}">
               <a14:hiddenFill xmlns:a14="http://schemas.microsoft.com/office/drawing/2010/main">
                 <a:solidFill>
                   <a:srgbClr val="FFFFFF"/>
                 </a:solidFill>
               </a14:hiddenFill>
             </a:ext>
-            <a:ext uri="{91240B29-F687-4F45-9708-019B960494DF}">
+            <a:ext uri="{91240B29-F687-4f45-9708-019B960494DF}">
               <a14:hiddenLine xmlns:a14="http://schemas.microsoft.com/office/drawing/2010/main" w="9525">
                 <a:solidFill>
                   <a:srgbClr val="000000"/>
@@ -11117,7 +10799,7 @@
                   <a:srgbClr val="D62728"/>
                 </a:solidFill>
               </a:rPr>
-              <a:t>#2</a:t>
+              <a:t>#1</a:t>
             </a:r>
             <a:endParaRPr lang="en-US" sz="8000" dirty="0">
               <a:solidFill>
@@ -11148,14 +10830,14 @@
             <a:noFill/>
           </a:ln>
           <a:extLst>
-            <a:ext uri="{909E8E84-426E-40DD-AFC4-6F175D3DCCD1}">
+            <a:ext uri="{909E8E84-426E-40dd-AFC4-6F175D3DCCD1}">
               <a14:hiddenFill xmlns:a14="http://schemas.microsoft.com/office/drawing/2010/main">
                 <a:solidFill>
                   <a:srgbClr val="FFFFFF"/>
                 </a:solidFill>
               </a14:hiddenFill>
             </a:ext>
-            <a:ext uri="{91240B29-F687-4F45-9708-019B960494DF}">
+            <a:ext uri="{91240B29-F687-4f45-9708-019B960494DF}">
               <a14:hiddenLine xmlns:a14="http://schemas.microsoft.com/office/drawing/2010/main" w="9525">
                 <a:solidFill>
                   <a:srgbClr val="000000"/>
@@ -11285,7 +10967,7 @@
           <a:p>
             <a:r>
               <a:rPr lang="en-US" sz="5400" dirty="0" smtClean="0"/>
-              <a:t>Provokes knowledge sharing and reproducibility</a:t>
+              <a:t>Provides liberation to analyze data on your own terms</a:t>
             </a:r>
             <a:endParaRPr lang="en-US" sz="5400" dirty="0"/>
           </a:p>
@@ -11294,7 +10976,7 @@
     </p:spTree>
     <p:extLst>
       <p:ext uri="{BB962C8B-B14F-4D97-AF65-F5344CB8AC3E}">
-        <p14:creationId xmlns:p14="http://schemas.microsoft.com/office/powerpoint/2010/main" val="4153817909"/>
+        <p14:creationId xmlns:p14="http://schemas.microsoft.com/office/powerpoint/2010/main" val="1360115604"/>
       </p:ext>
     </p:extLst>
   </p:cSld>
@@ -11304,7 +10986,7 @@
   <p:timing>
     <p:tnLst>
       <p:par>
-        <p:cTn id="1" dur="indefinite" restart="never" nodeType="tmRoot"/>
+        <p:cTn xmlns:p14="http://schemas.microsoft.com/office/powerpoint/2010/main" id="1" dur="indefinite" restart="never" nodeType="tmRoot"/>
       </p:par>
     </p:tnLst>
   </p:timing>
@@ -11349,14 +11031,14 @@
             <a:noFill/>
           </a:ln>
           <a:extLst>
-            <a:ext uri="{909E8E84-426E-40DD-AFC4-6F175D3DCCD1}">
+            <a:ext uri="{909E8E84-426E-40dd-AFC4-6F175D3DCCD1}">
               <a14:hiddenFill xmlns:a14="http://schemas.microsoft.com/office/drawing/2010/main">
                 <a:solidFill>
                   <a:srgbClr val="FFFFFF"/>
                 </a:solidFill>
               </a14:hiddenFill>
             </a:ext>
-            <a:ext uri="{91240B29-F687-4F45-9708-019B960494DF}">
+            <a:ext uri="{91240B29-F687-4f45-9708-019B960494DF}">
               <a14:hiddenLine xmlns:a14="http://schemas.microsoft.com/office/drawing/2010/main" w="9525">
                 <a:solidFill>
                   <a:srgbClr val="000000"/>
@@ -11490,7 +11172,7 @@
                   <a:srgbClr val="D62728"/>
                 </a:solidFill>
               </a:rPr>
-              <a:t>#3</a:t>
+              <a:t>#2</a:t>
             </a:r>
             <a:endParaRPr lang="en-US" sz="8000" dirty="0">
               <a:solidFill>
@@ -11521,14 +11203,14 @@
             <a:noFill/>
           </a:ln>
           <a:extLst>
-            <a:ext uri="{909E8E84-426E-40DD-AFC4-6F175D3DCCD1}">
+            <a:ext uri="{909E8E84-426E-40dd-AFC4-6F175D3DCCD1}">
               <a14:hiddenFill xmlns:a14="http://schemas.microsoft.com/office/drawing/2010/main">
                 <a:solidFill>
                   <a:srgbClr val="FFFFFF"/>
                 </a:solidFill>
               </a14:hiddenFill>
             </a:ext>
-            <a:ext uri="{91240B29-F687-4F45-9708-019B960494DF}">
+            <a:ext uri="{91240B29-F687-4f45-9708-019B960494DF}">
               <a14:hiddenLine xmlns:a14="http://schemas.microsoft.com/office/drawing/2010/main" w="9525">
                 <a:solidFill>
                   <a:srgbClr val="000000"/>
@@ -11658,7 +11340,7 @@
           <a:p>
             <a:r>
               <a:rPr lang="en-US" sz="5400" dirty="0" smtClean="0"/>
-              <a:t>Promotes continuous improvement through automation</a:t>
+              <a:t>Provokes knowledge sharing and reproducibility</a:t>
             </a:r>
             <a:endParaRPr lang="en-US" sz="5400" dirty="0"/>
           </a:p>
@@ -11667,7 +11349,7 @@
     </p:spTree>
     <p:extLst>
       <p:ext uri="{BB962C8B-B14F-4D97-AF65-F5344CB8AC3E}">
-        <p14:creationId xmlns:p14="http://schemas.microsoft.com/office/powerpoint/2010/main" val="2048697367"/>
+        <p14:creationId xmlns:p14="http://schemas.microsoft.com/office/powerpoint/2010/main" val="4153817909"/>
       </p:ext>
     </p:extLst>
   </p:cSld>
@@ -11677,7 +11359,7 @@
   <p:timing>
     <p:tnLst>
       <p:par>
-        <p:cTn id="1" dur="indefinite" restart="never" nodeType="tmRoot"/>
+        <p:cTn xmlns:p14="http://schemas.microsoft.com/office/powerpoint/2010/main" id="1" dur="indefinite" restart="never" nodeType="tmRoot"/>
       </p:par>
     </p:tnLst>
   </p:timing>
@@ -11703,7 +11385,7 @@
       </p:grpSpPr>
       <p:sp>
         <p:nvSpPr>
-          <p:cNvPr id="2" name="Title 1"/>
+          <p:cNvPr id="10" name="Title 1"/>
           <p:cNvSpPr txBox="1">
             <a:spLocks/>
           </p:cNvSpPr>
@@ -11711,8 +11393,8 @@
         </p:nvSpPr>
         <p:spPr>
           <a:xfrm>
-            <a:off x="825982" y="2645647"/>
-            <a:ext cx="7492037" cy="1248614"/>
+            <a:off x="762000" y="1676400"/>
+            <a:ext cx="3581400" cy="1248614"/>
           </a:xfrm>
           <a:prstGeom prst="rect">
             <a:avLst/>
@@ -11722,14 +11404,14 @@
             <a:noFill/>
           </a:ln>
           <a:extLst>
-            <a:ext uri="{909E8E84-426E-40DD-AFC4-6F175D3DCCD1}">
+            <a:ext uri="{909E8E84-426E-40dd-AFC4-6F175D3DCCD1}">
               <a14:hiddenFill xmlns:a14="http://schemas.microsoft.com/office/drawing/2010/main">
                 <a:solidFill>
                   <a:srgbClr val="FFFFFF"/>
                 </a:solidFill>
               </a14:hiddenFill>
             </a:ext>
-            <a:ext uri="{91240B29-F687-4F45-9708-019B960494DF}">
+            <a:ext uri="{91240B29-F687-4f45-9708-019B960494DF}">
               <a14:hiddenLine xmlns:a14="http://schemas.microsoft.com/office/drawing/2010/main" w="9525">
                 <a:solidFill>
                   <a:srgbClr val="000000"/>
@@ -11858,29 +11540,189 @@
           </a:lstStyle>
           <a:p>
             <a:r>
-              <a:rPr lang="en-US" sz="5400" dirty="0" smtClean="0"/>
-              <a:t>Why program in </a:t>
+              <a:rPr lang="en-US" sz="8000" dirty="0" smtClean="0">
+                <a:solidFill>
+                  <a:srgbClr val="D62728"/>
+                </a:solidFill>
+              </a:rPr>
+              <a:t>#3</a:t>
             </a:r>
-            <a:r>
-              <a:rPr lang="en-US" sz="5400" dirty="0" smtClean="0">
-                <a:solidFill>
-                  <a:srgbClr val="3366FF"/>
-                </a:solidFill>
-              </a:rPr>
-              <a:t>Python?</a:t>
-            </a:r>
-            <a:endParaRPr lang="en-US" sz="5400" dirty="0">
+            <a:endParaRPr lang="en-US" sz="8000" dirty="0">
               <a:solidFill>
-                <a:srgbClr val="3366FF"/>
+                <a:srgbClr val="D62728"/>
               </a:solidFill>
             </a:endParaRPr>
+          </a:p>
+        </p:txBody>
+      </p:sp>
+      <p:sp>
+        <p:nvSpPr>
+          <p:cNvPr id="11" name="Title 1"/>
+          <p:cNvSpPr txBox="1">
+            <a:spLocks/>
+          </p:cNvSpPr>
+          <p:nvPr/>
+        </p:nvSpPr>
+        <p:spPr>
+          <a:xfrm>
+            <a:off x="685800" y="2906508"/>
+            <a:ext cx="8001000" cy="2503692"/>
+          </a:xfrm>
+          <a:prstGeom prst="rect">
+            <a:avLst/>
+          </a:prstGeom>
+          <a:noFill/>
+          <a:ln>
+            <a:noFill/>
+          </a:ln>
+          <a:extLst>
+            <a:ext uri="{909E8E84-426E-40dd-AFC4-6F175D3DCCD1}">
+              <a14:hiddenFill xmlns:a14="http://schemas.microsoft.com/office/drawing/2010/main">
+                <a:solidFill>
+                  <a:srgbClr val="FFFFFF"/>
+                </a:solidFill>
+              </a14:hiddenFill>
+            </a:ext>
+            <a:ext uri="{91240B29-F687-4f45-9708-019B960494DF}">
+              <a14:hiddenLine xmlns:a14="http://schemas.microsoft.com/office/drawing/2010/main" w="9525">
+                <a:solidFill>
+                  <a:srgbClr val="000000"/>
+                </a:solidFill>
+                <a:miter lim="800000"/>
+                <a:headEnd/>
+                <a:tailEnd/>
+              </a14:hiddenLine>
+            </a:ext>
+          </a:extLst>
+        </p:spPr>
+        <p:txBody>
+          <a:bodyPr vert="horz" wrap="square" lIns="0" tIns="0" rIns="0" bIns="0" numCol="1" anchor="t" anchorCtr="0" compatLnSpc="1">
+            <a:prstTxWarp prst="textNoShape">
+              <a:avLst/>
+            </a:prstTxWarp>
+          </a:bodyPr>
+          <a:lstStyle>
+            <a:lvl1pPr eaLnBrk="0" fontAlgn="base" hangingPunct="0">
+              <a:spcBef>
+                <a:spcPct val="0"/>
+              </a:spcBef>
+              <a:spcAft>
+                <a:spcPct val="0"/>
+              </a:spcAft>
+              <a:defRPr sz="4000" b="1">
+                <a:solidFill>
+                  <a:schemeClr val="tx1">
+                    <a:lumMod val="85000"/>
+                    <a:lumOff val="15000"/>
+                  </a:schemeClr>
+                </a:solidFill>
+                <a:latin typeface="+mj-lt"/>
+                <a:ea typeface="+mj-ea"/>
+                <a:cs typeface="+mj-cs"/>
+              </a:defRPr>
+            </a:lvl1pPr>
+            <a:lvl2pPr eaLnBrk="0" fontAlgn="base" hangingPunct="0">
+              <a:spcBef>
+                <a:spcPct val="0"/>
+              </a:spcBef>
+              <a:spcAft>
+                <a:spcPct val="0"/>
+              </a:spcAft>
+              <a:defRPr sz="2000" b="1">
+                <a:latin typeface="Arial" charset="0"/>
+              </a:defRPr>
+            </a:lvl2pPr>
+            <a:lvl3pPr eaLnBrk="0" fontAlgn="base" hangingPunct="0">
+              <a:spcBef>
+                <a:spcPct val="0"/>
+              </a:spcBef>
+              <a:spcAft>
+                <a:spcPct val="0"/>
+              </a:spcAft>
+              <a:defRPr sz="2000" b="1">
+                <a:latin typeface="Arial" charset="0"/>
+              </a:defRPr>
+            </a:lvl3pPr>
+            <a:lvl4pPr eaLnBrk="0" fontAlgn="base" hangingPunct="0">
+              <a:spcBef>
+                <a:spcPct val="0"/>
+              </a:spcBef>
+              <a:spcAft>
+                <a:spcPct val="0"/>
+              </a:spcAft>
+              <a:defRPr sz="2000" b="1">
+                <a:latin typeface="Arial" charset="0"/>
+              </a:defRPr>
+            </a:lvl4pPr>
+            <a:lvl5pPr eaLnBrk="0" fontAlgn="base" hangingPunct="0">
+              <a:spcBef>
+                <a:spcPct val="0"/>
+              </a:spcBef>
+              <a:spcAft>
+                <a:spcPct val="0"/>
+              </a:spcAft>
+              <a:defRPr sz="2000" b="1">
+                <a:latin typeface="Arial" charset="0"/>
+              </a:defRPr>
+            </a:lvl5pPr>
+            <a:lvl6pPr marL="457200" fontAlgn="base">
+              <a:spcBef>
+                <a:spcPct val="0"/>
+              </a:spcBef>
+              <a:spcAft>
+                <a:spcPct val="0"/>
+              </a:spcAft>
+              <a:defRPr sz="2000" b="1">
+                <a:latin typeface="Arial" charset="0"/>
+              </a:defRPr>
+            </a:lvl6pPr>
+            <a:lvl7pPr marL="914400" fontAlgn="base">
+              <a:spcBef>
+                <a:spcPct val="0"/>
+              </a:spcBef>
+              <a:spcAft>
+                <a:spcPct val="0"/>
+              </a:spcAft>
+              <a:defRPr sz="2000" b="1">
+                <a:latin typeface="Arial" charset="0"/>
+              </a:defRPr>
+            </a:lvl7pPr>
+            <a:lvl8pPr marL="1371600" fontAlgn="base">
+              <a:spcBef>
+                <a:spcPct val="0"/>
+              </a:spcBef>
+              <a:spcAft>
+                <a:spcPct val="0"/>
+              </a:spcAft>
+              <a:defRPr sz="2000" b="1">
+                <a:latin typeface="Arial" charset="0"/>
+              </a:defRPr>
+            </a:lvl8pPr>
+            <a:lvl9pPr marL="1828800" fontAlgn="base">
+              <a:spcBef>
+                <a:spcPct val="0"/>
+              </a:spcBef>
+              <a:spcAft>
+                <a:spcPct val="0"/>
+              </a:spcAft>
+              <a:defRPr sz="2000" b="1">
+                <a:latin typeface="Arial" charset="0"/>
+              </a:defRPr>
+            </a:lvl9pPr>
+          </a:lstStyle>
+          <a:p>
+            <a:r>
+              <a:rPr lang="en-US" sz="5400" dirty="0" smtClean="0"/>
+              <a:t>Promotes continuous improvement through automation</a:t>
+            </a:r>
+            <a:endParaRPr lang="en-US" sz="5400" dirty="0"/>
           </a:p>
         </p:txBody>
       </p:sp>
     </p:spTree>
     <p:extLst>
       <p:ext uri="{BB962C8B-B14F-4D97-AF65-F5344CB8AC3E}">
-        <p14:creationId xmlns:p14="http://schemas.microsoft.com/office/powerpoint/2010/main" val="3808562461"/>
+        <p14:creationId xmlns:p14="http://schemas.microsoft.com/office/powerpoint/2010/main" val="2048697367"/>
       </p:ext>
     </p:extLst>
   </p:cSld>
@@ -11890,7 +11732,7 @@
   <p:timing>
     <p:tnLst>
       <p:par>
-        <p:cTn id="1" dur="indefinite" restart="never" nodeType="tmRoot"/>
+        <p:cTn xmlns:p14="http://schemas.microsoft.com/office/powerpoint/2010/main" id="1" dur="indefinite" restart="never" nodeType="tmRoot"/>
       </p:par>
     </p:tnLst>
   </p:timing>

</xml_diff>